<commit_message>
UC Agenda - atualização 4º encontro (parcial)
UC Agenda - atualização 4º encontro (parcial)
</commit_message>
<xml_diff>
--- a/TCC/4º Encontro/2017-Apresentacao Psystem.pptx
+++ b/TCC/4º Encontro/2017-Apresentacao Psystem.pptx
@@ -182,7 +182,7 @@
   </p:defaultTextStyle>
   <p:extLst>
     <p:ext uri="{EFAFB233-063F-42B5-8137-9DF3F51BA10A}">
-      <p15:sldGuideLst xmlns:p15="http://schemas.microsoft.com/office/powerpoint/2012/main">
+      <p15:sldGuideLst xmlns:p15="http://schemas.microsoft.com/office/powerpoint/2012/main" xmlns="">
         <p15:guide id="1" orient="horz" pos="2160">
           <p15:clr>
             <a:srgbClr val="A4A3A4"/>
@@ -285,7 +285,8 @@
           <a:p>
             <a:fld id="{C0D5B206-56B5-433E-8333-9415E6A460B9}" type="datetimeFigureOut">
               <a:rPr lang="pt-BR" smtClean="0"/>
-              <a:t>15/08/2017</a:t>
+              <a:pPr/>
+              <a:t>21/08/2017</a:t>
             </a:fld>
             <a:endParaRPr lang="pt-BR"/>
           </a:p>
@@ -443,7 +444,8 @@
           <a:p>
             <a:fld id="{876E4F93-E697-4509-B43E-25456566412B}" type="slidenum">
               <a:rPr lang="pt-BR" smtClean="0"/>
-              <a:t>‹#›</a:t>
+              <a:pPr/>
+              <a:t>‹nº›</a:t>
             </a:fld>
             <a:endParaRPr lang="pt-BR"/>
           </a:p>
@@ -452,7 +454,7 @@
     </p:spTree>
     <p:extLst>
       <p:ext uri="{BB962C8B-B14F-4D97-AF65-F5344CB8AC3E}">
-        <p14:creationId xmlns:p14="http://schemas.microsoft.com/office/powerpoint/2010/main" val="671299352"/>
+        <p14:creationId xmlns:p14="http://schemas.microsoft.com/office/powerpoint/2010/main" xmlns="" val="671299352"/>
       </p:ext>
     </p:extLst>
   </p:cSld>
@@ -658,7 +660,7 @@
     </p:spTree>
     <p:extLst>
       <p:ext uri="{BB962C8B-B14F-4D97-AF65-F5344CB8AC3E}">
-        <p14:creationId xmlns:p14="http://schemas.microsoft.com/office/powerpoint/2010/main" val="3951886733"/>
+        <p14:creationId xmlns:p14="http://schemas.microsoft.com/office/powerpoint/2010/main" xmlns="" val="3951886733"/>
       </p:ext>
     </p:extLst>
   </p:cSld>
@@ -949,7 +951,7 @@
     </p:spTree>
     <p:extLst>
       <p:ext uri="{BB962C8B-B14F-4D97-AF65-F5344CB8AC3E}">
-        <p14:creationId xmlns:p14="http://schemas.microsoft.com/office/powerpoint/2010/main" val="1588299535"/>
+        <p14:creationId xmlns:p14="http://schemas.microsoft.com/office/powerpoint/2010/main" xmlns="" val="1588299535"/>
       </p:ext>
     </p:extLst>
   </p:cSld>
@@ -998,14 +1000,14 @@
           </a:ln>
           <a:extLst>
             <a:ext uri="{909E8E84-426E-40DD-AFC4-6F175D3DCCD1}">
-              <a14:hiddenFill xmlns:a14="http://schemas.microsoft.com/office/drawing/2010/main">
+              <a14:hiddenFill xmlns:a14="http://schemas.microsoft.com/office/drawing/2010/main" xmlns="">
                 <a:solidFill>
                   <a:srgbClr val="FFFFFF"/>
                 </a:solidFill>
               </a14:hiddenFill>
             </a:ext>
             <a:ext uri="{91240B29-F687-4F45-9708-019B960494DF}">
-              <a14:hiddenLine xmlns:a14="http://schemas.microsoft.com/office/drawing/2010/main" w="9525">
+              <a14:hiddenLine xmlns:a14="http://schemas.microsoft.com/office/drawing/2010/main" xmlns="" w="9525">
                 <a:solidFill>
                   <a:srgbClr val="000000"/>
                 </a:solidFill>
@@ -1146,7 +1148,7 @@
                 <a:latin typeface="Verdana" pitchFamily="34" charset="0"/>
               </a:rPr>
               <a:pPr eaLnBrk="1" hangingPunct="1"/>
-              <a:t>‹#›</a:t>
+              <a:t>‹nº›</a:t>
             </a:fld>
             <a:endParaRPr lang="pt-BR" sz="1400" b="1">
               <a:solidFill>
@@ -1421,7 +1423,7 @@
     </p:spTree>
     <p:extLst>
       <p:ext uri="{BB962C8B-B14F-4D97-AF65-F5344CB8AC3E}">
-        <p14:creationId xmlns:p14="http://schemas.microsoft.com/office/powerpoint/2010/main" val="3359836669"/>
+        <p14:creationId xmlns:p14="http://schemas.microsoft.com/office/powerpoint/2010/main" xmlns="" val="3359836669"/>
       </p:ext>
     </p:extLst>
   </p:cSld>
@@ -1451,7 +1453,7 @@
     </p:spTree>
     <p:extLst>
       <p:ext uri="{BB962C8B-B14F-4D97-AF65-F5344CB8AC3E}">
-        <p14:creationId xmlns:p14="http://schemas.microsoft.com/office/powerpoint/2010/main" val="413836109"/>
+        <p14:creationId xmlns:p14="http://schemas.microsoft.com/office/powerpoint/2010/main" xmlns="" val="413836109"/>
       </p:ext>
     </p:extLst>
   </p:cSld>
@@ -1551,7 +1553,7 @@
           <a:blip r:embed="rId2" cstate="print">
             <a:extLst>
               <a:ext uri="{28A0092B-C50C-407E-A947-70E740481C1C}">
-                <a14:useLocalDpi xmlns:a14="http://schemas.microsoft.com/office/drawing/2010/main" val="0"/>
+                <a14:useLocalDpi xmlns:a14="http://schemas.microsoft.com/office/drawing/2010/main" xmlns="" val="0"/>
               </a:ext>
             </a:extLst>
           </a:blip>
@@ -1574,14 +1576,14 @@
           </a:ln>
           <a:extLst>
             <a:ext uri="{909E8E84-426E-40DD-AFC4-6F175D3DCCD1}">
-              <a14:hiddenFill xmlns:a14="http://schemas.microsoft.com/office/drawing/2010/main">
+              <a14:hiddenFill xmlns:a14="http://schemas.microsoft.com/office/drawing/2010/main" xmlns="">
                 <a:solidFill>
                   <a:srgbClr val="FFFFFF"/>
                 </a:solidFill>
               </a14:hiddenFill>
             </a:ext>
             <a:ext uri="{91240B29-F687-4F45-9708-019B960494DF}">
-              <a14:hiddenLine xmlns:a14="http://schemas.microsoft.com/office/drawing/2010/main" w="9525">
+              <a14:hiddenLine xmlns:a14="http://schemas.microsoft.com/office/drawing/2010/main" xmlns="" w="9525">
                 <a:solidFill>
                   <a:srgbClr val="000000"/>
                 </a:solidFill>
@@ -1645,7 +1647,7 @@
     </p:spTree>
     <p:extLst>
       <p:ext uri="{BB962C8B-B14F-4D97-AF65-F5344CB8AC3E}">
-        <p14:creationId xmlns:p14="http://schemas.microsoft.com/office/powerpoint/2010/main" val="2156181659"/>
+        <p14:creationId xmlns:p14="http://schemas.microsoft.com/office/powerpoint/2010/main" xmlns="" val="2156181659"/>
       </p:ext>
     </p:extLst>
   </p:cSld>
@@ -1812,7 +1814,7 @@
     </p:spTree>
     <p:extLst>
       <p:ext uri="{BB962C8B-B14F-4D97-AF65-F5344CB8AC3E}">
-        <p14:creationId xmlns:p14="http://schemas.microsoft.com/office/powerpoint/2010/main" val="83598666"/>
+        <p14:creationId xmlns:p14="http://schemas.microsoft.com/office/powerpoint/2010/main" xmlns="" val="83598666"/>
       </p:ext>
     </p:extLst>
   </p:cSld>
@@ -1856,7 +1858,7 @@
           <a:blip r:embed="rId8" cstate="print">
             <a:extLst>
               <a:ext uri="{28A0092B-C50C-407E-A947-70E740481C1C}">
-                <a14:useLocalDpi xmlns:a14="http://schemas.microsoft.com/office/drawing/2010/main" val="0"/>
+                <a14:useLocalDpi xmlns:a14="http://schemas.microsoft.com/office/drawing/2010/main" xmlns="" val="0"/>
               </a:ext>
             </a:extLst>
           </a:blip>
@@ -1879,14 +1881,14 @@
           </a:ln>
           <a:extLst>
             <a:ext uri="{909E8E84-426E-40DD-AFC4-6F175D3DCCD1}">
-              <a14:hiddenFill xmlns:a14="http://schemas.microsoft.com/office/drawing/2010/main">
+              <a14:hiddenFill xmlns:a14="http://schemas.microsoft.com/office/drawing/2010/main" xmlns="">
                 <a:solidFill>
                   <a:srgbClr val="FFFFFF"/>
                 </a:solidFill>
               </a14:hiddenFill>
             </a:ext>
             <a:ext uri="{91240B29-F687-4F45-9708-019B960494DF}">
-              <a14:hiddenLine xmlns:a14="http://schemas.microsoft.com/office/drawing/2010/main" w="9525">
+              <a14:hiddenLine xmlns:a14="http://schemas.microsoft.com/office/drawing/2010/main" xmlns="" w="9525">
                 <a:solidFill>
                   <a:srgbClr val="000000"/>
                 </a:solidFill>
@@ -1959,7 +1961,7 @@
           <a:blip r:embed="rId9" cstate="print">
             <a:extLst>
               <a:ext uri="{28A0092B-C50C-407E-A947-70E740481C1C}">
-                <a14:useLocalDpi xmlns:a14="http://schemas.microsoft.com/office/drawing/2010/main" val="0"/>
+                <a14:useLocalDpi xmlns:a14="http://schemas.microsoft.com/office/drawing/2010/main" xmlns="" val="0"/>
               </a:ext>
             </a:extLst>
           </a:blip>
@@ -1982,14 +1984,14 @@
           </a:ln>
           <a:extLst>
             <a:ext uri="{909E8E84-426E-40DD-AFC4-6F175D3DCCD1}">
-              <a14:hiddenFill xmlns:a14="http://schemas.microsoft.com/office/drawing/2010/main">
+              <a14:hiddenFill xmlns:a14="http://schemas.microsoft.com/office/drawing/2010/main" xmlns="">
                 <a:solidFill>
                   <a:srgbClr val="FFFFFF"/>
                 </a:solidFill>
               </a14:hiddenFill>
             </a:ext>
             <a:ext uri="{91240B29-F687-4F45-9708-019B960494DF}">
-              <a14:hiddenLine xmlns:a14="http://schemas.microsoft.com/office/drawing/2010/main" w="9525">
+              <a14:hiddenLine xmlns:a14="http://schemas.microsoft.com/office/drawing/2010/main" xmlns="" w="9525">
                 <a:solidFill>
                   <a:srgbClr val="000000"/>
                 </a:solidFill>
@@ -2553,14 +2555,14 @@
             </a:ln>
             <a:extLst>
               <a:ext uri="{909E8E84-426E-40DD-AFC4-6F175D3DCCD1}">
-                <a14:hiddenFill xmlns:a14="http://schemas.microsoft.com/office/drawing/2010/main">
+                <a14:hiddenFill xmlns:a14="http://schemas.microsoft.com/office/drawing/2010/main" xmlns="">
                   <a:solidFill>
                     <a:srgbClr val="FFFFFF"/>
                   </a:solidFill>
                 </a14:hiddenFill>
               </a:ext>
               <a:ext uri="{91240B29-F687-4F45-9708-019B960494DF}">
-                <a14:hiddenLine xmlns:a14="http://schemas.microsoft.com/office/drawing/2010/main" w="9525">
+                <a14:hiddenLine xmlns:a14="http://schemas.microsoft.com/office/drawing/2010/main" xmlns="" w="9525">
                   <a:solidFill>
                     <a:srgbClr val="000000"/>
                   </a:solidFill>
@@ -2710,14 +2712,14 @@
             </a:ln>
             <a:extLst>
               <a:ext uri="{909E8E84-426E-40DD-AFC4-6F175D3DCCD1}">
-                <a14:hiddenFill xmlns:a14="http://schemas.microsoft.com/office/drawing/2010/main">
+                <a14:hiddenFill xmlns:a14="http://schemas.microsoft.com/office/drawing/2010/main" xmlns="">
                   <a:solidFill>
                     <a:srgbClr val="FFFFFF"/>
                   </a:solidFill>
                 </a14:hiddenFill>
               </a:ext>
               <a:ext uri="{91240B29-F687-4F45-9708-019B960494DF}">
-                <a14:hiddenLine xmlns:a14="http://schemas.microsoft.com/office/drawing/2010/main" w="9525">
+                <a14:hiddenLine xmlns:a14="http://schemas.microsoft.com/office/drawing/2010/main" xmlns="" w="9525">
                   <a:solidFill>
                     <a:srgbClr val="000000"/>
                   </a:solidFill>
@@ -3087,7 +3089,7 @@
       </p:sp>
       <p:pic>
         <p:nvPicPr>
-          <p:cNvPr id="6" name="Imagem 5" descr="UCAGD01_0010_TelaPesquisaPorPaciente.png"/>
+          <p:cNvPr id="4" name="Imagem 3" descr="UCAGD01_0010_TelaPesquisaPorPaciente.png"/>
           <p:cNvPicPr>
             <a:picLocks noChangeAspect="1"/>
           </p:cNvPicPr>
@@ -3101,8 +3103,8 @@
         </p:blipFill>
         <p:spPr>
           <a:xfrm>
-            <a:off x="395536" y="1484784"/>
-            <a:ext cx="8526066" cy="4582165"/>
+            <a:off x="304204" y="1399891"/>
+            <a:ext cx="8535592" cy="4058217"/>
           </a:xfrm>
           <a:prstGeom prst="rect">
             <a:avLst/>
@@ -3510,14 +3512,14 @@
             </a:ln>
             <a:extLst>
               <a:ext uri="{909E8E84-426E-40DD-AFC4-6F175D3DCCD1}">
-                <a14:hiddenFill xmlns:a14="http://schemas.microsoft.com/office/drawing/2010/main">
+                <a14:hiddenFill xmlns:a14="http://schemas.microsoft.com/office/drawing/2010/main" xmlns="">
                   <a:solidFill>
                     <a:srgbClr val="FFFFFF"/>
                   </a:solidFill>
                 </a14:hiddenFill>
               </a:ext>
               <a:ext uri="{91240B29-F687-4F45-9708-019B960494DF}">
-                <a14:hiddenLine xmlns:a14="http://schemas.microsoft.com/office/drawing/2010/main" w="9525">
+                <a14:hiddenLine xmlns:a14="http://schemas.microsoft.com/office/drawing/2010/main" xmlns="" w="9525">
                   <a:solidFill>
                     <a:srgbClr val="000000"/>
                   </a:solidFill>
@@ -3667,14 +3669,14 @@
             </a:ln>
             <a:extLst>
               <a:ext uri="{909E8E84-426E-40DD-AFC4-6F175D3DCCD1}">
-                <a14:hiddenFill xmlns:a14="http://schemas.microsoft.com/office/drawing/2010/main">
+                <a14:hiddenFill xmlns:a14="http://schemas.microsoft.com/office/drawing/2010/main" xmlns="">
                   <a:solidFill>
                     <a:srgbClr val="FFFFFF"/>
                   </a:solidFill>
                 </a14:hiddenFill>
               </a:ext>
               <a:ext uri="{91240B29-F687-4F45-9708-019B960494DF}">
-                <a14:hiddenLine xmlns:a14="http://schemas.microsoft.com/office/drawing/2010/main" w="9525">
+                <a14:hiddenLine xmlns:a14="http://schemas.microsoft.com/office/drawing/2010/main" xmlns="" w="9525">
                   <a:solidFill>
                     <a:srgbClr val="000000"/>
                   </a:solidFill>
@@ -3919,7 +3921,7 @@
     </p:spTree>
     <p:extLst>
       <p:ext uri="{BB962C8B-B14F-4D97-AF65-F5344CB8AC3E}">
-        <p14:creationId xmlns:p14="http://schemas.microsoft.com/office/powerpoint/2010/main" val="3409322625"/>
+        <p14:creationId xmlns:p14="http://schemas.microsoft.com/office/powerpoint/2010/main" xmlns="" val="3409322625"/>
       </p:ext>
     </p:extLst>
   </p:cSld>
@@ -3954,7 +3956,7 @@
           <p:cNvPr id="2" name="Título 1">
             <a:extLst>
               <a:ext uri="{FF2B5EF4-FFF2-40B4-BE49-F238E27FC236}">
-                <a16:creationId xmlns:a16="http://schemas.microsoft.com/office/drawing/2014/main" id="{4420E5F6-C592-489E-8742-39113C67F28C}"/>
+                <a16:creationId xmlns:a16="http://schemas.microsoft.com/office/drawing/2014/main" xmlns="" id="{4420E5F6-C592-489E-8742-39113C67F28C}"/>
               </a:ext>
             </a:extLst>
           </p:cNvPr>
@@ -3982,7 +3984,7 @@
           <p:cNvPr id="3" name="Espaço Reservado para Conteúdo 2">
             <a:extLst>
               <a:ext uri="{FF2B5EF4-FFF2-40B4-BE49-F238E27FC236}">
-                <a16:creationId xmlns:a16="http://schemas.microsoft.com/office/drawing/2014/main" id="{FB12D05B-E47F-4BA3-B1A7-F1DCD4D8F90E}"/>
+                <a16:creationId xmlns:a16="http://schemas.microsoft.com/office/drawing/2014/main" xmlns="" id="{FB12D05B-E47F-4BA3-B1A7-F1DCD4D8F90E}"/>
               </a:ext>
             </a:extLst>
           </p:cNvPr>
@@ -4195,7 +4197,7 @@
     </p:spTree>
     <p:extLst>
       <p:ext uri="{BB962C8B-B14F-4D97-AF65-F5344CB8AC3E}">
-        <p14:creationId xmlns:p14="http://schemas.microsoft.com/office/powerpoint/2010/main" val="732095642"/>
+        <p14:creationId xmlns:p14="http://schemas.microsoft.com/office/powerpoint/2010/main" xmlns="" val="732095642"/>
       </p:ext>
     </p:extLst>
   </p:cSld>
@@ -4227,7 +4229,7 @@
           <p:cNvPr id="2" name="Título 1">
             <a:extLst>
               <a:ext uri="{FF2B5EF4-FFF2-40B4-BE49-F238E27FC236}">
-                <a16:creationId xmlns:a16="http://schemas.microsoft.com/office/drawing/2014/main" id="{BEBA4382-BFBE-49EA-B613-397871EFBC81}"/>
+                <a16:creationId xmlns:a16="http://schemas.microsoft.com/office/drawing/2014/main" xmlns="" id="{BEBA4382-BFBE-49EA-B613-397871EFBC81}"/>
               </a:ext>
             </a:extLst>
           </p:cNvPr>
@@ -4255,7 +4257,7 @@
           <p:cNvPr id="4" name="Picture 2">
             <a:extLst>
               <a:ext uri="{FF2B5EF4-FFF2-40B4-BE49-F238E27FC236}">
-                <a16:creationId xmlns:a16="http://schemas.microsoft.com/office/drawing/2014/main" id="{73C6ED76-2527-4DEA-B4E5-D39F619C62E1}"/>
+                <a16:creationId xmlns:a16="http://schemas.microsoft.com/office/drawing/2014/main" xmlns="" id="{73C6ED76-2527-4DEA-B4E5-D39F619C62E1}"/>
               </a:ext>
             </a:extLst>
           </p:cNvPr>
@@ -4267,10 +4269,10 @@
           </p:nvPr>
         </p:nvPicPr>
         <p:blipFill>
-          <a:blip r:embed="rId2">
+          <a:blip r:embed="rId2" cstate="print">
             <a:extLst>
               <a:ext uri="{28A0092B-C50C-407E-A947-70E740481C1C}">
-                <a14:useLocalDpi xmlns:a14="http://schemas.microsoft.com/office/drawing/2010/main" val="0"/>
+                <a14:useLocalDpi xmlns:a14="http://schemas.microsoft.com/office/drawing/2010/main" xmlns="" val="0"/>
               </a:ext>
             </a:extLst>
           </a:blip>
@@ -4293,14 +4295,14 @@
           </a:ln>
           <a:extLst>
             <a:ext uri="{909E8E84-426E-40DD-AFC4-6F175D3DCCD1}">
-              <a14:hiddenFill xmlns:a14="http://schemas.microsoft.com/office/drawing/2010/main">
+              <a14:hiddenFill xmlns:a14="http://schemas.microsoft.com/office/drawing/2010/main" xmlns="">
                 <a:solidFill>
                   <a:srgbClr val="FFFFFF"/>
                 </a:solidFill>
               </a14:hiddenFill>
             </a:ext>
             <a:ext uri="{91240B29-F687-4F45-9708-019B960494DF}">
-              <a14:hiddenLine xmlns:a14="http://schemas.microsoft.com/office/drawing/2010/main" w="9525">
+              <a14:hiddenLine xmlns:a14="http://schemas.microsoft.com/office/drawing/2010/main" xmlns="" w="9525">
                 <a:solidFill>
                   <a:srgbClr val="000000"/>
                 </a:solidFill>
@@ -4315,7 +4317,7 @@
     </p:spTree>
     <p:extLst>
       <p:ext uri="{BB962C8B-B14F-4D97-AF65-F5344CB8AC3E}">
-        <p14:creationId xmlns:p14="http://schemas.microsoft.com/office/powerpoint/2010/main" val="1528951847"/>
+        <p14:creationId xmlns:p14="http://schemas.microsoft.com/office/powerpoint/2010/main" xmlns="" val="1528951847"/>
       </p:ext>
     </p:extLst>
   </p:cSld>
@@ -4347,7 +4349,7 @@
           <p:cNvPr id="2" name="Título 1">
             <a:extLst>
               <a:ext uri="{FF2B5EF4-FFF2-40B4-BE49-F238E27FC236}">
-                <a16:creationId xmlns:a16="http://schemas.microsoft.com/office/drawing/2014/main" id="{4242F5FA-70CB-4D15-8FA2-0A8B9B2D9EE8}"/>
+                <a16:creationId xmlns:a16="http://schemas.microsoft.com/office/drawing/2014/main" xmlns="" id="{4242F5FA-70CB-4D15-8FA2-0A8B9B2D9EE8}"/>
               </a:ext>
             </a:extLst>
           </p:cNvPr>
@@ -4375,7 +4377,7 @@
           <p:cNvPr id="5" name="Espaço Reservado para Conteúdo 4">
             <a:extLst>
               <a:ext uri="{FF2B5EF4-FFF2-40B4-BE49-F238E27FC236}">
-                <a16:creationId xmlns:a16="http://schemas.microsoft.com/office/drawing/2014/main" id="{0EB6ED7E-6CFB-4E85-B7ED-4873840A1BE0}"/>
+                <a16:creationId xmlns:a16="http://schemas.microsoft.com/office/drawing/2014/main" xmlns="" id="{0EB6ED7E-6CFB-4E85-B7ED-4873840A1BE0}"/>
               </a:ext>
             </a:extLst>
           </p:cNvPr>
@@ -4387,10 +4389,10 @@
           </p:nvPr>
         </p:nvPicPr>
         <p:blipFill>
-          <a:blip r:embed="rId2">
+          <a:blip r:embed="rId2" cstate="print">
             <a:extLst>
               <a:ext uri="{28A0092B-C50C-407E-A947-70E740481C1C}">
-                <a14:useLocalDpi xmlns:a14="http://schemas.microsoft.com/office/drawing/2010/main" val="0"/>
+                <a14:useLocalDpi xmlns:a14="http://schemas.microsoft.com/office/drawing/2010/main" xmlns="" val="0"/>
               </a:ext>
             </a:extLst>
           </a:blip>
@@ -4408,7 +4410,7 @@
     </p:spTree>
     <p:extLst>
       <p:ext uri="{BB962C8B-B14F-4D97-AF65-F5344CB8AC3E}">
-        <p14:creationId xmlns:p14="http://schemas.microsoft.com/office/powerpoint/2010/main" val="3460844110"/>
+        <p14:creationId xmlns:p14="http://schemas.microsoft.com/office/powerpoint/2010/main" xmlns="" val="3460844110"/>
       </p:ext>
     </p:extLst>
   </p:cSld>
@@ -4440,7 +4442,7 @@
           <p:cNvPr id="2" name="Título 1">
             <a:extLst>
               <a:ext uri="{FF2B5EF4-FFF2-40B4-BE49-F238E27FC236}">
-                <a16:creationId xmlns:a16="http://schemas.microsoft.com/office/drawing/2014/main" id="{1258A6B5-29A2-40E3-9451-ECF7822CE513}"/>
+                <a16:creationId xmlns:a16="http://schemas.microsoft.com/office/drawing/2014/main" xmlns="" id="{1258A6B5-29A2-40E3-9451-ECF7822CE513}"/>
               </a:ext>
             </a:extLst>
           </p:cNvPr>
@@ -4468,7 +4470,7 @@
           <p:cNvPr id="5" name="Espaço Reservado para Conteúdo 4">
             <a:extLst>
               <a:ext uri="{FF2B5EF4-FFF2-40B4-BE49-F238E27FC236}">
-                <a16:creationId xmlns:a16="http://schemas.microsoft.com/office/drawing/2014/main" id="{B614B2BC-1672-4B4C-B1D9-8F6906444D11}"/>
+                <a16:creationId xmlns:a16="http://schemas.microsoft.com/office/drawing/2014/main" xmlns="" id="{B614B2BC-1672-4B4C-B1D9-8F6906444D11}"/>
               </a:ext>
             </a:extLst>
           </p:cNvPr>
@@ -4480,10 +4482,10 @@
           </p:nvPr>
         </p:nvPicPr>
         <p:blipFill>
-          <a:blip r:embed="rId2">
+          <a:blip r:embed="rId2" cstate="print">
             <a:extLst>
               <a:ext uri="{28A0092B-C50C-407E-A947-70E740481C1C}">
-                <a14:useLocalDpi xmlns:a14="http://schemas.microsoft.com/office/drawing/2010/main" val="0"/>
+                <a14:useLocalDpi xmlns:a14="http://schemas.microsoft.com/office/drawing/2010/main" xmlns="" val="0"/>
               </a:ext>
             </a:extLst>
           </a:blip>
@@ -4501,7 +4503,7 @@
     </p:spTree>
     <p:extLst>
       <p:ext uri="{BB962C8B-B14F-4D97-AF65-F5344CB8AC3E}">
-        <p14:creationId xmlns:p14="http://schemas.microsoft.com/office/powerpoint/2010/main" val="255138212"/>
+        <p14:creationId xmlns:p14="http://schemas.microsoft.com/office/powerpoint/2010/main" xmlns="" val="255138212"/>
       </p:ext>
     </p:extLst>
   </p:cSld>
@@ -4533,7 +4535,7 @@
           <p:cNvPr id="2" name="Título 1">
             <a:extLst>
               <a:ext uri="{FF2B5EF4-FFF2-40B4-BE49-F238E27FC236}">
-                <a16:creationId xmlns:a16="http://schemas.microsoft.com/office/drawing/2014/main" id="{4DBEE726-2AAB-4969-973C-8C26FE82FEF2}"/>
+                <a16:creationId xmlns:a16="http://schemas.microsoft.com/office/drawing/2014/main" xmlns="" id="{4DBEE726-2AAB-4969-973C-8C26FE82FEF2}"/>
               </a:ext>
             </a:extLst>
           </p:cNvPr>
@@ -4561,7 +4563,7 @@
           <p:cNvPr id="5" name="Espaço Reservado para Conteúdo 4">
             <a:extLst>
               <a:ext uri="{FF2B5EF4-FFF2-40B4-BE49-F238E27FC236}">
-                <a16:creationId xmlns:a16="http://schemas.microsoft.com/office/drawing/2014/main" id="{D0E0BD5E-9A99-41F6-AEAA-D122187C4B06}"/>
+                <a16:creationId xmlns:a16="http://schemas.microsoft.com/office/drawing/2014/main" xmlns="" id="{D0E0BD5E-9A99-41F6-AEAA-D122187C4B06}"/>
               </a:ext>
             </a:extLst>
           </p:cNvPr>
@@ -4573,10 +4575,10 @@
           </p:nvPr>
         </p:nvPicPr>
         <p:blipFill>
-          <a:blip r:embed="rId2">
+          <a:blip r:embed="rId2" cstate="print">
             <a:extLst>
               <a:ext uri="{28A0092B-C50C-407E-A947-70E740481C1C}">
-                <a14:useLocalDpi xmlns:a14="http://schemas.microsoft.com/office/drawing/2010/main" val="0"/>
+                <a14:useLocalDpi xmlns:a14="http://schemas.microsoft.com/office/drawing/2010/main" xmlns="" val="0"/>
               </a:ext>
             </a:extLst>
           </a:blip>
@@ -4594,7 +4596,7 @@
     </p:spTree>
     <p:extLst>
       <p:ext uri="{BB962C8B-B14F-4D97-AF65-F5344CB8AC3E}">
-        <p14:creationId xmlns:p14="http://schemas.microsoft.com/office/powerpoint/2010/main" val="2944428277"/>
+        <p14:creationId xmlns:p14="http://schemas.microsoft.com/office/powerpoint/2010/main" xmlns="" val="2944428277"/>
       </p:ext>
     </p:extLst>
   </p:cSld>
@@ -4651,7 +4653,7 @@
           <p:cNvPr id="5" name="Picture 4">
             <a:extLst>
               <a:ext uri="{FF2B5EF4-FFF2-40B4-BE49-F238E27FC236}">
-                <a16:creationId xmlns:a16="http://schemas.microsoft.com/office/drawing/2014/main" id="{47BB9FD5-5FAB-47BE-936F-4BD6B4C3D29C}"/>
+                <a16:creationId xmlns:a16="http://schemas.microsoft.com/office/drawing/2014/main" xmlns="" id="{47BB9FD5-5FAB-47BE-936F-4BD6B4C3D29C}"/>
               </a:ext>
             </a:extLst>
           </p:cNvPr>
@@ -4661,7 +4663,7 @@
           <p:nvPr/>
         </p:nvPicPr>
         <p:blipFill>
-          <a:blip r:embed="rId2"/>
+          <a:blip r:embed="rId2" cstate="print"/>
           <a:stretch>
             <a:fillRect/>
           </a:stretch>
@@ -4777,14 +4779,14 @@
             </a:ln>
             <a:extLst>
               <a:ext uri="{909E8E84-426E-40DD-AFC4-6F175D3DCCD1}">
-                <a14:hiddenFill xmlns:a14="http://schemas.microsoft.com/office/drawing/2010/main">
+                <a14:hiddenFill xmlns:a14="http://schemas.microsoft.com/office/drawing/2010/main" xmlns="">
                   <a:solidFill>
                     <a:srgbClr val="FFFFFF"/>
                   </a:solidFill>
                 </a14:hiddenFill>
               </a:ext>
               <a:ext uri="{91240B29-F687-4F45-9708-019B960494DF}">
-                <a14:hiddenLine xmlns:a14="http://schemas.microsoft.com/office/drawing/2010/main" w="9525">
+                <a14:hiddenLine xmlns:a14="http://schemas.microsoft.com/office/drawing/2010/main" xmlns="" w="9525">
                   <a:solidFill>
                     <a:srgbClr val="000000"/>
                   </a:solidFill>
@@ -4934,14 +4936,14 @@
             </a:ln>
             <a:extLst>
               <a:ext uri="{909E8E84-426E-40DD-AFC4-6F175D3DCCD1}">
-                <a14:hiddenFill xmlns:a14="http://schemas.microsoft.com/office/drawing/2010/main">
+                <a14:hiddenFill xmlns:a14="http://schemas.microsoft.com/office/drawing/2010/main" xmlns="">
                   <a:solidFill>
                     <a:srgbClr val="FFFFFF"/>
                   </a:solidFill>
                 </a14:hiddenFill>
               </a:ext>
               <a:ext uri="{91240B29-F687-4F45-9708-019B960494DF}">
-                <a14:hiddenLine xmlns:a14="http://schemas.microsoft.com/office/drawing/2010/main" w="9525">
+                <a14:hiddenLine xmlns:a14="http://schemas.microsoft.com/office/drawing/2010/main" xmlns="" w="9525">
                   <a:solidFill>
                     <a:srgbClr val="000000"/>
                   </a:solidFill>
@@ -5186,7 +5188,7 @@
     </p:spTree>
     <p:extLst>
       <p:ext uri="{BB962C8B-B14F-4D97-AF65-F5344CB8AC3E}">
-        <p14:creationId xmlns:p14="http://schemas.microsoft.com/office/powerpoint/2010/main" val="2461302196"/>
+        <p14:creationId xmlns:p14="http://schemas.microsoft.com/office/powerpoint/2010/main" xmlns="" val="2461302196"/>
       </p:ext>
     </p:extLst>
   </p:cSld>
@@ -5258,14 +5260,14 @@
           </a:xfrm>
           <a:extLst>
             <a:ext uri="{909E8E84-426E-40DD-AFC4-6F175D3DCCD1}">
-              <a14:hiddenFill xmlns:a14="http://schemas.microsoft.com/office/drawing/2010/main">
+              <a14:hiddenFill xmlns:a14="http://schemas.microsoft.com/office/drawing/2010/main" xmlns="">
                 <a:solidFill>
                   <a:srgbClr val="FFFFFF"/>
                 </a:solidFill>
               </a14:hiddenFill>
             </a:ext>
             <a:ext uri="{91240B29-F687-4F45-9708-019B960494DF}">
-              <a14:hiddenLine xmlns:a14="http://schemas.microsoft.com/office/drawing/2010/main" w="9525">
+              <a14:hiddenLine xmlns:a14="http://schemas.microsoft.com/office/drawing/2010/main" xmlns="" w="9525">
                 <a:solidFill>
                   <a:srgbClr val="000000"/>
                 </a:solidFill>
@@ -5413,7 +5415,7 @@
     </p:spTree>
     <p:extLst>
       <p:ext uri="{BB962C8B-B14F-4D97-AF65-F5344CB8AC3E}">
-        <p14:creationId xmlns:p14="http://schemas.microsoft.com/office/powerpoint/2010/main" val="1166103754"/>
+        <p14:creationId xmlns:p14="http://schemas.microsoft.com/office/powerpoint/2010/main" xmlns="" val="1166103754"/>
       </p:ext>
     </p:extLst>
   </p:cSld>
@@ -5485,14 +5487,14 @@
           </a:xfrm>
           <a:extLst>
             <a:ext uri="{909E8E84-426E-40DD-AFC4-6F175D3DCCD1}">
-              <a14:hiddenFill xmlns:a14="http://schemas.microsoft.com/office/drawing/2010/main">
+              <a14:hiddenFill xmlns:a14="http://schemas.microsoft.com/office/drawing/2010/main" xmlns="">
                 <a:solidFill>
                   <a:srgbClr val="FFFFFF"/>
                 </a:solidFill>
               </a14:hiddenFill>
             </a:ext>
             <a:ext uri="{91240B29-F687-4F45-9708-019B960494DF}">
-              <a14:hiddenLine xmlns:a14="http://schemas.microsoft.com/office/drawing/2010/main" w="9525">
+              <a14:hiddenLine xmlns:a14="http://schemas.microsoft.com/office/drawing/2010/main" xmlns="" w="9525">
                 <a:solidFill>
                   <a:srgbClr val="000000"/>
                 </a:solidFill>
@@ -5537,10 +5539,10 @@
           <p:nvPr/>
         </p:nvPicPr>
         <p:blipFill>
-          <a:blip r:embed="rId2">
+          <a:blip r:embed="rId2" cstate="print">
             <a:extLst>
               <a:ext uri="{28A0092B-C50C-407E-A947-70E740481C1C}">
-                <a14:useLocalDpi xmlns:a14="http://schemas.microsoft.com/office/drawing/2010/main" val="0"/>
+                <a14:useLocalDpi xmlns:a14="http://schemas.microsoft.com/office/drawing/2010/main" xmlns="" val="0"/>
               </a:ext>
             </a:extLst>
           </a:blip>
@@ -5561,7 +5563,7 @@
     </p:spTree>
     <p:extLst>
       <p:ext uri="{BB962C8B-B14F-4D97-AF65-F5344CB8AC3E}">
-        <p14:creationId xmlns:p14="http://schemas.microsoft.com/office/powerpoint/2010/main" val="4234705847"/>
+        <p14:creationId xmlns:p14="http://schemas.microsoft.com/office/powerpoint/2010/main" xmlns="" val="4234705847"/>
       </p:ext>
     </p:extLst>
   </p:cSld>
@@ -5633,14 +5635,14 @@
           </a:xfrm>
           <a:extLst>
             <a:ext uri="{909E8E84-426E-40DD-AFC4-6F175D3DCCD1}">
-              <a14:hiddenFill xmlns:a14="http://schemas.microsoft.com/office/drawing/2010/main">
+              <a14:hiddenFill xmlns:a14="http://schemas.microsoft.com/office/drawing/2010/main" xmlns="">
                 <a:solidFill>
                   <a:srgbClr val="FFFFFF"/>
                 </a:solidFill>
               </a14:hiddenFill>
             </a:ext>
             <a:ext uri="{91240B29-F687-4F45-9708-019B960494DF}">
-              <a14:hiddenLine xmlns:a14="http://schemas.microsoft.com/office/drawing/2010/main" w="9525">
+              <a14:hiddenLine xmlns:a14="http://schemas.microsoft.com/office/drawing/2010/main" xmlns="" w="9525">
                 <a:solidFill>
                   <a:srgbClr val="000000"/>
                 </a:solidFill>
@@ -5685,10 +5687,10 @@
           <p:nvPr/>
         </p:nvPicPr>
         <p:blipFill>
-          <a:blip r:embed="rId2">
+          <a:blip r:embed="rId2" cstate="print">
             <a:extLst>
               <a:ext uri="{28A0092B-C50C-407E-A947-70E740481C1C}">
-                <a14:useLocalDpi xmlns:a14="http://schemas.microsoft.com/office/drawing/2010/main" val="0"/>
+                <a14:useLocalDpi xmlns:a14="http://schemas.microsoft.com/office/drawing/2010/main" xmlns="" val="0"/>
               </a:ext>
             </a:extLst>
           </a:blip>
@@ -5709,7 +5711,7 @@
     </p:spTree>
     <p:extLst>
       <p:ext uri="{BB962C8B-B14F-4D97-AF65-F5344CB8AC3E}">
-        <p14:creationId xmlns:p14="http://schemas.microsoft.com/office/powerpoint/2010/main" val="3817239344"/>
+        <p14:creationId xmlns:p14="http://schemas.microsoft.com/office/powerpoint/2010/main" xmlns="" val="3817239344"/>
       </p:ext>
     </p:extLst>
   </p:cSld>
@@ -5781,14 +5783,14 @@
           </a:xfrm>
           <a:extLst>
             <a:ext uri="{909E8E84-426E-40DD-AFC4-6F175D3DCCD1}">
-              <a14:hiddenFill xmlns:a14="http://schemas.microsoft.com/office/drawing/2010/main">
+              <a14:hiddenFill xmlns:a14="http://schemas.microsoft.com/office/drawing/2010/main" xmlns="">
                 <a:solidFill>
                   <a:srgbClr val="FFFFFF"/>
                 </a:solidFill>
               </a14:hiddenFill>
             </a:ext>
             <a:ext uri="{91240B29-F687-4F45-9708-019B960494DF}">
-              <a14:hiddenLine xmlns:a14="http://schemas.microsoft.com/office/drawing/2010/main" w="9525">
+              <a14:hiddenLine xmlns:a14="http://schemas.microsoft.com/office/drawing/2010/main" xmlns="" w="9525">
                 <a:solidFill>
                   <a:srgbClr val="000000"/>
                 </a:solidFill>
@@ -5833,10 +5835,10 @@
           <p:nvPr/>
         </p:nvPicPr>
         <p:blipFill>
-          <a:blip r:embed="rId2">
+          <a:blip r:embed="rId2" cstate="print">
             <a:extLst>
               <a:ext uri="{28A0092B-C50C-407E-A947-70E740481C1C}">
-                <a14:useLocalDpi xmlns:a14="http://schemas.microsoft.com/office/drawing/2010/main" val="0"/>
+                <a14:useLocalDpi xmlns:a14="http://schemas.microsoft.com/office/drawing/2010/main" xmlns="" val="0"/>
               </a:ext>
             </a:extLst>
           </a:blip>
@@ -5857,7 +5859,7 @@
     </p:spTree>
     <p:extLst>
       <p:ext uri="{BB962C8B-B14F-4D97-AF65-F5344CB8AC3E}">
-        <p14:creationId xmlns:p14="http://schemas.microsoft.com/office/powerpoint/2010/main" val="3523015254"/>
+        <p14:creationId xmlns:p14="http://schemas.microsoft.com/office/powerpoint/2010/main" xmlns="" val="3523015254"/>
       </p:ext>
     </p:extLst>
   </p:cSld>
@@ -5929,14 +5931,14 @@
           </a:xfrm>
           <a:extLst>
             <a:ext uri="{909E8E84-426E-40DD-AFC4-6F175D3DCCD1}">
-              <a14:hiddenFill xmlns:a14="http://schemas.microsoft.com/office/drawing/2010/main">
+              <a14:hiddenFill xmlns:a14="http://schemas.microsoft.com/office/drawing/2010/main" xmlns="">
                 <a:solidFill>
                   <a:srgbClr val="FFFFFF"/>
                 </a:solidFill>
               </a14:hiddenFill>
             </a:ext>
             <a:ext uri="{91240B29-F687-4F45-9708-019B960494DF}">
-              <a14:hiddenLine xmlns:a14="http://schemas.microsoft.com/office/drawing/2010/main" w="9525">
+              <a14:hiddenLine xmlns:a14="http://schemas.microsoft.com/office/drawing/2010/main" xmlns="" w="9525">
                 <a:solidFill>
                   <a:srgbClr val="000000"/>
                 </a:solidFill>
@@ -5981,10 +5983,10 @@
           <p:nvPr/>
         </p:nvPicPr>
         <p:blipFill>
-          <a:blip r:embed="rId2">
+          <a:blip r:embed="rId2" cstate="print">
             <a:extLst>
               <a:ext uri="{28A0092B-C50C-407E-A947-70E740481C1C}">
-                <a14:useLocalDpi xmlns:a14="http://schemas.microsoft.com/office/drawing/2010/main" val="0"/>
+                <a14:useLocalDpi xmlns:a14="http://schemas.microsoft.com/office/drawing/2010/main" xmlns="" val="0"/>
               </a:ext>
             </a:extLst>
           </a:blip>
@@ -6005,7 +6007,7 @@
     </p:spTree>
     <p:extLst>
       <p:ext uri="{BB962C8B-B14F-4D97-AF65-F5344CB8AC3E}">
-        <p14:creationId xmlns:p14="http://schemas.microsoft.com/office/powerpoint/2010/main" val="1220430636"/>
+        <p14:creationId xmlns:p14="http://schemas.microsoft.com/office/powerpoint/2010/main" xmlns="" val="1220430636"/>
       </p:ext>
     </p:extLst>
   </p:cSld>
@@ -6108,14 +6110,14 @@
             </a:ln>
             <a:extLst>
               <a:ext uri="{909E8E84-426E-40DD-AFC4-6F175D3DCCD1}">
-                <a14:hiddenFill xmlns:a14="http://schemas.microsoft.com/office/drawing/2010/main">
+                <a14:hiddenFill xmlns:a14="http://schemas.microsoft.com/office/drawing/2010/main" xmlns="">
                   <a:solidFill>
                     <a:srgbClr val="FFFFFF"/>
                   </a:solidFill>
                 </a14:hiddenFill>
               </a:ext>
               <a:ext uri="{91240B29-F687-4F45-9708-019B960494DF}">
-                <a14:hiddenLine xmlns:a14="http://schemas.microsoft.com/office/drawing/2010/main" w="9525">
+                <a14:hiddenLine xmlns:a14="http://schemas.microsoft.com/office/drawing/2010/main" xmlns="" w="9525">
                   <a:solidFill>
                     <a:srgbClr val="000000"/>
                   </a:solidFill>
@@ -6265,14 +6267,14 @@
             </a:ln>
             <a:extLst>
               <a:ext uri="{909E8E84-426E-40DD-AFC4-6F175D3DCCD1}">
-                <a14:hiddenFill xmlns:a14="http://schemas.microsoft.com/office/drawing/2010/main">
+                <a14:hiddenFill xmlns:a14="http://schemas.microsoft.com/office/drawing/2010/main" xmlns="">
                   <a:solidFill>
                     <a:srgbClr val="FFFFFF"/>
                   </a:solidFill>
                 </a14:hiddenFill>
               </a:ext>
               <a:ext uri="{91240B29-F687-4F45-9708-019B960494DF}">
-                <a14:hiddenLine xmlns:a14="http://schemas.microsoft.com/office/drawing/2010/main" w="9525">
+                <a14:hiddenLine xmlns:a14="http://schemas.microsoft.com/office/drawing/2010/main" xmlns="" w="9525">
                   <a:solidFill>
                     <a:srgbClr val="000000"/>
                   </a:solidFill>
@@ -6517,7 +6519,7 @@
     </p:spTree>
     <p:extLst>
       <p:ext uri="{BB962C8B-B14F-4D97-AF65-F5344CB8AC3E}">
-        <p14:creationId xmlns:p14="http://schemas.microsoft.com/office/powerpoint/2010/main" val="681014556"/>
+        <p14:creationId xmlns:p14="http://schemas.microsoft.com/office/powerpoint/2010/main" xmlns="" val="681014556"/>
       </p:ext>
     </p:extLst>
   </p:cSld>
@@ -6723,7 +6725,7 @@
     </p:spTree>
     <p:extLst>
       <p:ext uri="{BB962C8B-B14F-4D97-AF65-F5344CB8AC3E}">
-        <p14:creationId xmlns:p14="http://schemas.microsoft.com/office/powerpoint/2010/main" val="3812644496"/>
+        <p14:creationId xmlns:p14="http://schemas.microsoft.com/office/powerpoint/2010/main" xmlns="" val="3812644496"/>
       </p:ext>
     </p:extLst>
   </p:cSld>
@@ -6759,10 +6761,10 @@
           <p:nvPr/>
         </p:nvPicPr>
         <p:blipFill>
-          <a:blip r:embed="rId2">
+          <a:blip r:embed="rId2" cstate="print">
             <a:extLst>
               <a:ext uri="{28A0092B-C50C-407E-A947-70E740481C1C}">
-                <a14:useLocalDpi xmlns:a14="http://schemas.microsoft.com/office/drawing/2010/main" val="0"/>
+                <a14:useLocalDpi xmlns:a14="http://schemas.microsoft.com/office/drawing/2010/main" xmlns="" val="0"/>
               </a:ext>
             </a:extLst>
           </a:blip>
@@ -6967,7 +6969,7 @@
     </p:spTree>
     <p:extLst>
       <p:ext uri="{BB962C8B-B14F-4D97-AF65-F5344CB8AC3E}">
-        <p14:creationId xmlns:p14="http://schemas.microsoft.com/office/powerpoint/2010/main" val="1256551592"/>
+        <p14:creationId xmlns:p14="http://schemas.microsoft.com/office/powerpoint/2010/main" xmlns="" val="1256551592"/>
       </p:ext>
     </p:extLst>
   </p:cSld>
@@ -7187,10 +7189,10 @@
           <p:nvPr/>
         </p:nvPicPr>
         <p:blipFill>
-          <a:blip r:embed="rId2">
+          <a:blip r:embed="rId2" cstate="print">
             <a:extLst>
               <a:ext uri="{28A0092B-C50C-407E-A947-70E740481C1C}">
-                <a14:useLocalDpi xmlns:a14="http://schemas.microsoft.com/office/drawing/2010/main" val="0"/>
+                <a14:useLocalDpi xmlns:a14="http://schemas.microsoft.com/office/drawing/2010/main" xmlns="" val="0"/>
               </a:ext>
             </a:extLst>
           </a:blip>
@@ -7211,7 +7213,7 @@
     </p:spTree>
     <p:extLst>
       <p:ext uri="{BB962C8B-B14F-4D97-AF65-F5344CB8AC3E}">
-        <p14:creationId xmlns:p14="http://schemas.microsoft.com/office/powerpoint/2010/main" val="3402891464"/>
+        <p14:creationId xmlns:p14="http://schemas.microsoft.com/office/powerpoint/2010/main" xmlns="" val="3402891464"/>
       </p:ext>
     </p:extLst>
   </p:cSld>
@@ -7268,7 +7270,7 @@
           <p:cNvPr id="2" name="Picture 1">
             <a:extLst>
               <a:ext uri="{FF2B5EF4-FFF2-40B4-BE49-F238E27FC236}">
-                <a16:creationId xmlns:a16="http://schemas.microsoft.com/office/drawing/2014/main" id="{7394DCF1-64AE-4F2C-AE84-F0B1DDB08AE1}"/>
+                <a16:creationId xmlns:a16="http://schemas.microsoft.com/office/drawing/2014/main" xmlns="" id="{7394DCF1-64AE-4F2C-AE84-F0B1DDB08AE1}"/>
               </a:ext>
             </a:extLst>
           </p:cNvPr>
@@ -7278,7 +7280,7 @@
           <p:nvPr/>
         </p:nvPicPr>
         <p:blipFill>
-          <a:blip r:embed="rId2"/>
+          <a:blip r:embed="rId2" cstate="print"/>
           <a:stretch>
             <a:fillRect/>
           </a:stretch>
@@ -7514,10 +7516,10 @@
           <p:nvPr/>
         </p:nvPicPr>
         <p:blipFill>
-          <a:blip r:embed="rId2">
+          <a:blip r:embed="rId2" cstate="print">
             <a:extLst>
               <a:ext uri="{28A0092B-C50C-407E-A947-70E740481C1C}">
-                <a14:useLocalDpi xmlns:a14="http://schemas.microsoft.com/office/drawing/2010/main" val="0"/>
+                <a14:useLocalDpi xmlns:a14="http://schemas.microsoft.com/office/drawing/2010/main" xmlns="" val="0"/>
               </a:ext>
             </a:extLst>
           </a:blip>
@@ -7538,7 +7540,7 @@
     </p:spTree>
     <p:extLst>
       <p:ext uri="{BB962C8B-B14F-4D97-AF65-F5344CB8AC3E}">
-        <p14:creationId xmlns:p14="http://schemas.microsoft.com/office/powerpoint/2010/main" val="2843391693"/>
+        <p14:creationId xmlns:p14="http://schemas.microsoft.com/office/powerpoint/2010/main" xmlns="" val="2843391693"/>
       </p:ext>
     </p:extLst>
   </p:cSld>
@@ -7758,10 +7760,10 @@
           <p:nvPr/>
         </p:nvPicPr>
         <p:blipFill>
-          <a:blip r:embed="rId2">
+          <a:blip r:embed="rId2" cstate="print">
             <a:extLst>
               <a:ext uri="{28A0092B-C50C-407E-A947-70E740481C1C}">
-                <a14:useLocalDpi xmlns:a14="http://schemas.microsoft.com/office/drawing/2010/main" val="0"/>
+                <a14:useLocalDpi xmlns:a14="http://schemas.microsoft.com/office/drawing/2010/main" xmlns="" val="0"/>
               </a:ext>
             </a:extLst>
           </a:blip>
@@ -7782,7 +7784,7 @@
     </p:spTree>
     <p:extLst>
       <p:ext uri="{BB962C8B-B14F-4D97-AF65-F5344CB8AC3E}">
-        <p14:creationId xmlns:p14="http://schemas.microsoft.com/office/powerpoint/2010/main" val="3776007642"/>
+        <p14:creationId xmlns:p14="http://schemas.microsoft.com/office/powerpoint/2010/main" xmlns="" val="3776007642"/>
       </p:ext>
     </p:extLst>
   </p:cSld>
@@ -8002,10 +8004,10 @@
           <p:nvPr/>
         </p:nvPicPr>
         <p:blipFill>
-          <a:blip r:embed="rId2">
+          <a:blip r:embed="rId2" cstate="print">
             <a:extLst>
               <a:ext uri="{28A0092B-C50C-407E-A947-70E740481C1C}">
-                <a14:useLocalDpi xmlns:a14="http://schemas.microsoft.com/office/drawing/2010/main" val="0"/>
+                <a14:useLocalDpi xmlns:a14="http://schemas.microsoft.com/office/drawing/2010/main" xmlns="" val="0"/>
               </a:ext>
             </a:extLst>
           </a:blip>
@@ -8026,7 +8028,7 @@
     </p:spTree>
     <p:extLst>
       <p:ext uri="{BB962C8B-B14F-4D97-AF65-F5344CB8AC3E}">
-        <p14:creationId xmlns:p14="http://schemas.microsoft.com/office/powerpoint/2010/main" val="295618873"/>
+        <p14:creationId xmlns:p14="http://schemas.microsoft.com/office/powerpoint/2010/main" xmlns="" val="295618873"/>
       </p:ext>
     </p:extLst>
   </p:cSld>
@@ -8126,14 +8128,14 @@
             </a:ln>
             <a:extLst>
               <a:ext uri="{909E8E84-426E-40DD-AFC4-6F175D3DCCD1}">
-                <a14:hiddenFill xmlns:a14="http://schemas.microsoft.com/office/drawing/2010/main">
+                <a14:hiddenFill xmlns:a14="http://schemas.microsoft.com/office/drawing/2010/main" xmlns="">
                   <a:solidFill>
                     <a:srgbClr val="FFFFFF"/>
                   </a:solidFill>
                 </a14:hiddenFill>
               </a:ext>
               <a:ext uri="{91240B29-F687-4F45-9708-019B960494DF}">
-                <a14:hiddenLine xmlns:a14="http://schemas.microsoft.com/office/drawing/2010/main" w="9525">
+                <a14:hiddenLine xmlns:a14="http://schemas.microsoft.com/office/drawing/2010/main" xmlns="" w="9525">
                   <a:solidFill>
                     <a:srgbClr val="000000"/>
                   </a:solidFill>
@@ -8283,14 +8285,14 @@
             </a:ln>
             <a:extLst>
               <a:ext uri="{909E8E84-426E-40DD-AFC4-6F175D3DCCD1}">
-                <a14:hiddenFill xmlns:a14="http://schemas.microsoft.com/office/drawing/2010/main">
+                <a14:hiddenFill xmlns:a14="http://schemas.microsoft.com/office/drawing/2010/main" xmlns="">
                   <a:solidFill>
                     <a:srgbClr val="FFFFFF"/>
                   </a:solidFill>
                 </a14:hiddenFill>
               </a:ext>
               <a:ext uri="{91240B29-F687-4F45-9708-019B960494DF}">
-                <a14:hiddenLine xmlns:a14="http://schemas.microsoft.com/office/drawing/2010/main" w="9525">
+                <a14:hiddenLine xmlns:a14="http://schemas.microsoft.com/office/drawing/2010/main" xmlns="" w="9525">
                   <a:solidFill>
                     <a:srgbClr val="000000"/>
                   </a:solidFill>
@@ -8590,7 +8592,7 @@
           <p:cNvPr id="3" name="Picture 2">
             <a:extLst>
               <a:ext uri="{FF2B5EF4-FFF2-40B4-BE49-F238E27FC236}">
-                <a16:creationId xmlns:a16="http://schemas.microsoft.com/office/drawing/2014/main" id="{1488CEA1-615B-4D4C-A130-F1FD32F916CA}"/>
+                <a16:creationId xmlns:a16="http://schemas.microsoft.com/office/drawing/2014/main" xmlns="" id="{1488CEA1-615B-4D4C-A130-F1FD32F916CA}"/>
               </a:ext>
             </a:extLst>
           </p:cNvPr>
@@ -8600,10 +8602,10 @@
           <p:nvPr/>
         </p:nvPicPr>
         <p:blipFill>
-          <a:blip r:embed="rId2">
+          <a:blip r:embed="rId2" cstate="print">
             <a:extLst>
               <a:ext uri="{28A0092B-C50C-407E-A947-70E740481C1C}">
-                <a14:useLocalDpi xmlns:a14="http://schemas.microsoft.com/office/drawing/2010/main" val="0"/>
+                <a14:useLocalDpi xmlns:a14="http://schemas.microsoft.com/office/drawing/2010/main" xmlns="" val="0"/>
               </a:ext>
             </a:extLst>
           </a:blip>
@@ -8679,7 +8681,7 @@
           <p:cNvPr id="3074" name="Picture 2">
             <a:extLst>
               <a:ext uri="{FF2B5EF4-FFF2-40B4-BE49-F238E27FC236}">
-                <a16:creationId xmlns:a16="http://schemas.microsoft.com/office/drawing/2014/main" id="{8E1DF024-FFFB-4CD4-9A0E-7DFABA40FF83}"/>
+                <a16:creationId xmlns:a16="http://schemas.microsoft.com/office/drawing/2014/main" xmlns="" id="{8E1DF024-FFFB-4CD4-9A0E-7DFABA40FF83}"/>
               </a:ext>
             </a:extLst>
           </p:cNvPr>
@@ -8692,7 +8694,7 @@
           <a:blip r:embed="rId2" cstate="print">
             <a:extLst>
               <a:ext uri="{28A0092B-C50C-407E-A947-70E740481C1C}">
-                <a14:useLocalDpi xmlns:a14="http://schemas.microsoft.com/office/drawing/2010/main" val="0"/>
+                <a14:useLocalDpi xmlns:a14="http://schemas.microsoft.com/office/drawing/2010/main" xmlns="" val="0"/>
               </a:ext>
             </a:extLst>
           </a:blip>
@@ -8715,14 +8717,14 @@
           </a:ln>
           <a:extLst>
             <a:ext uri="{909E8E84-426E-40DD-AFC4-6F175D3DCCD1}">
-              <a14:hiddenFill xmlns:a14="http://schemas.microsoft.com/office/drawing/2010/main">
+              <a14:hiddenFill xmlns:a14="http://schemas.microsoft.com/office/drawing/2010/main" xmlns="">
                 <a:solidFill>
                   <a:srgbClr val="FFFFFF"/>
                 </a:solidFill>
               </a14:hiddenFill>
             </a:ext>
             <a:ext uri="{91240B29-F687-4F45-9708-019B960494DF}">
-              <a14:hiddenLine xmlns:a14="http://schemas.microsoft.com/office/drawing/2010/main" w="9525">
+              <a14:hiddenLine xmlns:a14="http://schemas.microsoft.com/office/drawing/2010/main" xmlns="" w="9525">
                 <a:solidFill>
                   <a:srgbClr val="000000"/>
                 </a:solidFill>
@@ -8792,7 +8794,7 @@
           <p:cNvPr id="4098" name="Picture 2">
             <a:extLst>
               <a:ext uri="{FF2B5EF4-FFF2-40B4-BE49-F238E27FC236}">
-                <a16:creationId xmlns:a16="http://schemas.microsoft.com/office/drawing/2014/main" id="{E78D3342-3CB1-4010-9B6B-88EB7ABCFE33}"/>
+                <a16:creationId xmlns:a16="http://schemas.microsoft.com/office/drawing/2014/main" xmlns="" id="{E78D3342-3CB1-4010-9B6B-88EB7ABCFE33}"/>
               </a:ext>
             </a:extLst>
           </p:cNvPr>
@@ -8805,7 +8807,7 @@
           <a:blip r:embed="rId2" cstate="print">
             <a:extLst>
               <a:ext uri="{28A0092B-C50C-407E-A947-70E740481C1C}">
-                <a14:useLocalDpi xmlns:a14="http://schemas.microsoft.com/office/drawing/2010/main" val="0"/>
+                <a14:useLocalDpi xmlns:a14="http://schemas.microsoft.com/office/drawing/2010/main" xmlns="" val="0"/>
               </a:ext>
             </a:extLst>
           </a:blip>
@@ -8828,14 +8830,14 @@
           </a:ln>
           <a:extLst>
             <a:ext uri="{909E8E84-426E-40DD-AFC4-6F175D3DCCD1}">
-              <a14:hiddenFill xmlns:a14="http://schemas.microsoft.com/office/drawing/2010/main">
+              <a14:hiddenFill xmlns:a14="http://schemas.microsoft.com/office/drawing/2010/main" xmlns="">
                 <a:solidFill>
                   <a:srgbClr val="FFFFFF"/>
                 </a:solidFill>
               </a14:hiddenFill>
             </a:ext>
             <a:ext uri="{91240B29-F687-4F45-9708-019B960494DF}">
-              <a14:hiddenLine xmlns:a14="http://schemas.microsoft.com/office/drawing/2010/main" w="9525">
+              <a14:hiddenLine xmlns:a14="http://schemas.microsoft.com/office/drawing/2010/main" xmlns="" w="9525">
                 <a:solidFill>
                   <a:srgbClr val="000000"/>
                 </a:solidFill>
@@ -8850,7 +8852,7 @@
     </p:spTree>
     <p:extLst>
       <p:ext uri="{BB962C8B-B14F-4D97-AF65-F5344CB8AC3E}">
-        <p14:creationId xmlns:p14="http://schemas.microsoft.com/office/powerpoint/2010/main" val="1781569390"/>
+        <p14:creationId xmlns:p14="http://schemas.microsoft.com/office/powerpoint/2010/main" xmlns="" val="1781569390"/>
       </p:ext>
     </p:extLst>
   </p:cSld>
@@ -8910,7 +8912,7 @@
           <p:cNvPr id="6146" name="Picture 2">
             <a:extLst>
               <a:ext uri="{FF2B5EF4-FFF2-40B4-BE49-F238E27FC236}">
-                <a16:creationId xmlns:a16="http://schemas.microsoft.com/office/drawing/2014/main" id="{556A2F80-2684-47F2-8981-F7DE44CA7C80}"/>
+                <a16:creationId xmlns:a16="http://schemas.microsoft.com/office/drawing/2014/main" xmlns="" id="{556A2F80-2684-47F2-8981-F7DE44CA7C80}"/>
               </a:ext>
             </a:extLst>
           </p:cNvPr>
@@ -8923,7 +8925,7 @@
           <a:blip r:embed="rId2" cstate="print">
             <a:extLst>
               <a:ext uri="{28A0092B-C50C-407E-A947-70E740481C1C}">
-                <a14:useLocalDpi xmlns:a14="http://schemas.microsoft.com/office/drawing/2010/main" val="0"/>
+                <a14:useLocalDpi xmlns:a14="http://schemas.microsoft.com/office/drawing/2010/main" xmlns="" val="0"/>
               </a:ext>
             </a:extLst>
           </a:blip>
@@ -8946,14 +8948,14 @@
           </a:ln>
           <a:extLst>
             <a:ext uri="{909E8E84-426E-40DD-AFC4-6F175D3DCCD1}">
-              <a14:hiddenFill xmlns:a14="http://schemas.microsoft.com/office/drawing/2010/main">
+              <a14:hiddenFill xmlns:a14="http://schemas.microsoft.com/office/drawing/2010/main" xmlns="">
                 <a:solidFill>
                   <a:srgbClr val="FFFFFF"/>
                 </a:solidFill>
               </a14:hiddenFill>
             </a:ext>
             <a:ext uri="{91240B29-F687-4F45-9708-019B960494DF}">
-              <a14:hiddenLine xmlns:a14="http://schemas.microsoft.com/office/drawing/2010/main" w="9525">
+              <a14:hiddenLine xmlns:a14="http://schemas.microsoft.com/office/drawing/2010/main" xmlns="" w="9525">
                 <a:solidFill>
                   <a:srgbClr val="000000"/>
                 </a:solidFill>
@@ -8968,7 +8970,7 @@
     </p:spTree>
     <p:extLst>
       <p:ext uri="{BB962C8B-B14F-4D97-AF65-F5344CB8AC3E}">
-        <p14:creationId xmlns:p14="http://schemas.microsoft.com/office/powerpoint/2010/main" val="2106631967"/>
+        <p14:creationId xmlns:p14="http://schemas.microsoft.com/office/powerpoint/2010/main" xmlns="" val="2106631967"/>
       </p:ext>
     </p:extLst>
   </p:cSld>
@@ -9028,7 +9030,7 @@
           <p:cNvPr id="7170" name="Picture 2">
             <a:extLst>
               <a:ext uri="{FF2B5EF4-FFF2-40B4-BE49-F238E27FC236}">
-                <a16:creationId xmlns:a16="http://schemas.microsoft.com/office/drawing/2014/main" id="{6275A695-A03A-49D0-973C-4396A7F4314A}"/>
+                <a16:creationId xmlns:a16="http://schemas.microsoft.com/office/drawing/2014/main" xmlns="" id="{6275A695-A03A-49D0-973C-4396A7F4314A}"/>
               </a:ext>
             </a:extLst>
           </p:cNvPr>
@@ -9041,7 +9043,7 @@
           <a:blip r:embed="rId2" cstate="print">
             <a:extLst>
               <a:ext uri="{28A0092B-C50C-407E-A947-70E740481C1C}">
-                <a14:useLocalDpi xmlns:a14="http://schemas.microsoft.com/office/drawing/2010/main" val="0"/>
+                <a14:useLocalDpi xmlns:a14="http://schemas.microsoft.com/office/drawing/2010/main" xmlns="" val="0"/>
               </a:ext>
             </a:extLst>
           </a:blip>
@@ -9064,14 +9066,14 @@
           </a:ln>
           <a:extLst>
             <a:ext uri="{909E8E84-426E-40DD-AFC4-6F175D3DCCD1}">
-              <a14:hiddenFill xmlns:a14="http://schemas.microsoft.com/office/drawing/2010/main">
+              <a14:hiddenFill xmlns:a14="http://schemas.microsoft.com/office/drawing/2010/main" xmlns="">
                 <a:solidFill>
                   <a:srgbClr val="FFFFFF"/>
                 </a:solidFill>
               </a14:hiddenFill>
             </a:ext>
             <a:ext uri="{91240B29-F687-4F45-9708-019B960494DF}">
-              <a14:hiddenLine xmlns:a14="http://schemas.microsoft.com/office/drawing/2010/main" w="9525">
+              <a14:hiddenLine xmlns:a14="http://schemas.microsoft.com/office/drawing/2010/main" xmlns="" w="9525">
                 <a:solidFill>
                   <a:srgbClr val="000000"/>
                 </a:solidFill>
@@ -9086,7 +9088,7 @@
     </p:spTree>
     <p:extLst>
       <p:ext uri="{BB962C8B-B14F-4D97-AF65-F5344CB8AC3E}">
-        <p14:creationId xmlns:p14="http://schemas.microsoft.com/office/powerpoint/2010/main" val="3902333468"/>
+        <p14:creationId xmlns:p14="http://schemas.microsoft.com/office/powerpoint/2010/main" xmlns="" val="3902333468"/>
       </p:ext>
     </p:extLst>
   </p:cSld>
@@ -9146,7 +9148,7 @@
           <p:cNvPr id="8194" name="Picture 2">
             <a:extLst>
               <a:ext uri="{FF2B5EF4-FFF2-40B4-BE49-F238E27FC236}">
-                <a16:creationId xmlns:a16="http://schemas.microsoft.com/office/drawing/2014/main" id="{BE3038CC-B9FD-49DA-BE5E-677673705C62}"/>
+                <a16:creationId xmlns:a16="http://schemas.microsoft.com/office/drawing/2014/main" xmlns="" id="{BE3038CC-B9FD-49DA-BE5E-677673705C62}"/>
               </a:ext>
             </a:extLst>
           </p:cNvPr>
@@ -9159,7 +9161,7 @@
           <a:blip r:embed="rId2" cstate="print">
             <a:extLst>
               <a:ext uri="{28A0092B-C50C-407E-A947-70E740481C1C}">
-                <a14:useLocalDpi xmlns:a14="http://schemas.microsoft.com/office/drawing/2010/main" val="0"/>
+                <a14:useLocalDpi xmlns:a14="http://schemas.microsoft.com/office/drawing/2010/main" xmlns="" val="0"/>
               </a:ext>
             </a:extLst>
           </a:blip>
@@ -9182,14 +9184,14 @@
           </a:ln>
           <a:extLst>
             <a:ext uri="{909E8E84-426E-40DD-AFC4-6F175D3DCCD1}">
-              <a14:hiddenFill xmlns:a14="http://schemas.microsoft.com/office/drawing/2010/main">
+              <a14:hiddenFill xmlns:a14="http://schemas.microsoft.com/office/drawing/2010/main" xmlns="">
                 <a:solidFill>
                   <a:srgbClr val="FFFFFF"/>
                 </a:solidFill>
               </a14:hiddenFill>
             </a:ext>
             <a:ext uri="{91240B29-F687-4F45-9708-019B960494DF}">
-              <a14:hiddenLine xmlns:a14="http://schemas.microsoft.com/office/drawing/2010/main" w="9525">
+              <a14:hiddenLine xmlns:a14="http://schemas.microsoft.com/office/drawing/2010/main" xmlns="" w="9525">
                 <a:solidFill>
                   <a:srgbClr val="000000"/>
                 </a:solidFill>
@@ -9204,7 +9206,7 @@
     </p:spTree>
     <p:extLst>
       <p:ext uri="{BB962C8B-B14F-4D97-AF65-F5344CB8AC3E}">
-        <p14:creationId xmlns:p14="http://schemas.microsoft.com/office/powerpoint/2010/main" val="2672192145"/>
+        <p14:creationId xmlns:p14="http://schemas.microsoft.com/office/powerpoint/2010/main" xmlns="" val="2672192145"/>
       </p:ext>
     </p:extLst>
   </p:cSld>
@@ -9264,7 +9266,7 @@
           <p:cNvPr id="11266" name="Diagrama 1">
             <a:extLst>
               <a:ext uri="{FF2B5EF4-FFF2-40B4-BE49-F238E27FC236}">
-                <a16:creationId xmlns:a16="http://schemas.microsoft.com/office/drawing/2014/main" id="{4C81840A-E9DF-427C-85B7-BC425FCD88EA}"/>
+                <a16:creationId xmlns:a16="http://schemas.microsoft.com/office/drawing/2014/main" xmlns="" id="{4C81840A-E9DF-427C-85B7-BC425FCD88EA}"/>
               </a:ext>
             </a:extLst>
           </p:cNvPr>
@@ -9277,7 +9279,7 @@
           <a:blip r:embed="rId2" cstate="print">
             <a:extLst>
               <a:ext uri="{28A0092B-C50C-407E-A947-70E740481C1C}">
-                <a14:useLocalDpi xmlns:a14="http://schemas.microsoft.com/office/drawing/2010/main" val="0"/>
+                <a14:useLocalDpi xmlns:a14="http://schemas.microsoft.com/office/drawing/2010/main" xmlns="" val="0"/>
               </a:ext>
             </a:extLst>
           </a:blip>
@@ -9300,14 +9302,14 @@
           </a:ln>
           <a:extLst>
             <a:ext uri="{909E8E84-426E-40DD-AFC4-6F175D3DCCD1}">
-              <a14:hiddenFill xmlns:a14="http://schemas.microsoft.com/office/drawing/2010/main">
+              <a14:hiddenFill xmlns:a14="http://schemas.microsoft.com/office/drawing/2010/main" xmlns="">
                 <a:solidFill>
                   <a:srgbClr val="FFFFFF"/>
                 </a:solidFill>
               </a14:hiddenFill>
             </a:ext>
             <a:ext uri="{91240B29-F687-4F45-9708-019B960494DF}">
-              <a14:hiddenLine xmlns:a14="http://schemas.microsoft.com/office/drawing/2010/main" w="9525">
+              <a14:hiddenLine xmlns:a14="http://schemas.microsoft.com/office/drawing/2010/main" xmlns="" w="9525">
                 <a:solidFill>
                   <a:srgbClr val="000000"/>
                 </a:solidFill>
@@ -9377,7 +9379,7 @@
           <p:cNvPr id="5123" name="Picture 3">
             <a:extLst>
               <a:ext uri="{FF2B5EF4-FFF2-40B4-BE49-F238E27FC236}">
-                <a16:creationId xmlns:a16="http://schemas.microsoft.com/office/drawing/2014/main" id="{7C997CB2-E61A-4434-B314-03D59FE8A94D}"/>
+                <a16:creationId xmlns:a16="http://schemas.microsoft.com/office/drawing/2014/main" xmlns="" id="{7C997CB2-E61A-4434-B314-03D59FE8A94D}"/>
               </a:ext>
             </a:extLst>
           </p:cNvPr>
@@ -9390,7 +9392,7 @@
           <a:blip r:embed="rId2" cstate="print">
             <a:extLst>
               <a:ext uri="{28A0092B-C50C-407E-A947-70E740481C1C}">
-                <a14:useLocalDpi xmlns:a14="http://schemas.microsoft.com/office/drawing/2010/main" val="0"/>
+                <a14:useLocalDpi xmlns:a14="http://schemas.microsoft.com/office/drawing/2010/main" xmlns="" val="0"/>
               </a:ext>
             </a:extLst>
           </a:blip>
@@ -9413,14 +9415,14 @@
           </a:ln>
           <a:extLst>
             <a:ext uri="{909E8E84-426E-40DD-AFC4-6F175D3DCCD1}">
-              <a14:hiddenFill xmlns:a14="http://schemas.microsoft.com/office/drawing/2010/main">
+              <a14:hiddenFill xmlns:a14="http://schemas.microsoft.com/office/drawing/2010/main" xmlns="">
                 <a:solidFill>
                   <a:srgbClr val="FFFFFF"/>
                 </a:solidFill>
               </a14:hiddenFill>
             </a:ext>
             <a:ext uri="{91240B29-F687-4F45-9708-019B960494DF}">
-              <a14:hiddenLine xmlns:a14="http://schemas.microsoft.com/office/drawing/2010/main" w="9525">
+              <a14:hiddenLine xmlns:a14="http://schemas.microsoft.com/office/drawing/2010/main" xmlns="" w="9525">
                 <a:solidFill>
                   <a:srgbClr val="000000"/>
                 </a:solidFill>
@@ -9435,7 +9437,7 @@
     </p:spTree>
     <p:extLst>
       <p:ext uri="{BB962C8B-B14F-4D97-AF65-F5344CB8AC3E}">
-        <p14:creationId xmlns:p14="http://schemas.microsoft.com/office/powerpoint/2010/main" val="395963370"/>
+        <p14:creationId xmlns:p14="http://schemas.microsoft.com/office/powerpoint/2010/main" xmlns="" val="395963370"/>
       </p:ext>
     </p:extLst>
   </p:cSld>
@@ -9495,7 +9497,7 @@
           <p:cNvPr id="9218" name="Picture 2">
             <a:extLst>
               <a:ext uri="{FF2B5EF4-FFF2-40B4-BE49-F238E27FC236}">
-                <a16:creationId xmlns:a16="http://schemas.microsoft.com/office/drawing/2014/main" id="{A17F7154-A810-45FB-BD82-9A98CA259559}"/>
+                <a16:creationId xmlns:a16="http://schemas.microsoft.com/office/drawing/2014/main" xmlns="" id="{A17F7154-A810-45FB-BD82-9A98CA259559}"/>
               </a:ext>
             </a:extLst>
           </p:cNvPr>
@@ -9508,7 +9510,7 @@
           <a:blip r:embed="rId2" cstate="print">
             <a:extLst>
               <a:ext uri="{28A0092B-C50C-407E-A947-70E740481C1C}">
-                <a14:useLocalDpi xmlns:a14="http://schemas.microsoft.com/office/drawing/2010/main" val="0"/>
+                <a14:useLocalDpi xmlns:a14="http://schemas.microsoft.com/office/drawing/2010/main" xmlns="" val="0"/>
               </a:ext>
             </a:extLst>
           </a:blip>
@@ -9531,14 +9533,14 @@
           </a:ln>
           <a:extLst>
             <a:ext uri="{909E8E84-426E-40DD-AFC4-6F175D3DCCD1}">
-              <a14:hiddenFill xmlns:a14="http://schemas.microsoft.com/office/drawing/2010/main">
+              <a14:hiddenFill xmlns:a14="http://schemas.microsoft.com/office/drawing/2010/main" xmlns="">
                 <a:solidFill>
                   <a:srgbClr val="FFFFFF"/>
                 </a:solidFill>
               </a14:hiddenFill>
             </a:ext>
             <a:ext uri="{91240B29-F687-4F45-9708-019B960494DF}">
-              <a14:hiddenLine xmlns:a14="http://schemas.microsoft.com/office/drawing/2010/main" w="9525">
+              <a14:hiddenLine xmlns:a14="http://schemas.microsoft.com/office/drawing/2010/main" xmlns="" w="9525">
                 <a:solidFill>
                   <a:srgbClr val="000000"/>
                 </a:solidFill>
@@ -9553,7 +9555,7 @@
     </p:spTree>
     <p:extLst>
       <p:ext uri="{BB962C8B-B14F-4D97-AF65-F5344CB8AC3E}">
-        <p14:creationId xmlns:p14="http://schemas.microsoft.com/office/powerpoint/2010/main" val="168637805"/>
+        <p14:creationId xmlns:p14="http://schemas.microsoft.com/office/powerpoint/2010/main" xmlns="" val="168637805"/>
       </p:ext>
     </p:extLst>
   </p:cSld>
@@ -9613,7 +9615,7 @@
           <p:cNvPr id="10242" name="Picture 2">
             <a:extLst>
               <a:ext uri="{FF2B5EF4-FFF2-40B4-BE49-F238E27FC236}">
-                <a16:creationId xmlns:a16="http://schemas.microsoft.com/office/drawing/2014/main" id="{1FC76A72-578F-4ECB-96DA-A5AEF6084358}"/>
+                <a16:creationId xmlns:a16="http://schemas.microsoft.com/office/drawing/2014/main" xmlns="" id="{1FC76A72-578F-4ECB-96DA-A5AEF6084358}"/>
               </a:ext>
             </a:extLst>
           </p:cNvPr>
@@ -9626,7 +9628,7 @@
           <a:blip r:embed="rId2" cstate="print">
             <a:extLst>
               <a:ext uri="{28A0092B-C50C-407E-A947-70E740481C1C}">
-                <a14:useLocalDpi xmlns:a14="http://schemas.microsoft.com/office/drawing/2010/main" val="0"/>
+                <a14:useLocalDpi xmlns:a14="http://schemas.microsoft.com/office/drawing/2010/main" xmlns="" val="0"/>
               </a:ext>
             </a:extLst>
           </a:blip>
@@ -9649,14 +9651,14 @@
           </a:ln>
           <a:extLst>
             <a:ext uri="{909E8E84-426E-40DD-AFC4-6F175D3DCCD1}">
-              <a14:hiddenFill xmlns:a14="http://schemas.microsoft.com/office/drawing/2010/main">
+              <a14:hiddenFill xmlns:a14="http://schemas.microsoft.com/office/drawing/2010/main" xmlns="">
                 <a:solidFill>
                   <a:srgbClr val="FFFFFF"/>
                 </a:solidFill>
               </a14:hiddenFill>
             </a:ext>
             <a:ext uri="{91240B29-F687-4F45-9708-019B960494DF}">
-              <a14:hiddenLine xmlns:a14="http://schemas.microsoft.com/office/drawing/2010/main" w="9525">
+              <a14:hiddenLine xmlns:a14="http://schemas.microsoft.com/office/drawing/2010/main" xmlns="" w="9525">
                 <a:solidFill>
                   <a:srgbClr val="000000"/>
                 </a:solidFill>
@@ -9671,7 +9673,7 @@
     </p:spTree>
     <p:extLst>
       <p:ext uri="{BB962C8B-B14F-4D97-AF65-F5344CB8AC3E}">
-        <p14:creationId xmlns:p14="http://schemas.microsoft.com/office/powerpoint/2010/main" val="4087995979"/>
+        <p14:creationId xmlns:p14="http://schemas.microsoft.com/office/powerpoint/2010/main" xmlns="" val="4087995979"/>
       </p:ext>
     </p:extLst>
   </p:cSld>
@@ -9881,7 +9883,7 @@
           <p:cNvPr id="13314" name="Picture 2" descr="Arquitetura do Sistema v2">
             <a:extLst>
               <a:ext uri="{FF2B5EF4-FFF2-40B4-BE49-F238E27FC236}">
-                <a16:creationId xmlns:a16="http://schemas.microsoft.com/office/drawing/2014/main" id="{EA7FDE5E-A5FA-4E94-8B57-8FB50D8A51A9}"/>
+                <a16:creationId xmlns:a16="http://schemas.microsoft.com/office/drawing/2014/main" xmlns="" id="{EA7FDE5E-A5FA-4E94-8B57-8FB50D8A51A9}"/>
               </a:ext>
             </a:extLst>
           </p:cNvPr>
@@ -9894,7 +9896,7 @@
           <a:blip r:embed="rId2" cstate="print">
             <a:extLst>
               <a:ext uri="{28A0092B-C50C-407E-A947-70E740481C1C}">
-                <a14:useLocalDpi xmlns:a14="http://schemas.microsoft.com/office/drawing/2010/main" val="0"/>
+                <a14:useLocalDpi xmlns:a14="http://schemas.microsoft.com/office/drawing/2010/main" xmlns="" val="0"/>
               </a:ext>
             </a:extLst>
           </a:blip>
@@ -9917,14 +9919,14 @@
           </a:ln>
           <a:extLst>
             <a:ext uri="{909E8E84-426E-40DD-AFC4-6F175D3DCCD1}">
-              <a14:hiddenFill xmlns:a14="http://schemas.microsoft.com/office/drawing/2010/main">
+              <a14:hiddenFill xmlns:a14="http://schemas.microsoft.com/office/drawing/2010/main" xmlns="">
                 <a:solidFill>
                   <a:srgbClr val="FFFFFF"/>
                 </a:solidFill>
               </a14:hiddenFill>
             </a:ext>
             <a:ext uri="{91240B29-F687-4F45-9708-019B960494DF}">
-              <a14:hiddenLine xmlns:a14="http://schemas.microsoft.com/office/drawing/2010/main" w="9525">
+              <a14:hiddenLine xmlns:a14="http://schemas.microsoft.com/office/drawing/2010/main" xmlns="" w="9525">
                 <a:solidFill>
                   <a:srgbClr val="000000"/>
                 </a:solidFill>
@@ -10037,14 +10039,14 @@
             </a:ln>
             <a:extLst>
               <a:ext uri="{909E8E84-426E-40DD-AFC4-6F175D3DCCD1}">
-                <a14:hiddenFill xmlns:a14="http://schemas.microsoft.com/office/drawing/2010/main">
+                <a14:hiddenFill xmlns:a14="http://schemas.microsoft.com/office/drawing/2010/main" xmlns="">
                   <a:solidFill>
                     <a:srgbClr val="FFFFFF"/>
                   </a:solidFill>
                 </a14:hiddenFill>
               </a:ext>
               <a:ext uri="{91240B29-F687-4F45-9708-019B960494DF}">
-                <a14:hiddenLine xmlns:a14="http://schemas.microsoft.com/office/drawing/2010/main" w="9525">
+                <a14:hiddenLine xmlns:a14="http://schemas.microsoft.com/office/drawing/2010/main" xmlns="" w="9525">
                   <a:solidFill>
                     <a:srgbClr val="000000"/>
                   </a:solidFill>
@@ -10194,14 +10196,14 @@
             </a:ln>
             <a:extLst>
               <a:ext uri="{909E8E84-426E-40DD-AFC4-6F175D3DCCD1}">
-                <a14:hiddenFill xmlns:a14="http://schemas.microsoft.com/office/drawing/2010/main">
+                <a14:hiddenFill xmlns:a14="http://schemas.microsoft.com/office/drawing/2010/main" xmlns="">
                   <a:solidFill>
                     <a:srgbClr val="FFFFFF"/>
                   </a:solidFill>
                 </a14:hiddenFill>
               </a:ext>
               <a:ext uri="{91240B29-F687-4F45-9708-019B960494DF}">
-                <a14:hiddenLine xmlns:a14="http://schemas.microsoft.com/office/drawing/2010/main" w="9525">
+                <a14:hiddenLine xmlns:a14="http://schemas.microsoft.com/office/drawing/2010/main" xmlns="" w="9525">
                   <a:solidFill>
                     <a:srgbClr val="000000"/>
                   </a:solidFill>
@@ -10408,7 +10410,7 @@
               <a:defRPr/>
             </a:pPr>
             <a:r>
-              <a:rPr kumimoji="0" lang="pt-BR" sz="4000" b="0" i="0" u="none" strike="noStrike" kern="1200" cap="none" spc="0" normalizeH="0" baseline="0" noProof="0" dirty="0">
+              <a:rPr kumimoji="0" lang="pt-BR" sz="4000" b="0" i="0" u="none" strike="noStrike" kern="1200" cap="none" spc="0" normalizeH="0" baseline="0" noProof="0" smtClean="0">
                 <a:ln>
                   <a:noFill/>
                 </a:ln>
@@ -10424,7 +10426,7 @@
                 <a:ea typeface="ＭＳ Ｐゴシック" pitchFamily="-106" charset="-128"/>
                 <a:cs typeface="Verdana" pitchFamily="34" charset="0"/>
               </a:rPr>
-              <a:t>Vagner</a:t>
+              <a:t>Vagner José de Alcantara Ferreira</a:t>
             </a:r>
             <a:endParaRPr kumimoji="0" lang="pt-BR" sz="2000" b="1" i="0" u="none" strike="noStrike" kern="1200" cap="none" spc="0" normalizeH="0" baseline="0" noProof="0" dirty="0">
               <a:ln>
@@ -10446,7 +10448,7 @@
     </p:spTree>
     <p:extLst>
       <p:ext uri="{BB962C8B-B14F-4D97-AF65-F5344CB8AC3E}">
-        <p14:creationId xmlns:p14="http://schemas.microsoft.com/office/powerpoint/2010/main" val="2005090747"/>
+        <p14:creationId xmlns:p14="http://schemas.microsoft.com/office/powerpoint/2010/main" xmlns="" val="2005090747"/>
       </p:ext>
     </p:extLst>
   </p:cSld>
@@ -10518,14 +10520,14 @@
           </a:xfrm>
           <a:extLst>
             <a:ext uri="{909E8E84-426E-40DD-AFC4-6F175D3DCCD1}">
-              <a14:hiddenFill xmlns:a14="http://schemas.microsoft.com/office/drawing/2010/main">
+              <a14:hiddenFill xmlns:a14="http://schemas.microsoft.com/office/drawing/2010/main" xmlns="">
                 <a:solidFill>
                   <a:srgbClr val="FFFFFF"/>
                 </a:solidFill>
               </a14:hiddenFill>
             </a:ext>
             <a:ext uri="{91240B29-F687-4F45-9708-019B960494DF}">
-              <a14:hiddenLine xmlns:a14="http://schemas.microsoft.com/office/drawing/2010/main" w="9525">
+              <a14:hiddenLine xmlns:a14="http://schemas.microsoft.com/office/drawing/2010/main" xmlns="" w="9525">
                 <a:solidFill>
                   <a:srgbClr val="000000"/>
                 </a:solidFill>
@@ -10773,40 +10775,6 @@
           <a:chExt cx="0" cy="0"/>
         </a:xfrm>
       </p:grpSpPr>
-      <p:pic>
-        <p:nvPicPr>
-          <p:cNvPr id="1026" name="Picture 2" descr="Realizar Agendamento de Consulta"/>
-          <p:cNvPicPr>
-            <a:picLocks noChangeAspect="1" noChangeArrowheads="1"/>
-          </p:cNvPicPr>
-          <p:nvPr/>
-        </p:nvPicPr>
-        <p:blipFill>
-          <a:blip r:embed="rId2" cstate="print">
-            <a:lum bright="10000"/>
-          </a:blip>
-          <a:srcRect/>
-          <a:stretch>
-            <a:fillRect/>
-          </a:stretch>
-        </p:blipFill>
-        <p:spPr bwMode="auto">
-          <a:xfrm>
-            <a:off x="611560" y="1484783"/>
-            <a:ext cx="8064896" cy="4938961"/>
-          </a:xfrm>
-          <a:prstGeom prst="rect">
-            <a:avLst/>
-          </a:prstGeom>
-          <a:noFill/>
-          <a:ln w="9525">
-            <a:noFill/>
-            <a:miter lim="800000"/>
-            <a:headEnd/>
-            <a:tailEnd/>
-          </a:ln>
-        </p:spPr>
-      </p:pic>
       <p:sp>
         <p:nvSpPr>
           <p:cNvPr id="5" name="Título 3"/>
@@ -10837,6 +10805,30 @@
           </a:p>
         </p:txBody>
       </p:sp>
+      <p:pic>
+        <p:nvPicPr>
+          <p:cNvPr id="4" name="Imagem 3" descr="Psystem - Subsistemas Agenda (Caso de uso).bmp"/>
+          <p:cNvPicPr>
+            <a:picLocks noChangeAspect="1"/>
+          </p:cNvPicPr>
+          <p:nvPr/>
+        </p:nvPicPr>
+        <p:blipFill>
+          <a:blip r:embed="rId2" cstate="print"/>
+          <a:stretch>
+            <a:fillRect/>
+          </a:stretch>
+        </p:blipFill>
+        <p:spPr>
+          <a:xfrm>
+            <a:off x="899592" y="1196752"/>
+            <a:ext cx="8100392" cy="5661248"/>
+          </a:xfrm>
+          <a:prstGeom prst="rect">
+            <a:avLst/>
+          </a:prstGeom>
+        </p:spPr>
+      </p:pic>
     </p:spTree>
   </p:cSld>
   <p:clrMapOvr>
@@ -11306,7 +11298,7 @@
     </a:clrScheme>
     <a:fontScheme name="Office">
       <a:majorFont>
-        <a:latin typeface="Calibri Light" panose="020F0302020204030204"/>
+        <a:latin typeface="Calibri Light"/>
         <a:ea typeface=""/>
         <a:cs typeface=""/>
         <a:font script="Jpan" typeface="游ゴシック Light"/>
@@ -11358,7 +11350,7 @@
         <a:font script="Tfng" typeface="Ebrima"/>
       </a:majorFont>
       <a:minorFont>
-        <a:latin typeface="Calibri" panose="020F0502020204030204"/>
+        <a:latin typeface="Calibri"/>
         <a:ea typeface=""/>
         <a:cs typeface=""/>
         <a:font script="Jpan" typeface="游ゴシック"/>
@@ -11552,7 +11544,7 @@
   <a:extraClrSchemeLst/>
   <a:extLst>
     <a:ext uri="{05A4C25C-085E-4340-85A3-A5531E510DB2}">
-      <thm15:themeFamily xmlns:thm15="http://schemas.microsoft.com/office/thememl/2012/main" name="Office Theme" id="{62F939B6-93AF-4DB8-9C6B-D6C7DFDC589F}" vid="{4A3C46E8-61CC-4603-A589-7422A47A8E4A}"/>
+      <thm15:themeFamily xmlns:thm15="http://schemas.microsoft.com/office/thememl/2012/main" xmlns="" name="Office Theme" id="{62F939B6-93AF-4DB8-9C6B-D6C7DFDC589F}" vid="{4A3C46E8-61CC-4603-A589-7422A47A8E4A}"/>
     </a:ext>
   </a:extLst>
 </a:theme>

</xml_diff>

<commit_message>
use case empresa ppt
use case empresa ppt
</commit_message>
<xml_diff>
--- a/TCC/4º Encontro/2017-Apresentacao Psystem.pptx
+++ b/TCC/4º Encontro/2017-Apresentacao Psystem.pptx
@@ -5,7 +5,7 @@
     <p:sldMasterId id="2147483750" r:id="rId1"/>
   </p:sldMasterIdLst>
   <p:notesMasterIdLst>
-    <p:notesMasterId r:id="rId43"/>
+    <p:notesMasterId r:id="rId44"/>
   </p:notesMasterIdLst>
   <p:sldIdLst>
     <p:sldId id="256" r:id="rId2"/>
@@ -29,26 +29,27 @@
     <p:sldId id="310" r:id="rId20"/>
     <p:sldId id="290" r:id="rId21"/>
     <p:sldId id="312" r:id="rId22"/>
-    <p:sldId id="314" r:id="rId23"/>
-    <p:sldId id="316" r:id="rId24"/>
-    <p:sldId id="315" r:id="rId25"/>
-    <p:sldId id="317" r:id="rId26"/>
-    <p:sldId id="291" r:id="rId27"/>
-    <p:sldId id="318" r:id="rId28"/>
-    <p:sldId id="299" r:id="rId29"/>
-    <p:sldId id="300" r:id="rId30"/>
-    <p:sldId id="301" r:id="rId31"/>
-    <p:sldId id="302" r:id="rId32"/>
-    <p:sldId id="303" r:id="rId33"/>
-    <p:sldId id="304" r:id="rId34"/>
-    <p:sldId id="278" r:id="rId35"/>
-    <p:sldId id="276" r:id="rId36"/>
-    <p:sldId id="277" r:id="rId37"/>
-    <p:sldId id="281" r:id="rId38"/>
-    <p:sldId id="283" r:id="rId39"/>
-    <p:sldId id="282" r:id="rId40"/>
-    <p:sldId id="279" r:id="rId41"/>
-    <p:sldId id="280" r:id="rId42"/>
+    <p:sldId id="319" r:id="rId23"/>
+    <p:sldId id="314" r:id="rId24"/>
+    <p:sldId id="316" r:id="rId25"/>
+    <p:sldId id="315" r:id="rId26"/>
+    <p:sldId id="317" r:id="rId27"/>
+    <p:sldId id="291" r:id="rId28"/>
+    <p:sldId id="318" r:id="rId29"/>
+    <p:sldId id="299" r:id="rId30"/>
+    <p:sldId id="300" r:id="rId31"/>
+    <p:sldId id="301" r:id="rId32"/>
+    <p:sldId id="302" r:id="rId33"/>
+    <p:sldId id="303" r:id="rId34"/>
+    <p:sldId id="304" r:id="rId35"/>
+    <p:sldId id="278" r:id="rId36"/>
+    <p:sldId id="276" r:id="rId37"/>
+    <p:sldId id="277" r:id="rId38"/>
+    <p:sldId id="281" r:id="rId39"/>
+    <p:sldId id="283" r:id="rId40"/>
+    <p:sldId id="282" r:id="rId41"/>
+    <p:sldId id="279" r:id="rId42"/>
+    <p:sldId id="280" r:id="rId43"/>
   </p:sldIdLst>
   <p:sldSz cx="9144000" cy="6858000" type="screen4x3"/>
   <p:notesSz cx="6858000" cy="9144000"/>
@@ -179,7 +180,7 @@
   </p:defaultTextStyle>
   <p:extLst>
     <p:ext uri="{EFAFB233-063F-42B5-8137-9DF3F51BA10A}">
-      <p15:sldGuideLst xmlns:p15="http://schemas.microsoft.com/office/powerpoint/2012/main" xmlns="">
+      <p15:sldGuideLst xmlns:p15="http://schemas.microsoft.com/office/powerpoint/2012/main">
         <p15:guide id="1" orient="horz" pos="2160">
           <p15:clr>
             <a:srgbClr val="A4A3A4"/>
@@ -1467,25 +1468,25 @@
     </dgm:pt>
   </dgm:ptLst>
   <dgm:cxnLst>
+    <dgm:cxn modelId="{C37A4655-A207-4984-9B52-4A5B0B40DA66}" type="presOf" srcId="{7A547729-84FA-4F2E-9F51-299D1602A94A}" destId="{B0AF5AA7-A84D-44E5-8652-A38EA7D30B9E}" srcOrd="0" destOrd="0" presId="urn:microsoft.com/office/officeart/2005/8/layout/balance1"/>
+    <dgm:cxn modelId="{977D42DD-BD55-4742-B6EF-10256D9761A8}" srcId="{01C2E957-A014-476C-A341-CE64A51F67F8}" destId="{62EA347E-D601-47FF-B1CF-9867A7FA776C}" srcOrd="1" destOrd="0" parTransId="{5710D6BA-9967-4BA0-82E1-D5244D551488}" sibTransId="{E3E31370-53BB-4594-A9A2-5C24AAD5D5AA}"/>
+    <dgm:cxn modelId="{9AC67AED-D4A7-4AD6-A636-4955EAEBF978}" type="presOf" srcId="{E45E690F-4EFD-4F64-A9B2-E2D8DDCF92A1}" destId="{7A3B0BBE-1442-4F18-AD09-1C73170CB2D1}" srcOrd="0" destOrd="0" presId="urn:microsoft.com/office/officeart/2005/8/layout/balance1"/>
+    <dgm:cxn modelId="{36F8AB67-22F7-4118-AABF-41F1515974FF}" type="presOf" srcId="{01C2E957-A014-476C-A341-CE64A51F67F8}" destId="{4FDF82FE-438D-47DD-A4CF-DE88326DD86D}" srcOrd="0" destOrd="0" presId="urn:microsoft.com/office/officeart/2005/8/layout/balance1"/>
+    <dgm:cxn modelId="{62B0D900-23BA-444D-A32F-E4726CF6B662}" srcId="{01C2E957-A014-476C-A341-CE64A51F67F8}" destId="{D17BBD7F-0433-4758-9835-0BE7DCBE3F52}" srcOrd="0" destOrd="0" parTransId="{D1ECF76B-AB3A-4292-943B-3A8E25CA58E4}" sibTransId="{C17E682A-DE94-412F-A207-E9E6ADA81B45}"/>
+    <dgm:cxn modelId="{9BACBFC6-20B8-4877-B092-EA7E718DF3C7}" type="presOf" srcId="{91EBB8F1-E656-46C9-8F93-7CF03CE320E6}" destId="{56D281F3-1177-4BAA-8CCE-0F7E741222BB}" srcOrd="0" destOrd="0" presId="urn:microsoft.com/office/officeart/2005/8/layout/balance1"/>
+    <dgm:cxn modelId="{3BD5555C-90C9-4D37-BE81-BE7F553BF5B2}" type="presOf" srcId="{E98FF627-025F-45B5-9764-62147DED8C7C}" destId="{9E256A28-F7A1-4BAD-93DB-6DF4001E9955}" srcOrd="0" destOrd="0" presId="urn:microsoft.com/office/officeart/2005/8/layout/balance1"/>
+    <dgm:cxn modelId="{33690613-177B-47F6-AA43-F8220D102AC9}" type="presOf" srcId="{E1E7FBE0-1555-4E75-AEF8-8F9F5CB1BD06}" destId="{C4E208D0-CEAD-42DA-B76C-8E4C287EF898}" srcOrd="0" destOrd="0" presId="urn:microsoft.com/office/officeart/2005/8/layout/balance1"/>
+    <dgm:cxn modelId="{40EE02AB-B6E1-4C01-A73B-375BFA1A7608}" srcId="{62EA347E-D601-47FF-B1CF-9867A7FA776C}" destId="{04D032C3-0B04-48B9-84AC-51BFAE523B98}" srcOrd="0" destOrd="0" parTransId="{7B293B59-6B3D-4850-A3B2-9B364EA2534B}" sibTransId="{F6986CE9-37DA-4044-B78F-D22E277B8838}"/>
     <dgm:cxn modelId="{3DAF51C2-DB1B-4B2D-BB78-E9E7E0A36CED}" srcId="{D17BBD7F-0433-4758-9835-0BE7DCBE3F52}" destId="{E98FF627-025F-45B5-9764-62147DED8C7C}" srcOrd="1" destOrd="0" parTransId="{F37FA55F-05E9-46AB-9222-B53E1017C6C1}" sibTransId="{F3692C57-1264-47E4-AA92-79678263419A}"/>
-    <dgm:cxn modelId="{40EE02AB-B6E1-4C01-A73B-375BFA1A7608}" srcId="{62EA347E-D601-47FF-B1CF-9867A7FA776C}" destId="{04D032C3-0B04-48B9-84AC-51BFAE523B98}" srcOrd="0" destOrd="0" parTransId="{7B293B59-6B3D-4850-A3B2-9B364EA2534B}" sibTransId="{F6986CE9-37DA-4044-B78F-D22E277B8838}"/>
-    <dgm:cxn modelId="{36F8AB67-22F7-4118-AABF-41F1515974FF}" type="presOf" srcId="{01C2E957-A014-476C-A341-CE64A51F67F8}" destId="{4FDF82FE-438D-47DD-A4CF-DE88326DD86D}" srcOrd="0" destOrd="0" presId="urn:microsoft.com/office/officeart/2005/8/layout/balance1"/>
+    <dgm:cxn modelId="{5868CDF5-B7E5-4009-BA9D-6E128378A61A}" srcId="{D17BBD7F-0433-4758-9835-0BE7DCBE3F52}" destId="{91EBB8F1-E656-46C9-8F93-7CF03CE320E6}" srcOrd="0" destOrd="0" parTransId="{D484685C-2ECF-4E06-8B38-7EBC185A497B}" sibTransId="{2F3886FE-A59F-4A9D-A67C-19339A676E80}"/>
+    <dgm:cxn modelId="{E346B443-61CD-40A2-B017-A159FFE63AC5}" type="presOf" srcId="{242D927A-CFFF-43D6-A2EE-FC5146504387}" destId="{22537FDA-94C2-409E-988D-C72527DD3E04}" srcOrd="0" destOrd="0" presId="urn:microsoft.com/office/officeart/2005/8/layout/balance1"/>
+    <dgm:cxn modelId="{4AE4E030-47C6-45CD-8449-AB1462A349AA}" srcId="{D17BBD7F-0433-4758-9835-0BE7DCBE3F52}" destId="{E45E690F-4EFD-4F64-A9B2-E2D8DDCF92A1}" srcOrd="2" destOrd="0" parTransId="{6A67CA5F-FCC6-4CD6-90F3-238A95694ABA}" sibTransId="{85714508-D9E7-4406-BD30-9EFC5A7E8D0B}"/>
+    <dgm:cxn modelId="{FF3B68B9-2B70-4F56-8CEC-6AD1CF5BDCC8}" type="presOf" srcId="{04D032C3-0B04-48B9-84AC-51BFAE523B98}" destId="{BA507E78-6C7F-4731-861E-876A6F04D7AD}" srcOrd="0" destOrd="0" presId="urn:microsoft.com/office/officeart/2005/8/layout/balance1"/>
     <dgm:cxn modelId="{E28FC2F4-0FAE-4288-8584-8A3F4F0A9C82}" srcId="{62EA347E-D601-47FF-B1CF-9867A7FA776C}" destId="{E1E7FBE0-1555-4E75-AEF8-8F9F5CB1BD06}" srcOrd="1" destOrd="0" parTransId="{F5FDC7F0-6690-4C23-BCB6-51FF11CA0BFC}" sibTransId="{BB202BC2-847F-4DB6-BB88-395740740564}"/>
-    <dgm:cxn modelId="{FF3B68B9-2B70-4F56-8CEC-6AD1CF5BDCC8}" type="presOf" srcId="{04D032C3-0B04-48B9-84AC-51BFAE523B98}" destId="{BA507E78-6C7F-4731-861E-876A6F04D7AD}" srcOrd="0" destOrd="0" presId="urn:microsoft.com/office/officeart/2005/8/layout/balance1"/>
-    <dgm:cxn modelId="{977D42DD-BD55-4742-B6EF-10256D9761A8}" srcId="{01C2E957-A014-476C-A341-CE64A51F67F8}" destId="{62EA347E-D601-47FF-B1CF-9867A7FA776C}" srcOrd="1" destOrd="0" parTransId="{5710D6BA-9967-4BA0-82E1-D5244D551488}" sibTransId="{E3E31370-53BB-4594-A9A2-5C24AAD5D5AA}"/>
-    <dgm:cxn modelId="{9BACBFC6-20B8-4877-B092-EA7E718DF3C7}" type="presOf" srcId="{91EBB8F1-E656-46C9-8F93-7CF03CE320E6}" destId="{56D281F3-1177-4BAA-8CCE-0F7E741222BB}" srcOrd="0" destOrd="0" presId="urn:microsoft.com/office/officeart/2005/8/layout/balance1"/>
-    <dgm:cxn modelId="{62B0D900-23BA-444D-A32F-E4726CF6B662}" srcId="{01C2E957-A014-476C-A341-CE64A51F67F8}" destId="{D17BBD7F-0433-4758-9835-0BE7DCBE3F52}" srcOrd="0" destOrd="0" parTransId="{D1ECF76B-AB3A-4292-943B-3A8E25CA58E4}" sibTransId="{C17E682A-DE94-412F-A207-E9E6ADA81B45}"/>
+    <dgm:cxn modelId="{A96A4491-DB80-49A8-8183-54A73733B1A9}" type="presOf" srcId="{62EA347E-D601-47FF-B1CF-9867A7FA776C}" destId="{90CCDBC8-AA69-4A73-AE71-1C68CF47B9C2}" srcOrd="0" destOrd="0" presId="urn:microsoft.com/office/officeart/2005/8/layout/balance1"/>
     <dgm:cxn modelId="{8B87BB36-F57C-4884-B73F-392A798B6D25}" type="presOf" srcId="{D17BBD7F-0433-4758-9835-0BE7DCBE3F52}" destId="{706EE930-A0DC-4F2B-8788-46BDBC65213F}" srcOrd="0" destOrd="0" presId="urn:microsoft.com/office/officeart/2005/8/layout/balance1"/>
+    <dgm:cxn modelId="{E9DCFD45-6403-4029-8535-8D044E4FF711}" srcId="{62EA347E-D601-47FF-B1CF-9867A7FA776C}" destId="{242D927A-CFFF-43D6-A2EE-FC5146504387}" srcOrd="3" destOrd="0" parTransId="{9558DF73-175F-401C-BF20-F7B22F61B971}" sibTransId="{F48C3525-3E06-4131-8435-81A4A98225B8}"/>
     <dgm:cxn modelId="{BB4E42D3-1A89-4286-988A-113B8BC71D04}" srcId="{62EA347E-D601-47FF-B1CF-9867A7FA776C}" destId="{7A547729-84FA-4F2E-9F51-299D1602A94A}" srcOrd="2" destOrd="0" parTransId="{F4CD00AC-6D1F-4FD2-B4CA-5A92585217C5}" sibTransId="{EF289B30-FE88-4227-8691-A66F0EAFD48E}"/>
-    <dgm:cxn modelId="{3BD5555C-90C9-4D37-BE81-BE7F553BF5B2}" type="presOf" srcId="{E98FF627-025F-45B5-9764-62147DED8C7C}" destId="{9E256A28-F7A1-4BAD-93DB-6DF4001E9955}" srcOrd="0" destOrd="0" presId="urn:microsoft.com/office/officeart/2005/8/layout/balance1"/>
-    <dgm:cxn modelId="{9AC67AED-D4A7-4AD6-A636-4955EAEBF978}" type="presOf" srcId="{E45E690F-4EFD-4F64-A9B2-E2D8DDCF92A1}" destId="{7A3B0BBE-1442-4F18-AD09-1C73170CB2D1}" srcOrd="0" destOrd="0" presId="urn:microsoft.com/office/officeart/2005/8/layout/balance1"/>
-    <dgm:cxn modelId="{A96A4491-DB80-49A8-8183-54A73733B1A9}" type="presOf" srcId="{62EA347E-D601-47FF-B1CF-9867A7FA776C}" destId="{90CCDBC8-AA69-4A73-AE71-1C68CF47B9C2}" srcOrd="0" destOrd="0" presId="urn:microsoft.com/office/officeart/2005/8/layout/balance1"/>
-    <dgm:cxn modelId="{4AE4E030-47C6-45CD-8449-AB1462A349AA}" srcId="{D17BBD7F-0433-4758-9835-0BE7DCBE3F52}" destId="{E45E690F-4EFD-4F64-A9B2-E2D8DDCF92A1}" srcOrd="2" destOrd="0" parTransId="{6A67CA5F-FCC6-4CD6-90F3-238A95694ABA}" sibTransId="{85714508-D9E7-4406-BD30-9EFC5A7E8D0B}"/>
-    <dgm:cxn modelId="{C37A4655-A207-4984-9B52-4A5B0B40DA66}" type="presOf" srcId="{7A547729-84FA-4F2E-9F51-299D1602A94A}" destId="{B0AF5AA7-A84D-44E5-8652-A38EA7D30B9E}" srcOrd="0" destOrd="0" presId="urn:microsoft.com/office/officeart/2005/8/layout/balance1"/>
-    <dgm:cxn modelId="{E346B443-61CD-40A2-B017-A159FFE63AC5}" type="presOf" srcId="{242D927A-CFFF-43D6-A2EE-FC5146504387}" destId="{22537FDA-94C2-409E-988D-C72527DD3E04}" srcOrd="0" destOrd="0" presId="urn:microsoft.com/office/officeart/2005/8/layout/balance1"/>
-    <dgm:cxn modelId="{E9DCFD45-6403-4029-8535-8D044E4FF711}" srcId="{62EA347E-D601-47FF-B1CF-9867A7FA776C}" destId="{242D927A-CFFF-43D6-A2EE-FC5146504387}" srcOrd="3" destOrd="0" parTransId="{9558DF73-175F-401C-BF20-F7B22F61B971}" sibTransId="{F48C3525-3E06-4131-8435-81A4A98225B8}"/>
-    <dgm:cxn modelId="{33690613-177B-47F6-AA43-F8220D102AC9}" type="presOf" srcId="{E1E7FBE0-1555-4E75-AEF8-8F9F5CB1BD06}" destId="{C4E208D0-CEAD-42DA-B76C-8E4C287EF898}" srcOrd="0" destOrd="0" presId="urn:microsoft.com/office/officeart/2005/8/layout/balance1"/>
-    <dgm:cxn modelId="{5868CDF5-B7E5-4009-BA9D-6E128378A61A}" srcId="{D17BBD7F-0433-4758-9835-0BE7DCBE3F52}" destId="{91EBB8F1-E656-46C9-8F93-7CF03CE320E6}" srcOrd="0" destOrd="0" parTransId="{D484685C-2ECF-4E06-8B38-7EBC185A497B}" sibTransId="{2F3886FE-A59F-4A9D-A67C-19339A676E80}"/>
     <dgm:cxn modelId="{A1C60917-864A-43A6-BB48-C4F2F1CE3021}" type="presParOf" srcId="{4FDF82FE-438D-47DD-A4CF-DE88326DD86D}" destId="{0CC9817B-B829-4BD7-A617-413C8A38FCCC}" srcOrd="0" destOrd="0" presId="urn:microsoft.com/office/officeart/2005/8/layout/balance1"/>
     <dgm:cxn modelId="{C850BEAC-9A2E-467D-94A8-DE0A61E62C38}" type="presParOf" srcId="{4FDF82FE-438D-47DD-A4CF-DE88326DD86D}" destId="{C466C275-1372-425A-B1AD-3B54E48B73E0}" srcOrd="1" destOrd="0" presId="urn:microsoft.com/office/officeart/2005/8/layout/balance1"/>
     <dgm:cxn modelId="{EF6FED68-E6C4-4FFE-A2AA-D3C04E648DF7}" type="presParOf" srcId="{C466C275-1372-425A-B1AD-3B54E48B73E0}" destId="{706EE930-A0DC-4F2B-8788-46BDBC65213F}" srcOrd="0" destOrd="0" presId="urn:microsoft.com/office/officeart/2005/8/layout/balance1"/>
@@ -1506,1128 +1507,20 @@
   <dgm:whole/>
   <dgm:extLst>
     <a:ext uri="http://schemas.microsoft.com/office/drawing/2008/diagram">
-      <dsp:dataModelExt xmlns:dsp="http://schemas.microsoft.com/office/drawing/2008/diagram" xmlns="" relId="rId7" minVer="http://schemas.openxmlformats.org/drawingml/2006/diagram"/>
+      <dsp:dataModelExt xmlns:dsp="http://schemas.microsoft.com/office/drawing/2008/diagram" relId="rId7" minVer="http://schemas.openxmlformats.org/drawingml/2006/diagram"/>
     </a:ext>
   </dgm:extLst>
 </dgm:dataModel>
 </file>
 
 <file path=ppt/diagrams/drawing1.xml><?xml version="1.0" encoding="utf-8"?>
-<dsp:drawing xmlns:dgm="http://schemas.openxmlformats.org/drawingml/2006/diagram" xmlns:a="http://schemas.openxmlformats.org/drawingml/2006/main" xmlns:dsp="http://schemas.microsoft.com/office/drawing/2008/diagram">
+<dsp:drawing xmlns:dgm="http://schemas.openxmlformats.org/drawingml/2006/diagram" xmlns:dsp="http://schemas.microsoft.com/office/drawing/2008/diagram" xmlns:a="http://schemas.openxmlformats.org/drawingml/2006/main">
   <dsp:spTree>
     <dsp:nvGrpSpPr>
       <dsp:cNvPr id="0" name=""/>
       <dsp:cNvGrpSpPr/>
     </dsp:nvGrpSpPr>
     <dsp:grpSpPr/>
-    <dsp:sp modelId="{706EE930-A0DC-4F2B-8788-46BDBC65213F}">
-      <dsp:nvSpPr>
-        <dsp:cNvPr id="0" name=""/>
-        <dsp:cNvSpPr/>
-      </dsp:nvSpPr>
-      <dsp:spPr>
-        <a:xfrm>
-          <a:off x="1933016" y="0"/>
-          <a:ext cx="1923972" cy="1068873"/>
-        </a:xfrm>
-        <a:prstGeom prst="roundRect">
-          <a:avLst>
-            <a:gd name="adj" fmla="val 10000"/>
-          </a:avLst>
-        </a:prstGeom>
-        <a:solidFill>
-          <a:schemeClr val="accent1">
-            <a:alpha val="90000"/>
-            <a:tint val="40000"/>
-            <a:hueOff val="0"/>
-            <a:satOff val="0"/>
-            <a:lumOff val="0"/>
-            <a:alphaOff val="0"/>
-          </a:schemeClr>
-        </a:solidFill>
-        <a:ln w="9525" cap="flat" cmpd="sng" algn="ctr">
-          <a:solidFill>
-            <a:schemeClr val="accent1">
-              <a:alpha val="90000"/>
-              <a:tint val="40000"/>
-              <a:hueOff val="0"/>
-              <a:satOff val="0"/>
-              <a:lumOff val="0"/>
-              <a:alphaOff val="0"/>
-            </a:schemeClr>
-          </a:solidFill>
-          <a:prstDash val="solid"/>
-        </a:ln>
-        <a:effectLst>
-          <a:outerShdw blurRad="40000" dist="23000" dir="5400000" rotWithShape="0">
-            <a:srgbClr val="000000">
-              <a:alpha val="35000"/>
-            </a:srgbClr>
-          </a:outerShdw>
-        </a:effectLst>
-        <a:scene3d>
-          <a:camera prst="orthographicFront"/>
-          <a:lightRig rig="threePt" dir="t">
-            <a:rot lat="0" lon="0" rev="7500000"/>
-          </a:lightRig>
-        </a:scene3d>
-        <a:sp3d extrusionH="190500" prstMaterial="dkEdge">
-          <a:bevelT w="120650" h="38100" prst="relaxedInset"/>
-          <a:bevelB w="120650" h="57150" prst="relaxedInset"/>
-          <a:contourClr>
-            <a:schemeClr val="bg1"/>
-          </a:contourClr>
-        </a:sp3d>
-      </dsp:spPr>
-      <dsp:style>
-        <a:lnRef idx="1">
-          <a:scrgbClr r="0" g="0" b="0"/>
-        </a:lnRef>
-        <a:fillRef idx="1">
-          <a:scrgbClr r="0" g="0" b="0"/>
-        </a:fillRef>
-        <a:effectRef idx="2">
-          <a:scrgbClr r="0" g="0" b="0"/>
-        </a:effectRef>
-        <a:fontRef idx="minor"/>
-      </dsp:style>
-      <dsp:txBody>
-        <a:bodyPr spcFirstLastPara="0" vert="horz" wrap="square" lIns="114300" tIns="114300" rIns="114300" bIns="114300" numCol="1" spcCol="1270" anchor="ctr" anchorCtr="0">
-          <a:noAutofit/>
-        </a:bodyPr>
-        <a:lstStyle/>
-        <a:p>
-          <a:pPr lvl="0" algn="ctr" defTabSz="1333500">
-            <a:lnSpc>
-              <a:spcPct val="90000"/>
-            </a:lnSpc>
-            <a:spcBef>
-              <a:spcPct val="0"/>
-            </a:spcBef>
-            <a:spcAft>
-              <a:spcPct val="35000"/>
-            </a:spcAft>
-          </a:pPr>
-          <a:r>
-            <a:rPr lang="pt-BR" sz="3000" kern="1200" dirty="0"/>
-            <a:t>Problema</a:t>
-          </a:r>
-        </a:p>
-      </dsp:txBody>
-      <dsp:txXfrm>
-        <a:off x="1933016" y="0"/>
-        <a:ext cx="1923972" cy="1068873"/>
-      </dsp:txXfrm>
-    </dsp:sp>
-    <dsp:sp modelId="{90CCDBC8-AA69-4A73-AE71-1C68CF47B9C2}">
-      <dsp:nvSpPr>
-        <dsp:cNvPr id="0" name=""/>
-        <dsp:cNvSpPr/>
-      </dsp:nvSpPr>
-      <dsp:spPr>
-        <a:xfrm>
-          <a:off x="4988793" y="0"/>
-          <a:ext cx="1923972" cy="1068873"/>
-        </a:xfrm>
-        <a:prstGeom prst="roundRect">
-          <a:avLst>
-            <a:gd name="adj" fmla="val 10000"/>
-          </a:avLst>
-        </a:prstGeom>
-        <a:solidFill>
-          <a:schemeClr val="accent1">
-            <a:alpha val="90000"/>
-            <a:tint val="40000"/>
-            <a:hueOff val="0"/>
-            <a:satOff val="0"/>
-            <a:lumOff val="0"/>
-            <a:alphaOff val="0"/>
-          </a:schemeClr>
-        </a:solidFill>
-        <a:ln w="9525" cap="flat" cmpd="sng" algn="ctr">
-          <a:solidFill>
-            <a:schemeClr val="accent1">
-              <a:alpha val="90000"/>
-              <a:tint val="40000"/>
-              <a:hueOff val="0"/>
-              <a:satOff val="0"/>
-              <a:lumOff val="0"/>
-              <a:alphaOff val="0"/>
-            </a:schemeClr>
-          </a:solidFill>
-          <a:prstDash val="solid"/>
-        </a:ln>
-        <a:effectLst>
-          <a:outerShdw blurRad="40000" dist="23000" dir="5400000" rotWithShape="0">
-            <a:srgbClr val="000000">
-              <a:alpha val="35000"/>
-            </a:srgbClr>
-          </a:outerShdw>
-        </a:effectLst>
-        <a:scene3d>
-          <a:camera prst="orthographicFront"/>
-          <a:lightRig rig="threePt" dir="t">
-            <a:rot lat="0" lon="0" rev="7500000"/>
-          </a:lightRig>
-        </a:scene3d>
-        <a:sp3d extrusionH="190500" prstMaterial="dkEdge">
-          <a:bevelT w="120650" h="38100" prst="relaxedInset"/>
-          <a:bevelB w="120650" h="57150" prst="relaxedInset"/>
-          <a:contourClr>
-            <a:schemeClr val="bg1"/>
-          </a:contourClr>
-        </a:sp3d>
-      </dsp:spPr>
-      <dsp:style>
-        <a:lnRef idx="1">
-          <a:scrgbClr r="0" g="0" b="0"/>
-        </a:lnRef>
-        <a:fillRef idx="1">
-          <a:scrgbClr r="0" g="0" b="0"/>
-        </a:fillRef>
-        <a:effectRef idx="2">
-          <a:scrgbClr r="0" g="0" b="0"/>
-        </a:effectRef>
-        <a:fontRef idx="minor"/>
-      </dsp:style>
-      <dsp:txBody>
-        <a:bodyPr spcFirstLastPara="0" vert="horz" wrap="square" lIns="114300" tIns="114300" rIns="114300" bIns="114300" numCol="1" spcCol="1270" anchor="ctr" anchorCtr="0">
-          <a:noAutofit/>
-        </a:bodyPr>
-        <a:lstStyle/>
-        <a:p>
-          <a:pPr lvl="0" algn="ctr" defTabSz="1333500">
-            <a:lnSpc>
-              <a:spcPct val="90000"/>
-            </a:lnSpc>
-            <a:spcBef>
-              <a:spcPct val="0"/>
-            </a:spcBef>
-            <a:spcAft>
-              <a:spcPct val="35000"/>
-            </a:spcAft>
-          </a:pPr>
-          <a:r>
-            <a:rPr lang="pt-BR" sz="3000" kern="1200" dirty="0"/>
-            <a:t>Benefícios</a:t>
-          </a:r>
-        </a:p>
-      </dsp:txBody>
-      <dsp:txXfrm>
-        <a:off x="4988793" y="0"/>
-        <a:ext cx="1923972" cy="1068873"/>
-      </dsp:txXfrm>
-    </dsp:sp>
-    <dsp:sp modelId="{88FF47DA-FA9B-4F06-8667-D076810E31E6}">
-      <dsp:nvSpPr>
-        <dsp:cNvPr id="0" name=""/>
-        <dsp:cNvSpPr/>
-      </dsp:nvSpPr>
-      <dsp:spPr>
-        <a:xfrm>
-          <a:off x="3883710" y="4542712"/>
-          <a:ext cx="801655" cy="801655"/>
-        </a:xfrm>
-        <a:prstGeom prst="triangle">
-          <a:avLst/>
-        </a:prstGeom>
-        <a:solidFill>
-          <a:schemeClr val="accent1">
-            <a:alpha val="90000"/>
-            <a:tint val="40000"/>
-            <a:hueOff val="0"/>
-            <a:satOff val="0"/>
-            <a:lumOff val="0"/>
-            <a:alphaOff val="0"/>
-          </a:schemeClr>
-        </a:solidFill>
-        <a:ln w="9525" cap="flat" cmpd="sng" algn="ctr">
-          <a:solidFill>
-            <a:schemeClr val="accent1">
-              <a:alpha val="90000"/>
-              <a:tint val="40000"/>
-              <a:hueOff val="0"/>
-              <a:satOff val="0"/>
-              <a:lumOff val="0"/>
-              <a:alphaOff val="0"/>
-            </a:schemeClr>
-          </a:solidFill>
-          <a:prstDash val="solid"/>
-        </a:ln>
-        <a:effectLst>
-          <a:outerShdw blurRad="40000" dist="23000" dir="5400000" rotWithShape="0">
-            <a:srgbClr val="000000">
-              <a:alpha val="35000"/>
-            </a:srgbClr>
-          </a:outerShdw>
-        </a:effectLst>
-        <a:scene3d>
-          <a:camera prst="orthographicFront"/>
-          <a:lightRig rig="threePt" dir="t">
-            <a:rot lat="0" lon="0" rev="7500000"/>
-          </a:lightRig>
-        </a:scene3d>
-        <a:sp3d extrusionH="190500" prstMaterial="dkEdge">
-          <a:bevelT w="120650" h="38100" prst="relaxedInset"/>
-          <a:bevelB w="120650" h="57150" prst="relaxedInset"/>
-          <a:contourClr>
-            <a:schemeClr val="bg1"/>
-          </a:contourClr>
-        </a:sp3d>
-      </dsp:spPr>
-      <dsp:style>
-        <a:lnRef idx="1">
-          <a:scrgbClr r="0" g="0" b="0"/>
-        </a:lnRef>
-        <a:fillRef idx="1">
-          <a:scrgbClr r="0" g="0" b="0"/>
-        </a:fillRef>
-        <a:effectRef idx="2">
-          <a:scrgbClr r="0" g="0" b="0"/>
-        </a:effectRef>
-        <a:fontRef idx="minor"/>
-      </dsp:style>
-    </dsp:sp>
-    <dsp:sp modelId="{72EF2C6E-7FF3-42D1-B97F-FDC6A81E0CC0}">
-      <dsp:nvSpPr>
-        <dsp:cNvPr id="0" name=""/>
-        <dsp:cNvSpPr/>
-      </dsp:nvSpPr>
-      <dsp:spPr>
-        <a:xfrm rot="240000">
-          <a:off x="1878838" y="4199194"/>
-          <a:ext cx="4811400" cy="336445"/>
-        </a:xfrm>
-        <a:prstGeom prst="rect">
-          <a:avLst/>
-        </a:prstGeom>
-        <a:solidFill>
-          <a:schemeClr val="accent1">
-            <a:alpha val="90000"/>
-            <a:tint val="40000"/>
-            <a:hueOff val="0"/>
-            <a:satOff val="0"/>
-            <a:lumOff val="0"/>
-            <a:alphaOff val="0"/>
-          </a:schemeClr>
-        </a:solidFill>
-        <a:ln w="9525" cap="flat" cmpd="sng" algn="ctr">
-          <a:solidFill>
-            <a:schemeClr val="accent1">
-              <a:alpha val="90000"/>
-              <a:tint val="40000"/>
-              <a:hueOff val="0"/>
-              <a:satOff val="0"/>
-              <a:lumOff val="0"/>
-              <a:alphaOff val="0"/>
-            </a:schemeClr>
-          </a:solidFill>
-          <a:prstDash val="solid"/>
-        </a:ln>
-        <a:effectLst>
-          <a:outerShdw blurRad="40000" dist="23000" dir="5400000" rotWithShape="0">
-            <a:srgbClr val="000000">
-              <a:alpha val="35000"/>
-            </a:srgbClr>
-          </a:outerShdw>
-        </a:effectLst>
-        <a:scene3d>
-          <a:camera prst="orthographicFront"/>
-          <a:lightRig rig="threePt" dir="t">
-            <a:rot lat="0" lon="0" rev="7500000"/>
-          </a:lightRig>
-        </a:scene3d>
-        <a:sp3d extrusionH="190500" prstMaterial="dkEdge">
-          <a:bevelT w="120650" h="38100" prst="relaxedInset"/>
-          <a:bevelB w="120650" h="57150" prst="relaxedInset"/>
-          <a:contourClr>
-            <a:schemeClr val="bg1"/>
-          </a:contourClr>
-        </a:sp3d>
-      </dsp:spPr>
-      <dsp:style>
-        <a:lnRef idx="1">
-          <a:scrgbClr r="0" g="0" b="0"/>
-        </a:lnRef>
-        <a:fillRef idx="1">
-          <a:scrgbClr r="0" g="0" b="0"/>
-        </a:fillRef>
-        <a:effectRef idx="2">
-          <a:scrgbClr r="0" g="0" b="0"/>
-        </a:effectRef>
-        <a:fontRef idx="minor"/>
-      </dsp:style>
-    </dsp:sp>
-    <dsp:sp modelId="{BA507E78-6C7F-4731-861E-876A6F04D7AD}">
-      <dsp:nvSpPr>
-        <dsp:cNvPr id="0" name=""/>
-        <dsp:cNvSpPr/>
-      </dsp:nvSpPr>
-      <dsp:spPr>
-        <a:xfrm rot="240000">
-          <a:off x="4772843" y="3593074"/>
-          <a:ext cx="1909349" cy="659383"/>
-        </a:xfrm>
-        <a:prstGeom prst="roundRect">
-          <a:avLst/>
-        </a:prstGeom>
-        <a:gradFill rotWithShape="0">
-          <a:gsLst>
-            <a:gs pos="0">
-              <a:schemeClr val="accent1">
-                <a:hueOff val="0"/>
-                <a:satOff val="0"/>
-                <a:lumOff val="0"/>
-                <a:alphaOff val="0"/>
-                <a:shade val="51000"/>
-                <a:satMod val="130000"/>
-              </a:schemeClr>
-            </a:gs>
-            <a:gs pos="80000">
-              <a:schemeClr val="accent1">
-                <a:hueOff val="0"/>
-                <a:satOff val="0"/>
-                <a:lumOff val="0"/>
-                <a:alphaOff val="0"/>
-                <a:shade val="93000"/>
-                <a:satMod val="130000"/>
-              </a:schemeClr>
-            </a:gs>
-            <a:gs pos="100000">
-              <a:schemeClr val="accent1">
-                <a:hueOff val="0"/>
-                <a:satOff val="0"/>
-                <a:lumOff val="0"/>
-                <a:alphaOff val="0"/>
-                <a:shade val="94000"/>
-                <a:satMod val="135000"/>
-              </a:schemeClr>
-            </a:gs>
-          </a:gsLst>
-          <a:lin ang="16200000" scaled="0"/>
-        </a:gradFill>
-        <a:ln>
-          <a:noFill/>
-        </a:ln>
-        <a:effectLst>
-          <a:outerShdw blurRad="40000" dist="23000" dir="5400000" rotWithShape="0">
-            <a:srgbClr val="000000">
-              <a:alpha val="35000"/>
-            </a:srgbClr>
-          </a:outerShdw>
-        </a:effectLst>
-        <a:scene3d>
-          <a:camera prst="orthographicFront"/>
-          <a:lightRig rig="threePt" dir="t">
-            <a:rot lat="0" lon="0" rev="7500000"/>
-          </a:lightRig>
-        </a:scene3d>
-        <a:sp3d prstMaterial="plastic">
-          <a:bevelT w="127000" h="25400" prst="relaxedInset"/>
-        </a:sp3d>
-      </dsp:spPr>
-      <dsp:style>
-        <a:lnRef idx="0">
-          <a:scrgbClr r="0" g="0" b="0"/>
-        </a:lnRef>
-        <a:fillRef idx="3">
-          <a:scrgbClr r="0" g="0" b="0"/>
-        </a:fillRef>
-        <a:effectRef idx="2">
-          <a:scrgbClr r="0" g="0" b="0"/>
-        </a:effectRef>
-        <a:fontRef idx="minor">
-          <a:schemeClr val="lt1"/>
-        </a:fontRef>
-      </dsp:style>
-      <dsp:txBody>
-        <a:bodyPr spcFirstLastPara="0" vert="horz" wrap="square" lIns="49530" tIns="49530" rIns="49530" bIns="49530" numCol="1" spcCol="1270" anchor="ctr" anchorCtr="0">
-          <a:noAutofit/>
-        </a:bodyPr>
-        <a:lstStyle/>
-        <a:p>
-          <a:pPr lvl="0" algn="ctr" defTabSz="577850">
-            <a:lnSpc>
-              <a:spcPct val="90000"/>
-            </a:lnSpc>
-            <a:spcBef>
-              <a:spcPct val="0"/>
-            </a:spcBef>
-            <a:spcAft>
-              <a:spcPct val="35000"/>
-            </a:spcAft>
-          </a:pPr>
-          <a:r>
-            <a:rPr lang="pt-BR" sz="1300" kern="1200" dirty="0"/>
-            <a:t>Relatórios de cobranças, atendimento e faturamento.</a:t>
-          </a:r>
-        </a:p>
-      </dsp:txBody>
-      <dsp:txXfrm rot="240000">
-        <a:off x="4772843" y="3593074"/>
-        <a:ext cx="1909349" cy="659383"/>
-      </dsp:txXfrm>
-    </dsp:sp>
-    <dsp:sp modelId="{C4E208D0-CEAD-42DA-B76C-8E4C287EF898}">
-      <dsp:nvSpPr>
-        <dsp:cNvPr id="0" name=""/>
-        <dsp:cNvSpPr/>
-      </dsp:nvSpPr>
-      <dsp:spPr>
-        <a:xfrm rot="240000">
-          <a:off x="4826286" y="2887617"/>
-          <a:ext cx="1909349" cy="659383"/>
-        </a:xfrm>
-        <a:prstGeom prst="roundRect">
-          <a:avLst/>
-        </a:prstGeom>
-        <a:gradFill rotWithShape="0">
-          <a:gsLst>
-            <a:gs pos="0">
-              <a:schemeClr val="accent1">
-                <a:hueOff val="0"/>
-                <a:satOff val="0"/>
-                <a:lumOff val="0"/>
-                <a:alphaOff val="0"/>
-                <a:shade val="51000"/>
-                <a:satMod val="130000"/>
-              </a:schemeClr>
-            </a:gs>
-            <a:gs pos="80000">
-              <a:schemeClr val="accent1">
-                <a:hueOff val="0"/>
-                <a:satOff val="0"/>
-                <a:lumOff val="0"/>
-                <a:alphaOff val="0"/>
-                <a:shade val="93000"/>
-                <a:satMod val="130000"/>
-              </a:schemeClr>
-            </a:gs>
-            <a:gs pos="100000">
-              <a:schemeClr val="accent1">
-                <a:hueOff val="0"/>
-                <a:satOff val="0"/>
-                <a:lumOff val="0"/>
-                <a:alphaOff val="0"/>
-                <a:shade val="94000"/>
-                <a:satMod val="135000"/>
-              </a:schemeClr>
-            </a:gs>
-          </a:gsLst>
-          <a:lin ang="16200000" scaled="0"/>
-        </a:gradFill>
-        <a:ln>
-          <a:noFill/>
-        </a:ln>
-        <a:effectLst>
-          <a:outerShdw blurRad="40000" dist="23000" dir="5400000" rotWithShape="0">
-            <a:srgbClr val="000000">
-              <a:alpha val="35000"/>
-            </a:srgbClr>
-          </a:outerShdw>
-        </a:effectLst>
-        <a:scene3d>
-          <a:camera prst="orthographicFront"/>
-          <a:lightRig rig="threePt" dir="t">
-            <a:rot lat="0" lon="0" rev="7500000"/>
-          </a:lightRig>
-        </a:scene3d>
-        <a:sp3d prstMaterial="plastic">
-          <a:bevelT w="127000" h="25400" prst="relaxedInset"/>
-        </a:sp3d>
-      </dsp:spPr>
-      <dsp:style>
-        <a:lnRef idx="0">
-          <a:scrgbClr r="0" g="0" b="0"/>
-        </a:lnRef>
-        <a:fillRef idx="3">
-          <a:scrgbClr r="0" g="0" b="0"/>
-        </a:fillRef>
-        <a:effectRef idx="2">
-          <a:scrgbClr r="0" g="0" b="0"/>
-        </a:effectRef>
-        <a:fontRef idx="minor">
-          <a:schemeClr val="lt1"/>
-        </a:fontRef>
-      </dsp:style>
-      <dsp:txBody>
-        <a:bodyPr spcFirstLastPara="0" vert="horz" wrap="square" lIns="53340" tIns="53340" rIns="53340" bIns="53340" numCol="1" spcCol="1270" anchor="ctr" anchorCtr="0">
-          <a:noAutofit/>
-        </a:bodyPr>
-        <a:lstStyle/>
-        <a:p>
-          <a:pPr lvl="0" algn="ctr" defTabSz="622300">
-            <a:lnSpc>
-              <a:spcPct val="90000"/>
-            </a:lnSpc>
-            <a:spcBef>
-              <a:spcPct val="0"/>
-            </a:spcBef>
-            <a:spcAft>
-              <a:spcPct val="35000"/>
-            </a:spcAft>
-          </a:pPr>
-          <a:r>
-            <a:rPr lang="pt-BR" sz="1400" kern="1200" dirty="0"/>
-            <a:t>Cadastro de parceria, convênio e clientes.</a:t>
-          </a:r>
-        </a:p>
-      </dsp:txBody>
-      <dsp:txXfrm rot="240000">
-        <a:off x="4826286" y="2887617"/>
-        <a:ext cx="1909349" cy="659383"/>
-      </dsp:txXfrm>
-    </dsp:sp>
-    <dsp:sp modelId="{B0AF5AA7-A84D-44E5-8652-A38EA7D30B9E}">
-      <dsp:nvSpPr>
-        <dsp:cNvPr id="0" name=""/>
-        <dsp:cNvSpPr/>
-      </dsp:nvSpPr>
-      <dsp:spPr>
-        <a:xfrm rot="240000">
-          <a:off x="4879730" y="2182161"/>
-          <a:ext cx="1909349" cy="659383"/>
-        </a:xfrm>
-        <a:prstGeom prst="roundRect">
-          <a:avLst/>
-        </a:prstGeom>
-        <a:gradFill rotWithShape="0">
-          <a:gsLst>
-            <a:gs pos="0">
-              <a:schemeClr val="accent1">
-                <a:hueOff val="0"/>
-                <a:satOff val="0"/>
-                <a:lumOff val="0"/>
-                <a:alphaOff val="0"/>
-                <a:shade val="51000"/>
-                <a:satMod val="130000"/>
-              </a:schemeClr>
-            </a:gs>
-            <a:gs pos="80000">
-              <a:schemeClr val="accent1">
-                <a:hueOff val="0"/>
-                <a:satOff val="0"/>
-                <a:lumOff val="0"/>
-                <a:alphaOff val="0"/>
-                <a:shade val="93000"/>
-                <a:satMod val="130000"/>
-              </a:schemeClr>
-            </a:gs>
-            <a:gs pos="100000">
-              <a:schemeClr val="accent1">
-                <a:hueOff val="0"/>
-                <a:satOff val="0"/>
-                <a:lumOff val="0"/>
-                <a:alphaOff val="0"/>
-                <a:shade val="94000"/>
-                <a:satMod val="135000"/>
-              </a:schemeClr>
-            </a:gs>
-          </a:gsLst>
-          <a:lin ang="16200000" scaled="0"/>
-        </a:gradFill>
-        <a:ln>
-          <a:noFill/>
-        </a:ln>
-        <a:effectLst>
-          <a:outerShdw blurRad="40000" dist="23000" dir="5400000" rotWithShape="0">
-            <a:srgbClr val="000000">
-              <a:alpha val="35000"/>
-            </a:srgbClr>
-          </a:outerShdw>
-        </a:effectLst>
-        <a:scene3d>
-          <a:camera prst="orthographicFront"/>
-          <a:lightRig rig="threePt" dir="t">
-            <a:rot lat="0" lon="0" rev="7500000"/>
-          </a:lightRig>
-        </a:scene3d>
-        <a:sp3d prstMaterial="plastic">
-          <a:bevelT w="127000" h="25400" prst="relaxedInset"/>
-        </a:sp3d>
-      </dsp:spPr>
-      <dsp:style>
-        <a:lnRef idx="0">
-          <a:scrgbClr r="0" g="0" b="0"/>
-        </a:lnRef>
-        <a:fillRef idx="3">
-          <a:scrgbClr r="0" g="0" b="0"/>
-        </a:fillRef>
-        <a:effectRef idx="2">
-          <a:scrgbClr r="0" g="0" b="0"/>
-        </a:effectRef>
-        <a:fontRef idx="minor">
-          <a:schemeClr val="lt1"/>
-        </a:fontRef>
-      </dsp:style>
-      <dsp:txBody>
-        <a:bodyPr spcFirstLastPara="0" vert="horz" wrap="square" lIns="53340" tIns="53340" rIns="53340" bIns="53340" numCol="1" spcCol="1270" anchor="ctr" anchorCtr="0">
-          <a:noAutofit/>
-        </a:bodyPr>
-        <a:lstStyle/>
-        <a:p>
-          <a:pPr lvl="0" algn="ctr" defTabSz="622300">
-            <a:lnSpc>
-              <a:spcPct val="90000"/>
-            </a:lnSpc>
-            <a:spcBef>
-              <a:spcPct val="0"/>
-            </a:spcBef>
-            <a:spcAft>
-              <a:spcPct val="35000"/>
-            </a:spcAft>
-          </a:pPr>
-          <a:r>
-            <a:rPr lang="pt-BR" sz="1400" kern="1200" dirty="0"/>
-            <a:t>Registro de atendimento e cobrança.</a:t>
-          </a:r>
-        </a:p>
-      </dsp:txBody>
-      <dsp:txXfrm rot="240000">
-        <a:off x="4879730" y="2182161"/>
-        <a:ext cx="1909349" cy="659383"/>
-      </dsp:txXfrm>
-    </dsp:sp>
-    <dsp:sp modelId="{22537FDA-94C2-409E-988D-C72527DD3E04}">
-      <dsp:nvSpPr>
-        <dsp:cNvPr id="0" name=""/>
-        <dsp:cNvSpPr/>
-      </dsp:nvSpPr>
-      <dsp:spPr>
-        <a:xfrm rot="240000">
-          <a:off x="4933174" y="1476704"/>
-          <a:ext cx="1909349" cy="659383"/>
-        </a:xfrm>
-        <a:prstGeom prst="roundRect">
-          <a:avLst/>
-        </a:prstGeom>
-        <a:gradFill rotWithShape="0">
-          <a:gsLst>
-            <a:gs pos="0">
-              <a:schemeClr val="accent1">
-                <a:hueOff val="0"/>
-                <a:satOff val="0"/>
-                <a:lumOff val="0"/>
-                <a:alphaOff val="0"/>
-                <a:shade val="51000"/>
-                <a:satMod val="130000"/>
-              </a:schemeClr>
-            </a:gs>
-            <a:gs pos="80000">
-              <a:schemeClr val="accent1">
-                <a:hueOff val="0"/>
-                <a:satOff val="0"/>
-                <a:lumOff val="0"/>
-                <a:alphaOff val="0"/>
-                <a:shade val="93000"/>
-                <a:satMod val="130000"/>
-              </a:schemeClr>
-            </a:gs>
-            <a:gs pos="100000">
-              <a:schemeClr val="accent1">
-                <a:hueOff val="0"/>
-                <a:satOff val="0"/>
-                <a:lumOff val="0"/>
-                <a:alphaOff val="0"/>
-                <a:shade val="94000"/>
-                <a:satMod val="135000"/>
-              </a:schemeClr>
-            </a:gs>
-          </a:gsLst>
-          <a:lin ang="16200000" scaled="0"/>
-        </a:gradFill>
-        <a:ln>
-          <a:noFill/>
-        </a:ln>
-        <a:effectLst>
-          <a:outerShdw blurRad="40000" dist="23000" dir="5400000" rotWithShape="0">
-            <a:srgbClr val="000000">
-              <a:alpha val="35000"/>
-            </a:srgbClr>
-          </a:outerShdw>
-        </a:effectLst>
-        <a:scene3d>
-          <a:camera prst="orthographicFront"/>
-          <a:lightRig rig="threePt" dir="t">
-            <a:rot lat="0" lon="0" rev="7500000"/>
-          </a:lightRig>
-        </a:scene3d>
-        <a:sp3d prstMaterial="plastic">
-          <a:bevelT w="127000" h="25400" prst="relaxedInset"/>
-        </a:sp3d>
-      </dsp:spPr>
-      <dsp:style>
-        <a:lnRef idx="0">
-          <a:scrgbClr r="0" g="0" b="0"/>
-        </a:lnRef>
-        <a:fillRef idx="3">
-          <a:scrgbClr r="0" g="0" b="0"/>
-        </a:fillRef>
-        <a:effectRef idx="2">
-          <a:scrgbClr r="0" g="0" b="0"/>
-        </a:effectRef>
-        <a:fontRef idx="minor">
-          <a:schemeClr val="lt1"/>
-        </a:fontRef>
-      </dsp:style>
-      <dsp:txBody>
-        <a:bodyPr spcFirstLastPara="0" vert="horz" wrap="square" lIns="53340" tIns="53340" rIns="53340" bIns="53340" numCol="1" spcCol="1270" anchor="ctr" anchorCtr="0">
-          <a:noAutofit/>
-        </a:bodyPr>
-        <a:lstStyle/>
-        <a:p>
-          <a:pPr lvl="0" algn="ctr" defTabSz="622300">
-            <a:lnSpc>
-              <a:spcPct val="90000"/>
-            </a:lnSpc>
-            <a:spcBef>
-              <a:spcPct val="0"/>
-            </a:spcBef>
-            <a:spcAft>
-              <a:spcPct val="35000"/>
-            </a:spcAft>
-          </a:pPr>
-          <a:r>
-            <a:rPr lang="pt-BR" sz="1400" kern="1200" dirty="0"/>
-            <a:t>Agilidade no agendamento de atendimento</a:t>
-          </a:r>
-        </a:p>
-      </dsp:txBody>
-      <dsp:txXfrm rot="240000">
-        <a:off x="4933174" y="1476704"/>
-        <a:ext cx="1909349" cy="659383"/>
-      </dsp:txXfrm>
-    </dsp:sp>
-    <dsp:sp modelId="{56D281F3-1177-4BAA-8CCE-0F7E741222BB}">
-      <dsp:nvSpPr>
-        <dsp:cNvPr id="0" name=""/>
-        <dsp:cNvSpPr/>
-      </dsp:nvSpPr>
-      <dsp:spPr>
-        <a:xfrm rot="240000">
-          <a:off x="1992222" y="3247050"/>
-          <a:ext cx="1912448" cy="807462"/>
-        </a:xfrm>
-        <a:prstGeom prst="roundRect">
-          <a:avLst/>
-        </a:prstGeom>
-        <a:gradFill rotWithShape="0">
-          <a:gsLst>
-            <a:gs pos="0">
-              <a:schemeClr val="accent1">
-                <a:hueOff val="0"/>
-                <a:satOff val="0"/>
-                <a:lumOff val="0"/>
-                <a:alphaOff val="0"/>
-                <a:shade val="51000"/>
-                <a:satMod val="130000"/>
-              </a:schemeClr>
-            </a:gs>
-            <a:gs pos="80000">
-              <a:schemeClr val="accent1">
-                <a:hueOff val="0"/>
-                <a:satOff val="0"/>
-                <a:lumOff val="0"/>
-                <a:alphaOff val="0"/>
-                <a:shade val="93000"/>
-                <a:satMod val="130000"/>
-              </a:schemeClr>
-            </a:gs>
-            <a:gs pos="100000">
-              <a:schemeClr val="accent1">
-                <a:hueOff val="0"/>
-                <a:satOff val="0"/>
-                <a:lumOff val="0"/>
-                <a:alphaOff val="0"/>
-                <a:shade val="94000"/>
-                <a:satMod val="135000"/>
-              </a:schemeClr>
-            </a:gs>
-          </a:gsLst>
-          <a:lin ang="16200000" scaled="0"/>
-        </a:gradFill>
-        <a:ln>
-          <a:noFill/>
-        </a:ln>
-        <a:effectLst>
-          <a:outerShdw blurRad="40000" dist="23000" dir="5400000" rotWithShape="0">
-            <a:srgbClr val="000000">
-              <a:alpha val="35000"/>
-            </a:srgbClr>
-          </a:outerShdw>
-        </a:effectLst>
-        <a:scene3d>
-          <a:camera prst="orthographicFront"/>
-          <a:lightRig rig="threePt" dir="t">
-            <a:rot lat="0" lon="0" rev="7500000"/>
-          </a:lightRig>
-        </a:scene3d>
-        <a:sp3d prstMaterial="plastic">
-          <a:bevelT w="127000" h="25400" prst="relaxedInset"/>
-        </a:sp3d>
-      </dsp:spPr>
-      <dsp:style>
-        <a:lnRef idx="0">
-          <a:scrgbClr r="0" g="0" b="0"/>
-        </a:lnRef>
-        <a:fillRef idx="3">
-          <a:scrgbClr r="0" g="0" b="0"/>
-        </a:fillRef>
-        <a:effectRef idx="2">
-          <a:scrgbClr r="0" g="0" b="0"/>
-        </a:effectRef>
-        <a:fontRef idx="minor">
-          <a:schemeClr val="lt1"/>
-        </a:fontRef>
-      </dsp:style>
-      <dsp:txBody>
-        <a:bodyPr spcFirstLastPara="0" vert="horz" wrap="square" lIns="53340" tIns="53340" rIns="53340" bIns="53340" numCol="1" spcCol="1270" anchor="ctr" anchorCtr="0">
-          <a:noAutofit/>
-        </a:bodyPr>
-        <a:lstStyle/>
-        <a:p>
-          <a:pPr lvl="0" algn="ctr" defTabSz="622300">
-            <a:lnSpc>
-              <a:spcPct val="90000"/>
-            </a:lnSpc>
-            <a:spcBef>
-              <a:spcPct val="0"/>
-            </a:spcBef>
-            <a:spcAft>
-              <a:spcPct val="35000"/>
-            </a:spcAft>
-          </a:pPr>
-          <a:r>
-            <a:rPr lang="pt-BR" sz="1400" kern="1200" dirty="0"/>
-            <a:t>Cobranças indevidas e pouco controle sobre faturamento. </a:t>
-          </a:r>
-        </a:p>
-      </dsp:txBody>
-      <dsp:txXfrm rot="240000">
-        <a:off x="1992222" y="3247050"/>
-        <a:ext cx="1912448" cy="807462"/>
-      </dsp:txXfrm>
-    </dsp:sp>
-    <dsp:sp modelId="{9E256A28-F7A1-4BAD-93DB-6DF4001E9955}">
-      <dsp:nvSpPr>
-        <dsp:cNvPr id="0" name=""/>
-        <dsp:cNvSpPr/>
-      </dsp:nvSpPr>
-      <dsp:spPr>
-        <a:xfrm rot="240000">
-          <a:off x="2047913" y="2507586"/>
-          <a:ext cx="1907953" cy="659480"/>
-        </a:xfrm>
-        <a:prstGeom prst="roundRect">
-          <a:avLst/>
-        </a:prstGeom>
-        <a:gradFill rotWithShape="0">
-          <a:gsLst>
-            <a:gs pos="0">
-              <a:schemeClr val="accent1">
-                <a:hueOff val="0"/>
-                <a:satOff val="0"/>
-                <a:lumOff val="0"/>
-                <a:alphaOff val="0"/>
-                <a:shade val="51000"/>
-                <a:satMod val="130000"/>
-              </a:schemeClr>
-            </a:gs>
-            <a:gs pos="80000">
-              <a:schemeClr val="accent1">
-                <a:hueOff val="0"/>
-                <a:satOff val="0"/>
-                <a:lumOff val="0"/>
-                <a:alphaOff val="0"/>
-                <a:shade val="93000"/>
-                <a:satMod val="130000"/>
-              </a:schemeClr>
-            </a:gs>
-            <a:gs pos="100000">
-              <a:schemeClr val="accent1">
-                <a:hueOff val="0"/>
-                <a:satOff val="0"/>
-                <a:lumOff val="0"/>
-                <a:alphaOff val="0"/>
-                <a:shade val="94000"/>
-                <a:satMod val="135000"/>
-              </a:schemeClr>
-            </a:gs>
-          </a:gsLst>
-          <a:lin ang="16200000" scaled="0"/>
-        </a:gradFill>
-        <a:ln>
-          <a:noFill/>
-        </a:ln>
-        <a:effectLst>
-          <a:outerShdw blurRad="40000" dist="23000" dir="5400000" rotWithShape="0">
-            <a:srgbClr val="000000">
-              <a:alpha val="35000"/>
-            </a:srgbClr>
-          </a:outerShdw>
-        </a:effectLst>
-        <a:scene3d>
-          <a:camera prst="orthographicFront"/>
-          <a:lightRig rig="threePt" dir="t">
-            <a:rot lat="0" lon="0" rev="7500000"/>
-          </a:lightRig>
-        </a:scene3d>
-        <a:sp3d prstMaterial="plastic">
-          <a:bevelT w="127000" h="25400" prst="relaxedInset"/>
-        </a:sp3d>
-      </dsp:spPr>
-      <dsp:style>
-        <a:lnRef idx="0">
-          <a:scrgbClr r="0" g="0" b="0"/>
-        </a:lnRef>
-        <a:fillRef idx="3">
-          <a:scrgbClr r="0" g="0" b="0"/>
-        </a:fillRef>
-        <a:effectRef idx="2">
-          <a:scrgbClr r="0" g="0" b="0"/>
-        </a:effectRef>
-        <a:fontRef idx="minor">
-          <a:schemeClr val="lt1"/>
-        </a:fontRef>
-      </dsp:style>
-      <dsp:txBody>
-        <a:bodyPr spcFirstLastPara="0" vert="horz" wrap="square" lIns="53340" tIns="53340" rIns="53340" bIns="53340" numCol="1" spcCol="1270" anchor="ctr" anchorCtr="0">
-          <a:noAutofit/>
-        </a:bodyPr>
-        <a:lstStyle/>
-        <a:p>
-          <a:pPr lvl="0" algn="ctr" defTabSz="622300">
-            <a:lnSpc>
-              <a:spcPct val="90000"/>
-            </a:lnSpc>
-            <a:spcBef>
-              <a:spcPct val="0"/>
-            </a:spcBef>
-            <a:spcAft>
-              <a:spcPct val="35000"/>
-            </a:spcAft>
-          </a:pPr>
-          <a:r>
-            <a:rPr lang="pt-BR" sz="1400" kern="1200" dirty="0"/>
-            <a:t>Alto esforço no controle das informações da empresa</a:t>
-          </a:r>
-        </a:p>
-      </dsp:txBody>
-      <dsp:txXfrm rot="240000">
-        <a:off x="2047913" y="2507586"/>
-        <a:ext cx="1907953" cy="659480"/>
-      </dsp:txXfrm>
-    </dsp:sp>
-    <dsp:sp modelId="{7A3B0BBE-1442-4F18-AD09-1C73170CB2D1}">
-      <dsp:nvSpPr>
-        <dsp:cNvPr id="0" name=""/>
-        <dsp:cNvSpPr/>
-      </dsp:nvSpPr>
-      <dsp:spPr>
-        <a:xfrm rot="240000">
-          <a:off x="2100659" y="1802178"/>
-          <a:ext cx="1909349" cy="659383"/>
-        </a:xfrm>
-        <a:prstGeom prst="roundRect">
-          <a:avLst/>
-        </a:prstGeom>
-        <a:gradFill rotWithShape="0">
-          <a:gsLst>
-            <a:gs pos="0">
-              <a:schemeClr val="accent1">
-                <a:hueOff val="0"/>
-                <a:satOff val="0"/>
-                <a:lumOff val="0"/>
-                <a:alphaOff val="0"/>
-                <a:shade val="51000"/>
-                <a:satMod val="130000"/>
-              </a:schemeClr>
-            </a:gs>
-            <a:gs pos="80000">
-              <a:schemeClr val="accent1">
-                <a:hueOff val="0"/>
-                <a:satOff val="0"/>
-                <a:lumOff val="0"/>
-                <a:alphaOff val="0"/>
-                <a:shade val="93000"/>
-                <a:satMod val="130000"/>
-              </a:schemeClr>
-            </a:gs>
-            <a:gs pos="100000">
-              <a:schemeClr val="accent1">
-                <a:hueOff val="0"/>
-                <a:satOff val="0"/>
-                <a:lumOff val="0"/>
-                <a:alphaOff val="0"/>
-                <a:shade val="94000"/>
-                <a:satMod val="135000"/>
-              </a:schemeClr>
-            </a:gs>
-          </a:gsLst>
-          <a:lin ang="16200000" scaled="0"/>
-        </a:gradFill>
-        <a:ln>
-          <a:noFill/>
-        </a:ln>
-        <a:effectLst>
-          <a:outerShdw blurRad="40000" dist="23000" dir="5400000" rotWithShape="0">
-            <a:srgbClr val="000000">
-              <a:alpha val="35000"/>
-            </a:srgbClr>
-          </a:outerShdw>
-        </a:effectLst>
-        <a:scene3d>
-          <a:camera prst="orthographicFront"/>
-          <a:lightRig rig="threePt" dir="t">
-            <a:rot lat="0" lon="0" rev="7500000"/>
-          </a:lightRig>
-        </a:scene3d>
-        <a:sp3d prstMaterial="plastic">
-          <a:bevelT w="127000" h="25400" prst="relaxedInset"/>
-        </a:sp3d>
-      </dsp:spPr>
-      <dsp:style>
-        <a:lnRef idx="0">
-          <a:scrgbClr r="0" g="0" b="0"/>
-        </a:lnRef>
-        <a:fillRef idx="3">
-          <a:scrgbClr r="0" g="0" b="0"/>
-        </a:fillRef>
-        <a:effectRef idx="2">
-          <a:scrgbClr r="0" g="0" b="0"/>
-        </a:effectRef>
-        <a:fontRef idx="minor">
-          <a:schemeClr val="lt1"/>
-        </a:fontRef>
-      </dsp:style>
-      <dsp:txBody>
-        <a:bodyPr spcFirstLastPara="0" vert="horz" wrap="square" lIns="53340" tIns="53340" rIns="53340" bIns="53340" numCol="1" spcCol="1270" anchor="ctr" anchorCtr="0">
-          <a:noAutofit/>
-        </a:bodyPr>
-        <a:lstStyle/>
-        <a:p>
-          <a:pPr lvl="0" algn="ctr" defTabSz="622300">
-            <a:lnSpc>
-              <a:spcPct val="90000"/>
-            </a:lnSpc>
-            <a:spcBef>
-              <a:spcPct val="0"/>
-            </a:spcBef>
-            <a:spcAft>
-              <a:spcPct val="35000"/>
-            </a:spcAft>
-          </a:pPr>
-          <a:r>
-            <a:rPr lang="pt-BR" sz="1400" kern="1200" dirty="0"/>
-            <a:t>Demora no agendamento do atendimento.</a:t>
-          </a:r>
-        </a:p>
-      </dsp:txBody>
-      <dsp:txXfrm rot="240000">
-        <a:off x="2100659" y="1802178"/>
-        <a:ext cx="1909349" cy="659383"/>
-      </dsp:txXfrm>
-    </dsp:sp>
   </dsp:spTree>
 </dsp:drawing>
 </file>
@@ -6006,7 +4899,7 @@
         <a:rot lat="0" lon="0" rev="7500000"/>
       </a:lightRig>
     </dgm:scene3d>
-    <dgm:sp3d z="-152400" extrusionH="63500" contourW="127000" prstMaterial="matte">
+    <dgm:sp3d z="-152400" extrusionH="63500" contourW="12700" prstMaterial="matte">
       <a:contourClr>
         <a:schemeClr val="lt1"/>
       </a:contourClr>
@@ -7240,7 +6133,7 @@
     </p:spTree>
     <p:extLst>
       <p:ext uri="{BB962C8B-B14F-4D97-AF65-F5344CB8AC3E}">
-        <p14:creationId xmlns:p14="http://schemas.microsoft.com/office/powerpoint/2010/main" xmlns="" val="671299352"/>
+        <p14:creationId xmlns:p14="http://schemas.microsoft.com/office/powerpoint/2010/main" val="671299352"/>
       </p:ext>
     </p:extLst>
   </p:cSld>
@@ -7450,7 +6343,7 @@
     </p:spTree>
     <p:extLst>
       <p:ext uri="{BB962C8B-B14F-4D97-AF65-F5344CB8AC3E}">
-        <p14:creationId xmlns:p14="http://schemas.microsoft.com/office/powerpoint/2010/main" xmlns="" val="3274854824"/>
+        <p14:creationId xmlns:p14="http://schemas.microsoft.com/office/powerpoint/2010/main" val="3274854824"/>
       </p:ext>
     </p:extLst>
   </p:cSld>
@@ -7545,7 +6438,7 @@
     </p:spTree>
     <p:extLst>
       <p:ext uri="{BB962C8B-B14F-4D97-AF65-F5344CB8AC3E}">
-        <p14:creationId xmlns:p14="http://schemas.microsoft.com/office/powerpoint/2010/main" xmlns="" val="2786033099"/>
+        <p14:creationId xmlns:p14="http://schemas.microsoft.com/office/powerpoint/2010/main" val="2786033099"/>
       </p:ext>
     </p:extLst>
   </p:cSld>
@@ -7638,7 +6531,7 @@
     </p:spTree>
     <p:extLst>
       <p:ext uri="{BB962C8B-B14F-4D97-AF65-F5344CB8AC3E}">
-        <p14:creationId xmlns:p14="http://schemas.microsoft.com/office/powerpoint/2010/main" xmlns="" val="1775795487"/>
+        <p14:creationId xmlns:p14="http://schemas.microsoft.com/office/powerpoint/2010/main" val="1775795487"/>
       </p:ext>
     </p:extLst>
   </p:cSld>
@@ -7734,7 +6627,7 @@
     </p:spTree>
     <p:extLst>
       <p:ext uri="{BB962C8B-B14F-4D97-AF65-F5344CB8AC3E}">
-        <p14:creationId xmlns:p14="http://schemas.microsoft.com/office/powerpoint/2010/main" xmlns="" val="4018469940"/>
+        <p14:creationId xmlns:p14="http://schemas.microsoft.com/office/powerpoint/2010/main" val="4018469940"/>
       </p:ext>
     </p:extLst>
   </p:cSld>
@@ -7850,7 +6743,7 @@
     </p:spTree>
     <p:extLst>
       <p:ext uri="{BB962C8B-B14F-4D97-AF65-F5344CB8AC3E}">
-        <p14:creationId xmlns:p14="http://schemas.microsoft.com/office/powerpoint/2010/main" xmlns="" val="3951886733"/>
+        <p14:creationId xmlns:p14="http://schemas.microsoft.com/office/powerpoint/2010/main" val="3951886733"/>
       </p:ext>
     </p:extLst>
   </p:cSld>
@@ -8141,7 +7034,7 @@
     </p:spTree>
     <p:extLst>
       <p:ext uri="{BB962C8B-B14F-4D97-AF65-F5344CB8AC3E}">
-        <p14:creationId xmlns:p14="http://schemas.microsoft.com/office/powerpoint/2010/main" xmlns="" val="1588299535"/>
+        <p14:creationId xmlns:p14="http://schemas.microsoft.com/office/powerpoint/2010/main" val="1588299535"/>
       </p:ext>
     </p:extLst>
   </p:cSld>
@@ -8190,14 +7083,14 @@
           </a:ln>
           <a:extLst>
             <a:ext uri="{909E8E84-426E-40DD-AFC4-6F175D3DCCD1}">
-              <a14:hiddenFill xmlns:a14="http://schemas.microsoft.com/office/drawing/2010/main" xmlns="">
+              <a14:hiddenFill xmlns:a14="http://schemas.microsoft.com/office/drawing/2010/main">
                 <a:solidFill>
                   <a:srgbClr val="FFFFFF"/>
                 </a:solidFill>
               </a14:hiddenFill>
             </a:ext>
             <a:ext uri="{91240B29-F687-4F45-9708-019B960494DF}">
-              <a14:hiddenLine xmlns:a14="http://schemas.microsoft.com/office/drawing/2010/main" xmlns="" w="9525">
+              <a14:hiddenLine xmlns:a14="http://schemas.microsoft.com/office/drawing/2010/main" w="9525">
                 <a:solidFill>
                   <a:srgbClr val="000000"/>
                 </a:solidFill>
@@ -8613,7 +7506,7 @@
     </p:spTree>
     <p:extLst>
       <p:ext uri="{BB962C8B-B14F-4D97-AF65-F5344CB8AC3E}">
-        <p14:creationId xmlns:p14="http://schemas.microsoft.com/office/powerpoint/2010/main" xmlns="" val="3359836669"/>
+        <p14:creationId xmlns:p14="http://schemas.microsoft.com/office/powerpoint/2010/main" val="3359836669"/>
       </p:ext>
     </p:extLst>
   </p:cSld>
@@ -8643,7 +7536,7 @@
     </p:spTree>
     <p:extLst>
       <p:ext uri="{BB962C8B-B14F-4D97-AF65-F5344CB8AC3E}">
-        <p14:creationId xmlns:p14="http://schemas.microsoft.com/office/powerpoint/2010/main" xmlns="" val="413836109"/>
+        <p14:creationId xmlns:p14="http://schemas.microsoft.com/office/powerpoint/2010/main" val="413836109"/>
       </p:ext>
     </p:extLst>
   </p:cSld>
@@ -8743,7 +7636,7 @@
           <a:blip r:embed="rId2" cstate="print">
             <a:extLst>
               <a:ext uri="{28A0092B-C50C-407E-A947-70E740481C1C}">
-                <a14:useLocalDpi xmlns:a14="http://schemas.microsoft.com/office/drawing/2010/main" xmlns="" val="0"/>
+                <a14:useLocalDpi xmlns:a14="http://schemas.microsoft.com/office/drawing/2010/main" val="0"/>
               </a:ext>
             </a:extLst>
           </a:blip>
@@ -8766,14 +7659,14 @@
           </a:ln>
           <a:extLst>
             <a:ext uri="{909E8E84-426E-40DD-AFC4-6F175D3DCCD1}">
-              <a14:hiddenFill xmlns:a14="http://schemas.microsoft.com/office/drawing/2010/main" xmlns="">
+              <a14:hiddenFill xmlns:a14="http://schemas.microsoft.com/office/drawing/2010/main">
                 <a:solidFill>
                   <a:srgbClr val="FFFFFF"/>
                 </a:solidFill>
               </a14:hiddenFill>
             </a:ext>
             <a:ext uri="{91240B29-F687-4F45-9708-019B960494DF}">
-              <a14:hiddenLine xmlns:a14="http://schemas.microsoft.com/office/drawing/2010/main" xmlns="" w="9525">
+              <a14:hiddenLine xmlns:a14="http://schemas.microsoft.com/office/drawing/2010/main" w="9525">
                 <a:solidFill>
                   <a:srgbClr val="000000"/>
                 </a:solidFill>
@@ -8837,7 +7730,7 @@
     </p:spTree>
     <p:extLst>
       <p:ext uri="{BB962C8B-B14F-4D97-AF65-F5344CB8AC3E}">
-        <p14:creationId xmlns:p14="http://schemas.microsoft.com/office/powerpoint/2010/main" xmlns="" val="2156181659"/>
+        <p14:creationId xmlns:p14="http://schemas.microsoft.com/office/powerpoint/2010/main" val="2156181659"/>
       </p:ext>
     </p:extLst>
   </p:cSld>
@@ -9004,7 +7897,7 @@
     </p:spTree>
     <p:extLst>
       <p:ext uri="{BB962C8B-B14F-4D97-AF65-F5344CB8AC3E}">
-        <p14:creationId xmlns:p14="http://schemas.microsoft.com/office/powerpoint/2010/main" xmlns="" val="83598666"/>
+        <p14:creationId xmlns:p14="http://schemas.microsoft.com/office/powerpoint/2010/main" val="83598666"/>
       </p:ext>
     </p:extLst>
   </p:cSld>
@@ -9048,7 +7941,7 @@
           <a:blip r:embed="rId8" cstate="print">
             <a:extLst>
               <a:ext uri="{28A0092B-C50C-407E-A947-70E740481C1C}">
-                <a14:useLocalDpi xmlns:a14="http://schemas.microsoft.com/office/drawing/2010/main" xmlns="" val="0"/>
+                <a14:useLocalDpi xmlns:a14="http://schemas.microsoft.com/office/drawing/2010/main" val="0"/>
               </a:ext>
             </a:extLst>
           </a:blip>
@@ -9071,14 +7964,14 @@
           </a:ln>
           <a:extLst>
             <a:ext uri="{909E8E84-426E-40DD-AFC4-6F175D3DCCD1}">
-              <a14:hiddenFill xmlns:a14="http://schemas.microsoft.com/office/drawing/2010/main" xmlns="">
+              <a14:hiddenFill xmlns:a14="http://schemas.microsoft.com/office/drawing/2010/main">
                 <a:solidFill>
                   <a:srgbClr val="FFFFFF"/>
                 </a:solidFill>
               </a14:hiddenFill>
             </a:ext>
             <a:ext uri="{91240B29-F687-4F45-9708-019B960494DF}">
-              <a14:hiddenLine xmlns:a14="http://schemas.microsoft.com/office/drawing/2010/main" xmlns="" w="9525">
+              <a14:hiddenLine xmlns:a14="http://schemas.microsoft.com/office/drawing/2010/main" w="9525">
                 <a:solidFill>
                   <a:srgbClr val="000000"/>
                 </a:solidFill>
@@ -9151,7 +8044,7 @@
           <a:blip r:embed="rId9" cstate="print">
             <a:extLst>
               <a:ext uri="{28A0092B-C50C-407E-A947-70E740481C1C}">
-                <a14:useLocalDpi xmlns:a14="http://schemas.microsoft.com/office/drawing/2010/main" xmlns="" val="0"/>
+                <a14:useLocalDpi xmlns:a14="http://schemas.microsoft.com/office/drawing/2010/main" val="0"/>
               </a:ext>
             </a:extLst>
           </a:blip>
@@ -9174,14 +8067,14 @@
           </a:ln>
           <a:extLst>
             <a:ext uri="{909E8E84-426E-40DD-AFC4-6F175D3DCCD1}">
-              <a14:hiddenFill xmlns:a14="http://schemas.microsoft.com/office/drawing/2010/main" xmlns="">
+              <a14:hiddenFill xmlns:a14="http://schemas.microsoft.com/office/drawing/2010/main">
                 <a:solidFill>
                   <a:srgbClr val="FFFFFF"/>
                 </a:solidFill>
               </a14:hiddenFill>
             </a:ext>
             <a:ext uri="{91240B29-F687-4F45-9708-019B960494DF}">
-              <a14:hiddenLine xmlns:a14="http://schemas.microsoft.com/office/drawing/2010/main" xmlns="" w="9525">
+              <a14:hiddenLine xmlns:a14="http://schemas.microsoft.com/office/drawing/2010/main" w="9525">
                 <a:solidFill>
                   <a:srgbClr val="000000"/>
                 </a:solidFill>
@@ -9745,14 +8638,14 @@
             </a:ln>
             <a:extLst>
               <a:ext uri="{909E8E84-426E-40DD-AFC4-6F175D3DCCD1}">
-                <a14:hiddenFill xmlns:a14="http://schemas.microsoft.com/office/drawing/2010/main" xmlns="">
+                <a14:hiddenFill xmlns:a14="http://schemas.microsoft.com/office/drawing/2010/main">
                   <a:solidFill>
                     <a:srgbClr val="FFFFFF"/>
                   </a:solidFill>
                 </a14:hiddenFill>
               </a:ext>
               <a:ext uri="{91240B29-F687-4F45-9708-019B960494DF}">
-                <a14:hiddenLine xmlns:a14="http://schemas.microsoft.com/office/drawing/2010/main" xmlns="" w="9525">
+                <a14:hiddenLine xmlns:a14="http://schemas.microsoft.com/office/drawing/2010/main" w="9525">
                   <a:solidFill>
                     <a:srgbClr val="000000"/>
                   </a:solidFill>
@@ -9902,14 +8795,14 @@
             </a:ln>
             <a:extLst>
               <a:ext uri="{909E8E84-426E-40DD-AFC4-6F175D3DCCD1}">
-                <a14:hiddenFill xmlns:a14="http://schemas.microsoft.com/office/drawing/2010/main" xmlns="">
+                <a14:hiddenFill xmlns:a14="http://schemas.microsoft.com/office/drawing/2010/main">
                   <a:solidFill>
                     <a:srgbClr val="FFFFFF"/>
                   </a:solidFill>
                 </a14:hiddenFill>
               </a:ext>
               <a:ext uri="{91240B29-F687-4F45-9708-019B960494DF}">
-                <a14:hiddenLine xmlns:a14="http://schemas.microsoft.com/office/drawing/2010/main" xmlns="" w="9525">
+                <a14:hiddenLine xmlns:a14="http://schemas.microsoft.com/office/drawing/2010/main" w="9525">
                   <a:solidFill>
                     <a:srgbClr val="000000"/>
                   </a:solidFill>
@@ -10760,14 +9653,14 @@
             </a:ln>
             <a:extLst>
               <a:ext uri="{909E8E84-426E-40DD-AFC4-6F175D3DCCD1}">
-                <a14:hiddenFill xmlns:a14="http://schemas.microsoft.com/office/drawing/2010/main" xmlns="">
+                <a14:hiddenFill xmlns:a14="http://schemas.microsoft.com/office/drawing/2010/main">
                   <a:solidFill>
                     <a:srgbClr val="FFFFFF"/>
                   </a:solidFill>
                 </a14:hiddenFill>
               </a:ext>
               <a:ext uri="{91240B29-F687-4F45-9708-019B960494DF}">
-                <a14:hiddenLine xmlns:a14="http://schemas.microsoft.com/office/drawing/2010/main" xmlns="" w="9525">
+                <a14:hiddenLine xmlns:a14="http://schemas.microsoft.com/office/drawing/2010/main" w="9525">
                   <a:solidFill>
                     <a:srgbClr val="000000"/>
                   </a:solidFill>
@@ -10917,14 +9810,14 @@
             </a:ln>
             <a:extLst>
               <a:ext uri="{909E8E84-426E-40DD-AFC4-6F175D3DCCD1}">
-                <a14:hiddenFill xmlns:a14="http://schemas.microsoft.com/office/drawing/2010/main" xmlns="">
+                <a14:hiddenFill xmlns:a14="http://schemas.microsoft.com/office/drawing/2010/main">
                   <a:solidFill>
                     <a:srgbClr val="FFFFFF"/>
                   </a:solidFill>
                 </a14:hiddenFill>
               </a:ext>
               <a:ext uri="{91240B29-F687-4F45-9708-019B960494DF}">
-                <a14:hiddenLine xmlns:a14="http://schemas.microsoft.com/office/drawing/2010/main" xmlns="" w="9525">
+                <a14:hiddenLine xmlns:a14="http://schemas.microsoft.com/office/drawing/2010/main" w="9525">
                   <a:solidFill>
                     <a:srgbClr val="000000"/>
                   </a:solidFill>
@@ -11169,7 +10062,7 @@
     </p:spTree>
     <p:extLst>
       <p:ext uri="{BB962C8B-B14F-4D97-AF65-F5344CB8AC3E}">
-        <p14:creationId xmlns:p14="http://schemas.microsoft.com/office/powerpoint/2010/main" xmlns="" val="3409322625"/>
+        <p14:creationId xmlns:p14="http://schemas.microsoft.com/office/powerpoint/2010/main" val="3409322625"/>
       </p:ext>
     </p:extLst>
   </p:cSld>
@@ -11211,7 +10104,7 @@
           <p:cNvPr id="2" name="Título 1">
             <a:extLst>
               <a:ext uri="{FF2B5EF4-FFF2-40B4-BE49-F238E27FC236}">
-                <a16:creationId xmlns="" xmlns:a16="http://schemas.microsoft.com/office/drawing/2014/main" id="{4420E5F6-C592-489E-8742-39113C67F28C}"/>
+                <a16:creationId xmlns:a16="http://schemas.microsoft.com/office/drawing/2014/main" xmlns="" id="{4420E5F6-C592-489E-8742-39113C67F28C}"/>
               </a:ext>
             </a:extLst>
           </p:cNvPr>
@@ -11239,7 +10132,7 @@
           <p:cNvPr id="3" name="Espaço Reservado para Conteúdo 2">
             <a:extLst>
               <a:ext uri="{FF2B5EF4-FFF2-40B4-BE49-F238E27FC236}">
-                <a16:creationId xmlns="" xmlns:a16="http://schemas.microsoft.com/office/drawing/2014/main" id="{FB12D05B-E47F-4BA3-B1A7-F1DCD4D8F90E}"/>
+                <a16:creationId xmlns:a16="http://schemas.microsoft.com/office/drawing/2014/main" xmlns="" id="{FB12D05B-E47F-4BA3-B1A7-F1DCD4D8F90E}"/>
               </a:ext>
             </a:extLst>
           </p:cNvPr>
@@ -11452,7 +10345,7 @@
     </p:spTree>
     <p:extLst>
       <p:ext uri="{BB962C8B-B14F-4D97-AF65-F5344CB8AC3E}">
-        <p14:creationId xmlns:p14="http://schemas.microsoft.com/office/powerpoint/2010/main" xmlns="" val="732095642"/>
+        <p14:creationId xmlns:p14="http://schemas.microsoft.com/office/powerpoint/2010/main" val="732095642"/>
       </p:ext>
     </p:extLst>
   </p:cSld>
@@ -11491,7 +10384,7 @@
           <p:cNvPr id="2" name="Título 1">
             <a:extLst>
               <a:ext uri="{FF2B5EF4-FFF2-40B4-BE49-F238E27FC236}">
-                <a16:creationId xmlns="" xmlns:a16="http://schemas.microsoft.com/office/drawing/2014/main" id="{BEBA4382-BFBE-49EA-B613-397871EFBC81}"/>
+                <a16:creationId xmlns:a16="http://schemas.microsoft.com/office/drawing/2014/main" xmlns="" id="{BEBA4382-BFBE-49EA-B613-397871EFBC81}"/>
               </a:ext>
             </a:extLst>
           </p:cNvPr>
@@ -11519,7 +10412,7 @@
           <p:cNvPr id="4" name="Picture 2">
             <a:extLst>
               <a:ext uri="{FF2B5EF4-FFF2-40B4-BE49-F238E27FC236}">
-                <a16:creationId xmlns="" xmlns:a16="http://schemas.microsoft.com/office/drawing/2014/main" id="{73C6ED76-2527-4DEA-B4E5-D39F619C62E1}"/>
+                <a16:creationId xmlns:a16="http://schemas.microsoft.com/office/drawing/2014/main" xmlns="" id="{73C6ED76-2527-4DEA-B4E5-D39F619C62E1}"/>
               </a:ext>
             </a:extLst>
           </p:cNvPr>
@@ -11534,7 +10427,7 @@
           <a:blip r:embed="rId2" cstate="print">
             <a:extLst>
               <a:ext uri="{28A0092B-C50C-407E-A947-70E740481C1C}">
-                <a14:useLocalDpi xmlns:a14="http://schemas.microsoft.com/office/drawing/2010/main" xmlns="" val="0"/>
+                <a14:useLocalDpi xmlns:a14="http://schemas.microsoft.com/office/drawing/2010/main" val="0"/>
               </a:ext>
             </a:extLst>
           </a:blip>
@@ -11557,14 +10450,14 @@
           </a:ln>
           <a:extLst>
             <a:ext uri="{909E8E84-426E-40DD-AFC4-6F175D3DCCD1}">
-              <a14:hiddenFill xmlns:a14="http://schemas.microsoft.com/office/drawing/2010/main" xmlns="">
+              <a14:hiddenFill xmlns:a14="http://schemas.microsoft.com/office/drawing/2010/main">
                 <a:solidFill>
                   <a:srgbClr val="FFFFFF"/>
                 </a:solidFill>
               </a14:hiddenFill>
             </a:ext>
             <a:ext uri="{91240B29-F687-4F45-9708-019B960494DF}">
-              <a14:hiddenLine xmlns:a14="http://schemas.microsoft.com/office/drawing/2010/main" xmlns="" w="9525">
+              <a14:hiddenLine xmlns:a14="http://schemas.microsoft.com/office/drawing/2010/main" w="9525">
                 <a:solidFill>
                   <a:srgbClr val="000000"/>
                 </a:solidFill>
@@ -11579,7 +10472,7 @@
     </p:spTree>
     <p:extLst>
       <p:ext uri="{BB962C8B-B14F-4D97-AF65-F5344CB8AC3E}">
-        <p14:creationId xmlns:p14="http://schemas.microsoft.com/office/powerpoint/2010/main" xmlns="" val="1528951847"/>
+        <p14:creationId xmlns:p14="http://schemas.microsoft.com/office/powerpoint/2010/main" val="1528951847"/>
       </p:ext>
     </p:extLst>
   </p:cSld>
@@ -11618,7 +10511,7 @@
           <p:cNvPr id="2" name="Título 1">
             <a:extLst>
               <a:ext uri="{FF2B5EF4-FFF2-40B4-BE49-F238E27FC236}">
-                <a16:creationId xmlns="" xmlns:a16="http://schemas.microsoft.com/office/drawing/2014/main" id="{4242F5FA-70CB-4D15-8FA2-0A8B9B2D9EE8}"/>
+                <a16:creationId xmlns:a16="http://schemas.microsoft.com/office/drawing/2014/main" xmlns="" id="{4242F5FA-70CB-4D15-8FA2-0A8B9B2D9EE8}"/>
               </a:ext>
             </a:extLst>
           </p:cNvPr>
@@ -11646,7 +10539,7 @@
           <p:cNvPr id="5" name="Espaço Reservado para Conteúdo 4">
             <a:extLst>
               <a:ext uri="{FF2B5EF4-FFF2-40B4-BE49-F238E27FC236}">
-                <a16:creationId xmlns="" xmlns:a16="http://schemas.microsoft.com/office/drawing/2014/main" id="{0EB6ED7E-6CFB-4E85-B7ED-4873840A1BE0}"/>
+                <a16:creationId xmlns:a16="http://schemas.microsoft.com/office/drawing/2014/main" xmlns="" id="{0EB6ED7E-6CFB-4E85-B7ED-4873840A1BE0}"/>
               </a:ext>
             </a:extLst>
           </p:cNvPr>
@@ -11661,7 +10554,7 @@
           <a:blip r:embed="rId2" cstate="print">
             <a:extLst>
               <a:ext uri="{28A0092B-C50C-407E-A947-70E740481C1C}">
-                <a14:useLocalDpi xmlns:a14="http://schemas.microsoft.com/office/drawing/2010/main" xmlns="" val="0"/>
+                <a14:useLocalDpi xmlns:a14="http://schemas.microsoft.com/office/drawing/2010/main" val="0"/>
               </a:ext>
             </a:extLst>
           </a:blip>
@@ -11679,7 +10572,7 @@
     </p:spTree>
     <p:extLst>
       <p:ext uri="{BB962C8B-B14F-4D97-AF65-F5344CB8AC3E}">
-        <p14:creationId xmlns:p14="http://schemas.microsoft.com/office/powerpoint/2010/main" xmlns="" val="3460844110"/>
+        <p14:creationId xmlns:p14="http://schemas.microsoft.com/office/powerpoint/2010/main" val="3460844110"/>
       </p:ext>
     </p:extLst>
   </p:cSld>
@@ -11718,7 +10611,7 @@
           <p:cNvPr id="2" name="Título 1">
             <a:extLst>
               <a:ext uri="{FF2B5EF4-FFF2-40B4-BE49-F238E27FC236}">
-                <a16:creationId xmlns="" xmlns:a16="http://schemas.microsoft.com/office/drawing/2014/main" id="{1258A6B5-29A2-40E3-9451-ECF7822CE513}"/>
+                <a16:creationId xmlns:a16="http://schemas.microsoft.com/office/drawing/2014/main" xmlns="" id="{1258A6B5-29A2-40E3-9451-ECF7822CE513}"/>
               </a:ext>
             </a:extLst>
           </p:cNvPr>
@@ -11746,7 +10639,7 @@
           <p:cNvPr id="5" name="Espaço Reservado para Conteúdo 4">
             <a:extLst>
               <a:ext uri="{FF2B5EF4-FFF2-40B4-BE49-F238E27FC236}">
-                <a16:creationId xmlns="" xmlns:a16="http://schemas.microsoft.com/office/drawing/2014/main" id="{B614B2BC-1672-4B4C-B1D9-8F6906444D11}"/>
+                <a16:creationId xmlns:a16="http://schemas.microsoft.com/office/drawing/2014/main" xmlns="" id="{B614B2BC-1672-4B4C-B1D9-8F6906444D11}"/>
               </a:ext>
             </a:extLst>
           </p:cNvPr>
@@ -11761,7 +10654,7 @@
           <a:blip r:embed="rId2" cstate="print">
             <a:extLst>
               <a:ext uri="{28A0092B-C50C-407E-A947-70E740481C1C}">
-                <a14:useLocalDpi xmlns:a14="http://schemas.microsoft.com/office/drawing/2010/main" xmlns="" val="0"/>
+                <a14:useLocalDpi xmlns:a14="http://schemas.microsoft.com/office/drawing/2010/main" val="0"/>
               </a:ext>
             </a:extLst>
           </a:blip>
@@ -11779,7 +10672,7 @@
     </p:spTree>
     <p:extLst>
       <p:ext uri="{BB962C8B-B14F-4D97-AF65-F5344CB8AC3E}">
-        <p14:creationId xmlns:p14="http://schemas.microsoft.com/office/powerpoint/2010/main" xmlns="" val="255138212"/>
+        <p14:creationId xmlns:p14="http://schemas.microsoft.com/office/powerpoint/2010/main" val="255138212"/>
       </p:ext>
     </p:extLst>
   </p:cSld>
@@ -11818,7 +10711,7 @@
           <p:cNvPr id="2" name="Título 1">
             <a:extLst>
               <a:ext uri="{FF2B5EF4-FFF2-40B4-BE49-F238E27FC236}">
-                <a16:creationId xmlns="" xmlns:a16="http://schemas.microsoft.com/office/drawing/2014/main" id="{4DBEE726-2AAB-4969-973C-8C26FE82FEF2}"/>
+                <a16:creationId xmlns:a16="http://schemas.microsoft.com/office/drawing/2014/main" xmlns="" id="{4DBEE726-2AAB-4969-973C-8C26FE82FEF2}"/>
               </a:ext>
             </a:extLst>
           </p:cNvPr>
@@ -11846,7 +10739,7 @@
           <p:cNvPr id="5" name="Espaço Reservado para Conteúdo 4">
             <a:extLst>
               <a:ext uri="{FF2B5EF4-FFF2-40B4-BE49-F238E27FC236}">
-                <a16:creationId xmlns="" xmlns:a16="http://schemas.microsoft.com/office/drawing/2014/main" id="{D0E0BD5E-9A99-41F6-AEAA-D122187C4B06}"/>
+                <a16:creationId xmlns:a16="http://schemas.microsoft.com/office/drawing/2014/main" xmlns="" id="{D0E0BD5E-9A99-41F6-AEAA-D122187C4B06}"/>
               </a:ext>
             </a:extLst>
           </p:cNvPr>
@@ -11861,7 +10754,7 @@
           <a:blip r:embed="rId2" cstate="print">
             <a:extLst>
               <a:ext uri="{28A0092B-C50C-407E-A947-70E740481C1C}">
-                <a14:useLocalDpi xmlns:a14="http://schemas.microsoft.com/office/drawing/2010/main" xmlns="" val="0"/>
+                <a14:useLocalDpi xmlns:a14="http://schemas.microsoft.com/office/drawing/2010/main" val="0"/>
               </a:ext>
             </a:extLst>
           </a:blip>
@@ -11879,7 +10772,7 @@
     </p:spTree>
     <p:extLst>
       <p:ext uri="{BB962C8B-B14F-4D97-AF65-F5344CB8AC3E}">
-        <p14:creationId xmlns:p14="http://schemas.microsoft.com/office/powerpoint/2010/main" xmlns="" val="2944428277"/>
+        <p14:creationId xmlns:p14="http://schemas.microsoft.com/office/powerpoint/2010/main" val="2944428277"/>
       </p:ext>
     </p:extLst>
   </p:cSld>
@@ -11943,7 +10836,7 @@
           <p:cNvPr id="5" name="Picture 4">
             <a:extLst>
               <a:ext uri="{FF2B5EF4-FFF2-40B4-BE49-F238E27FC236}">
-                <a16:creationId xmlns="" xmlns:a16="http://schemas.microsoft.com/office/drawing/2014/main" id="{47BB9FD5-5FAB-47BE-936F-4BD6B4C3D29C}"/>
+                <a16:creationId xmlns:a16="http://schemas.microsoft.com/office/drawing/2014/main" xmlns="" id="{47BB9FD5-5FAB-47BE-936F-4BD6B4C3D29C}"/>
               </a:ext>
             </a:extLst>
           </p:cNvPr>
@@ -12076,14 +10969,14 @@
             </a:ln>
             <a:extLst>
               <a:ext uri="{909E8E84-426E-40DD-AFC4-6F175D3DCCD1}">
-                <a14:hiddenFill xmlns:a14="http://schemas.microsoft.com/office/drawing/2010/main" xmlns="">
+                <a14:hiddenFill xmlns:a14="http://schemas.microsoft.com/office/drawing/2010/main">
                   <a:solidFill>
                     <a:srgbClr val="FFFFFF"/>
                   </a:solidFill>
                 </a14:hiddenFill>
               </a:ext>
               <a:ext uri="{91240B29-F687-4F45-9708-019B960494DF}">
-                <a14:hiddenLine xmlns:a14="http://schemas.microsoft.com/office/drawing/2010/main" xmlns="" w="9525">
+                <a14:hiddenLine xmlns:a14="http://schemas.microsoft.com/office/drawing/2010/main" w="9525">
                   <a:solidFill>
                     <a:srgbClr val="000000"/>
                   </a:solidFill>
@@ -12233,14 +11126,14 @@
             </a:ln>
             <a:extLst>
               <a:ext uri="{909E8E84-426E-40DD-AFC4-6F175D3DCCD1}">
-                <a14:hiddenFill xmlns:a14="http://schemas.microsoft.com/office/drawing/2010/main" xmlns="">
+                <a14:hiddenFill xmlns:a14="http://schemas.microsoft.com/office/drawing/2010/main">
                   <a:solidFill>
                     <a:srgbClr val="FFFFFF"/>
                   </a:solidFill>
                 </a14:hiddenFill>
               </a:ext>
               <a:ext uri="{91240B29-F687-4F45-9708-019B960494DF}">
-                <a14:hiddenLine xmlns:a14="http://schemas.microsoft.com/office/drawing/2010/main" xmlns="" w="9525">
+                <a14:hiddenLine xmlns:a14="http://schemas.microsoft.com/office/drawing/2010/main" w="9525">
                   <a:solidFill>
                     <a:srgbClr val="000000"/>
                   </a:solidFill>
@@ -12485,7 +11378,7 @@
     </p:spTree>
     <p:extLst>
       <p:ext uri="{BB962C8B-B14F-4D97-AF65-F5344CB8AC3E}">
-        <p14:creationId xmlns:p14="http://schemas.microsoft.com/office/powerpoint/2010/main" xmlns="" val="2461302196"/>
+        <p14:creationId xmlns:p14="http://schemas.microsoft.com/office/powerpoint/2010/main" val="2461302196"/>
       </p:ext>
     </p:extLst>
   </p:cSld>
@@ -12564,14 +11457,14 @@
           </a:xfrm>
           <a:extLst>
             <a:ext uri="{909E8E84-426E-40DD-AFC4-6F175D3DCCD1}">
-              <a14:hiddenFill xmlns:a14="http://schemas.microsoft.com/office/drawing/2010/main" xmlns="">
+              <a14:hiddenFill xmlns:a14="http://schemas.microsoft.com/office/drawing/2010/main">
                 <a:solidFill>
                   <a:srgbClr val="FFFFFF"/>
                 </a:solidFill>
               </a14:hiddenFill>
             </a:ext>
             <a:ext uri="{91240B29-F687-4F45-9708-019B960494DF}">
-              <a14:hiddenLine xmlns:a14="http://schemas.microsoft.com/office/drawing/2010/main" xmlns="" w="9525">
+              <a14:hiddenLine xmlns:a14="http://schemas.microsoft.com/office/drawing/2010/main" w="9525">
                 <a:solidFill>
                   <a:srgbClr val="000000"/>
                 </a:solidFill>
@@ -12719,7 +11612,7 @@
     </p:spTree>
     <p:extLst>
       <p:ext uri="{BB962C8B-B14F-4D97-AF65-F5344CB8AC3E}">
-        <p14:creationId xmlns:p14="http://schemas.microsoft.com/office/powerpoint/2010/main" xmlns="" val="1166103754"/>
+        <p14:creationId xmlns:p14="http://schemas.microsoft.com/office/powerpoint/2010/main" val="1166103754"/>
       </p:ext>
     </p:extLst>
   </p:cSld>
@@ -12758,7 +11651,7 @@
       </p:grpSpPr>
       <p:sp>
         <p:nvSpPr>
-          <p:cNvPr id="4" name="Título 3"/>
+          <p:cNvPr id="2" name="Título 1"/>
           <p:cNvSpPr>
             <a:spLocks noGrp="1"/>
           </p:cNvSpPr>
@@ -12771,89 +11664,27 @@
           <a:bodyPr/>
           <a:lstStyle/>
           <a:p>
-            <a:pPr eaLnBrk="1" hangingPunct="1">
-              <a:defRPr/>
-            </a:pPr>
             <a:r>
-              <a:rPr lang="pt-BR" dirty="0"/>
+              <a:rPr lang="pt-BR" dirty="0" smtClean="0"/>
               <a:t>MODULO EMPRESA</a:t>
             </a:r>
-          </a:p>
-        </p:txBody>
-      </p:sp>
-      <p:sp>
-        <p:nvSpPr>
-          <p:cNvPr id="21507" name="Espaço Reservado para Conteúdo 4"/>
-          <p:cNvSpPr>
-            <a:spLocks noGrp="1"/>
-          </p:cNvSpPr>
-          <p:nvPr>
-            <p:ph idx="1"/>
-          </p:nvPr>
-        </p:nvSpPr>
-        <p:spPr bwMode="auto">
-          <a:xfrm>
-            <a:off x="179512" y="1340768"/>
-            <a:ext cx="8785225" cy="5328592"/>
-          </a:xfrm>
-          <a:extLst>
-            <a:ext uri="{909E8E84-426E-40DD-AFC4-6F175D3DCCD1}">
-              <a14:hiddenFill xmlns:a14="http://schemas.microsoft.com/office/drawing/2010/main" xmlns="">
-                <a:solidFill>
-                  <a:srgbClr val="FFFFFF"/>
-                </a:solidFill>
-              </a14:hiddenFill>
-            </a:ext>
-            <a:ext uri="{91240B29-F687-4F45-9708-019B960494DF}">
-              <a14:hiddenLine xmlns:a14="http://schemas.microsoft.com/office/drawing/2010/main" xmlns="" w="9525">
-                <a:solidFill>
-                  <a:srgbClr val="000000"/>
-                </a:solidFill>
-                <a:miter lim="800000"/>
-                <a:headEnd/>
-                <a:tailEnd/>
-              </a14:hiddenLine>
-            </a:ext>
-          </a:extLst>
-        </p:spPr>
-        <p:txBody>
-          <a:bodyPr vert="horz" wrap="square" lIns="91440" tIns="45720" rIns="91440" bIns="45720" numCol="1" anchor="t" anchorCtr="0" compatLnSpc="1">
-            <a:prstTxWarp prst="textNoShape">
-              <a:avLst/>
-            </a:prstTxWarp>
-          </a:bodyPr>
-          <a:lstStyle/>
-          <a:p>
-            <a:pPr marL="0" indent="0" algn="ctr" eaLnBrk="1" hangingPunct="1">
-              <a:buFont typeface="Arial" panose="020B0604020202020204" pitchFamily="34" charset="0"/>
-              <a:buNone/>
-              <a:defRPr/>
-            </a:pPr>
-            <a:endParaRPr lang="pt-BR" sz="2000" dirty="0"/>
-          </a:p>
-          <a:p>
-            <a:pPr algn="just" eaLnBrk="1" hangingPunct="1">
-              <a:buFont typeface="Arial" panose="020B0604020202020204" pitchFamily="34" charset="0"/>
-              <a:buChar char="•"/>
-              <a:defRPr/>
-            </a:pPr>
-            <a:endParaRPr lang="pt-BR" sz="2000" dirty="0"/>
+            <a:endParaRPr lang="pt-BR" dirty="0"/>
           </a:p>
         </p:txBody>
       </p:sp>
       <p:pic>
         <p:nvPicPr>
-          <p:cNvPr id="3" name="Imagem 2"/>
+          <p:cNvPr id="4" name="Imagem 3"/>
           <p:cNvPicPr>
             <a:picLocks noChangeAspect="1"/>
           </p:cNvPicPr>
           <p:nvPr/>
         </p:nvPicPr>
         <p:blipFill>
-          <a:blip r:embed="rId2" cstate="print">
+          <a:blip r:embed="rId2">
             <a:extLst>
               <a:ext uri="{28A0092B-C50C-407E-A947-70E740481C1C}">
-                <a14:useLocalDpi xmlns:a14="http://schemas.microsoft.com/office/drawing/2010/main" xmlns="" val="0"/>
+                <a14:useLocalDpi xmlns:a14="http://schemas.microsoft.com/office/drawing/2010/main" val="0"/>
               </a:ext>
             </a:extLst>
           </a:blip>
@@ -12863,8 +11694,8 @@
         </p:blipFill>
         <p:spPr>
           <a:xfrm>
-            <a:off x="611560" y="1412776"/>
-            <a:ext cx="7130573" cy="3612267"/>
+            <a:off x="1763688" y="1412776"/>
+            <a:ext cx="5257143" cy="4406349"/>
           </a:xfrm>
           <a:prstGeom prst="rect">
             <a:avLst/>
@@ -12874,23 +11705,13 @@
     </p:spTree>
     <p:extLst>
       <p:ext uri="{BB962C8B-B14F-4D97-AF65-F5344CB8AC3E}">
-        <p14:creationId xmlns:p14="http://schemas.microsoft.com/office/powerpoint/2010/main" xmlns="" val="4234705847"/>
+        <p14:creationId xmlns:p14="http://schemas.microsoft.com/office/powerpoint/2010/main" val="4100715659"/>
       </p:ext>
     </p:extLst>
   </p:cSld>
   <p:clrMapOvr>
     <a:masterClrMapping/>
   </p:clrMapOvr>
-  <p:transition spd="med">
-    <p:fade/>
-  </p:transition>
-  <p:timing>
-    <p:tnLst>
-      <p:par>
-        <p:cTn id="1" dur="indefinite" restart="never" nodeType="tmRoot"/>
-      </p:par>
-    </p:tnLst>
-  </p:timing>
 </p:sld>
 </file>
 
@@ -12953,14 +11774,14 @@
           </a:xfrm>
           <a:extLst>
             <a:ext uri="{909E8E84-426E-40DD-AFC4-6F175D3DCCD1}">
-              <a14:hiddenFill xmlns:a14="http://schemas.microsoft.com/office/drawing/2010/main" xmlns="">
+              <a14:hiddenFill xmlns:a14="http://schemas.microsoft.com/office/drawing/2010/main">
                 <a:solidFill>
                   <a:srgbClr val="FFFFFF"/>
                 </a:solidFill>
               </a14:hiddenFill>
             </a:ext>
             <a:ext uri="{91240B29-F687-4F45-9708-019B960494DF}">
-              <a14:hiddenLine xmlns:a14="http://schemas.microsoft.com/office/drawing/2010/main" xmlns="" w="9525">
+              <a14:hiddenLine xmlns:a14="http://schemas.microsoft.com/office/drawing/2010/main" w="9525">
                 <a:solidFill>
                   <a:srgbClr val="000000"/>
                 </a:solidFill>
@@ -12998,7 +11819,7 @@
       </p:sp>
       <p:pic>
         <p:nvPicPr>
-          <p:cNvPr id="2" name="Imagem 1"/>
+          <p:cNvPr id="3" name="Imagem 2"/>
           <p:cNvPicPr>
             <a:picLocks noChangeAspect="1"/>
           </p:cNvPicPr>
@@ -13008,7 +11829,7 @@
           <a:blip r:embed="rId2" cstate="print">
             <a:extLst>
               <a:ext uri="{28A0092B-C50C-407E-A947-70E740481C1C}">
-                <a14:useLocalDpi xmlns:a14="http://schemas.microsoft.com/office/drawing/2010/main" xmlns="" val="0"/>
+                <a14:useLocalDpi xmlns:a14="http://schemas.microsoft.com/office/drawing/2010/main" val="0"/>
               </a:ext>
             </a:extLst>
           </a:blip>
@@ -13018,8 +11839,8 @@
         </p:blipFill>
         <p:spPr>
           <a:xfrm>
-            <a:off x="395536" y="1628800"/>
-            <a:ext cx="7822434" cy="3384376"/>
+            <a:off x="611560" y="1412776"/>
+            <a:ext cx="7130573" cy="3612267"/>
           </a:xfrm>
           <a:prstGeom prst="rect">
             <a:avLst/>
@@ -13029,7 +11850,7 @@
     </p:spTree>
     <p:extLst>
       <p:ext uri="{BB962C8B-B14F-4D97-AF65-F5344CB8AC3E}">
-        <p14:creationId xmlns:p14="http://schemas.microsoft.com/office/powerpoint/2010/main" xmlns="" val="3817239344"/>
+        <p14:creationId xmlns:p14="http://schemas.microsoft.com/office/powerpoint/2010/main" val="4234705847"/>
       </p:ext>
     </p:extLst>
   </p:cSld>
@@ -13108,14 +11929,14 @@
           </a:xfrm>
           <a:extLst>
             <a:ext uri="{909E8E84-426E-40DD-AFC4-6F175D3DCCD1}">
-              <a14:hiddenFill xmlns:a14="http://schemas.microsoft.com/office/drawing/2010/main" xmlns="">
+              <a14:hiddenFill xmlns:a14="http://schemas.microsoft.com/office/drawing/2010/main">
                 <a:solidFill>
                   <a:srgbClr val="FFFFFF"/>
                 </a:solidFill>
               </a14:hiddenFill>
             </a:ext>
             <a:ext uri="{91240B29-F687-4F45-9708-019B960494DF}">
-              <a14:hiddenLine xmlns:a14="http://schemas.microsoft.com/office/drawing/2010/main" xmlns="" w="9525">
+              <a14:hiddenLine xmlns:a14="http://schemas.microsoft.com/office/drawing/2010/main" w="9525">
                 <a:solidFill>
                   <a:srgbClr val="000000"/>
                 </a:solidFill>
@@ -13163,7 +11984,7 @@
           <a:blip r:embed="rId2" cstate="print">
             <a:extLst>
               <a:ext uri="{28A0092B-C50C-407E-A947-70E740481C1C}">
-                <a14:useLocalDpi xmlns:a14="http://schemas.microsoft.com/office/drawing/2010/main" xmlns="" val="0"/>
+                <a14:useLocalDpi xmlns:a14="http://schemas.microsoft.com/office/drawing/2010/main" val="0"/>
               </a:ext>
             </a:extLst>
           </a:blip>
@@ -13173,8 +11994,8 @@
         </p:blipFill>
         <p:spPr>
           <a:xfrm>
-            <a:off x="539552" y="1340768"/>
-            <a:ext cx="7699145" cy="3900299"/>
+            <a:off x="395536" y="1628800"/>
+            <a:ext cx="7822434" cy="3384376"/>
           </a:xfrm>
           <a:prstGeom prst="rect">
             <a:avLst/>
@@ -13184,7 +12005,7 @@
     </p:spTree>
     <p:extLst>
       <p:ext uri="{BB962C8B-B14F-4D97-AF65-F5344CB8AC3E}">
-        <p14:creationId xmlns:p14="http://schemas.microsoft.com/office/powerpoint/2010/main" xmlns="" val="3523015254"/>
+        <p14:creationId xmlns:p14="http://schemas.microsoft.com/office/powerpoint/2010/main" val="3817239344"/>
       </p:ext>
     </p:extLst>
   </p:cSld>
@@ -13263,14 +12084,14 @@
           </a:xfrm>
           <a:extLst>
             <a:ext uri="{909E8E84-426E-40DD-AFC4-6F175D3DCCD1}">
-              <a14:hiddenFill xmlns:a14="http://schemas.microsoft.com/office/drawing/2010/main" xmlns="">
+              <a14:hiddenFill xmlns:a14="http://schemas.microsoft.com/office/drawing/2010/main">
                 <a:solidFill>
                   <a:srgbClr val="FFFFFF"/>
                 </a:solidFill>
               </a14:hiddenFill>
             </a:ext>
             <a:ext uri="{91240B29-F687-4F45-9708-019B960494DF}">
-              <a14:hiddenLine xmlns:a14="http://schemas.microsoft.com/office/drawing/2010/main" xmlns="" w="9525">
+              <a14:hiddenLine xmlns:a14="http://schemas.microsoft.com/office/drawing/2010/main" w="9525">
                 <a:solidFill>
                   <a:srgbClr val="000000"/>
                 </a:solidFill>
@@ -13318,7 +12139,162 @@
           <a:blip r:embed="rId2" cstate="print">
             <a:extLst>
               <a:ext uri="{28A0092B-C50C-407E-A947-70E740481C1C}">
-                <a14:useLocalDpi xmlns:a14="http://schemas.microsoft.com/office/drawing/2010/main" xmlns="" val="0"/>
+                <a14:useLocalDpi xmlns:a14="http://schemas.microsoft.com/office/drawing/2010/main" val="0"/>
+              </a:ext>
+            </a:extLst>
+          </a:blip>
+          <a:stretch>
+            <a:fillRect/>
+          </a:stretch>
+        </p:blipFill>
+        <p:spPr>
+          <a:xfrm>
+            <a:off x="539552" y="1340768"/>
+            <a:ext cx="7699145" cy="3900299"/>
+          </a:xfrm>
+          <a:prstGeom prst="rect">
+            <a:avLst/>
+          </a:prstGeom>
+        </p:spPr>
+      </p:pic>
+    </p:spTree>
+    <p:extLst>
+      <p:ext uri="{BB962C8B-B14F-4D97-AF65-F5344CB8AC3E}">
+        <p14:creationId xmlns:p14="http://schemas.microsoft.com/office/powerpoint/2010/main" val="3523015254"/>
+      </p:ext>
+    </p:extLst>
+  </p:cSld>
+  <p:clrMapOvr>
+    <a:masterClrMapping/>
+  </p:clrMapOvr>
+  <p:transition spd="med">
+    <p:fade/>
+  </p:transition>
+  <p:timing>
+    <p:tnLst>
+      <p:par>
+        <p:cTn id="1" dur="indefinite" restart="never" nodeType="tmRoot"/>
+      </p:par>
+    </p:tnLst>
+  </p:timing>
+</p:sld>
+</file>
+
+<file path=ppt/slides/slide26.xml><?xml version="1.0" encoding="utf-8"?>
+<p:sld xmlns:a="http://schemas.openxmlformats.org/drawingml/2006/main" xmlns:r="http://schemas.openxmlformats.org/officeDocument/2006/relationships" xmlns:p="http://schemas.openxmlformats.org/presentationml/2006/main">
+  <p:cSld>
+    <p:spTree>
+      <p:nvGrpSpPr>
+        <p:cNvPr id="1" name=""/>
+        <p:cNvGrpSpPr/>
+        <p:nvPr/>
+      </p:nvGrpSpPr>
+      <p:grpSpPr>
+        <a:xfrm>
+          <a:off x="0" y="0"/>
+          <a:ext cx="0" cy="0"/>
+          <a:chOff x="0" y="0"/>
+          <a:chExt cx="0" cy="0"/>
+        </a:xfrm>
+      </p:grpSpPr>
+      <p:sp>
+        <p:nvSpPr>
+          <p:cNvPr id="4" name="Título 3"/>
+          <p:cNvSpPr>
+            <a:spLocks noGrp="1"/>
+          </p:cNvSpPr>
+          <p:nvPr>
+            <p:ph type="title"/>
+          </p:nvPr>
+        </p:nvSpPr>
+        <p:spPr/>
+        <p:txBody>
+          <a:bodyPr/>
+          <a:lstStyle/>
+          <a:p>
+            <a:pPr eaLnBrk="1" hangingPunct="1">
+              <a:defRPr/>
+            </a:pPr>
+            <a:r>
+              <a:rPr lang="pt-BR" dirty="0"/>
+              <a:t>MODULO EMPRESA</a:t>
+            </a:r>
+          </a:p>
+        </p:txBody>
+      </p:sp>
+      <p:sp>
+        <p:nvSpPr>
+          <p:cNvPr id="21507" name="Espaço Reservado para Conteúdo 4"/>
+          <p:cNvSpPr>
+            <a:spLocks noGrp="1"/>
+          </p:cNvSpPr>
+          <p:nvPr>
+            <p:ph idx="1"/>
+          </p:nvPr>
+        </p:nvSpPr>
+        <p:spPr bwMode="auto">
+          <a:xfrm>
+            <a:off x="179512" y="1340768"/>
+            <a:ext cx="8785225" cy="5328592"/>
+          </a:xfrm>
+          <a:extLst>
+            <a:ext uri="{909E8E84-426E-40DD-AFC4-6F175D3DCCD1}">
+              <a14:hiddenFill xmlns:a14="http://schemas.microsoft.com/office/drawing/2010/main">
+                <a:solidFill>
+                  <a:srgbClr val="FFFFFF"/>
+                </a:solidFill>
+              </a14:hiddenFill>
+            </a:ext>
+            <a:ext uri="{91240B29-F687-4F45-9708-019B960494DF}">
+              <a14:hiddenLine xmlns:a14="http://schemas.microsoft.com/office/drawing/2010/main" w="9525">
+                <a:solidFill>
+                  <a:srgbClr val="000000"/>
+                </a:solidFill>
+                <a:miter lim="800000"/>
+                <a:headEnd/>
+                <a:tailEnd/>
+              </a14:hiddenLine>
+            </a:ext>
+          </a:extLst>
+        </p:spPr>
+        <p:txBody>
+          <a:bodyPr vert="horz" wrap="square" lIns="91440" tIns="45720" rIns="91440" bIns="45720" numCol="1" anchor="t" anchorCtr="0" compatLnSpc="1">
+            <a:prstTxWarp prst="textNoShape">
+              <a:avLst/>
+            </a:prstTxWarp>
+          </a:bodyPr>
+          <a:lstStyle/>
+          <a:p>
+            <a:pPr marL="0" indent="0" algn="ctr" eaLnBrk="1" hangingPunct="1">
+              <a:buFont typeface="Arial" panose="020B0604020202020204" pitchFamily="34" charset="0"/>
+              <a:buNone/>
+              <a:defRPr/>
+            </a:pPr>
+            <a:endParaRPr lang="pt-BR" sz="2000" dirty="0"/>
+          </a:p>
+          <a:p>
+            <a:pPr algn="just" eaLnBrk="1" hangingPunct="1">
+              <a:buFont typeface="Arial" panose="020B0604020202020204" pitchFamily="34" charset="0"/>
+              <a:buChar char="•"/>
+              <a:defRPr/>
+            </a:pPr>
+            <a:endParaRPr lang="pt-BR" sz="2000" dirty="0"/>
+          </a:p>
+        </p:txBody>
+      </p:sp>
+      <p:pic>
+        <p:nvPicPr>
+          <p:cNvPr id="2" name="Imagem 1"/>
+          <p:cNvPicPr>
+            <a:picLocks noChangeAspect="1"/>
+          </p:cNvPicPr>
+          <p:nvPr/>
+        </p:nvPicPr>
+        <p:blipFill>
+          <a:blip r:embed="rId2" cstate="print">
+            <a:extLst>
+              <a:ext uri="{28A0092B-C50C-407E-A947-70E740481C1C}">
+                <a14:useLocalDpi xmlns:a14="http://schemas.microsoft.com/office/drawing/2010/main" val="0"/>
               </a:ext>
             </a:extLst>
           </a:blip>
@@ -13339,7 +12315,7 @@
     </p:spTree>
     <p:extLst>
       <p:ext uri="{BB962C8B-B14F-4D97-AF65-F5344CB8AC3E}">
-        <p14:creationId xmlns:p14="http://schemas.microsoft.com/office/powerpoint/2010/main" xmlns="" val="1220430636"/>
+        <p14:creationId xmlns:p14="http://schemas.microsoft.com/office/powerpoint/2010/main" val="1220430636"/>
       </p:ext>
     </p:extLst>
   </p:cSld>
@@ -13359,7 +12335,7 @@
 </p:sld>
 </file>
 
-<file path=ppt/slides/slide26.xml><?xml version="1.0" encoding="utf-8"?>
+<file path=ppt/slides/slide27.xml><?xml version="1.0" encoding="utf-8"?>
 <p:sld xmlns:a="http://schemas.openxmlformats.org/drawingml/2006/main" xmlns:r="http://schemas.openxmlformats.org/officeDocument/2006/relationships" xmlns:p="http://schemas.openxmlformats.org/presentationml/2006/main">
   <p:cSld>
     <p:spTree>
@@ -13449,14 +12425,14 @@
             </a:ln>
             <a:extLst>
               <a:ext uri="{909E8E84-426E-40DD-AFC4-6F175D3DCCD1}">
-                <a14:hiddenFill xmlns:a14="http://schemas.microsoft.com/office/drawing/2010/main" xmlns="">
+                <a14:hiddenFill xmlns:a14="http://schemas.microsoft.com/office/drawing/2010/main">
                   <a:solidFill>
                     <a:srgbClr val="FFFFFF"/>
                   </a:solidFill>
                 </a14:hiddenFill>
               </a:ext>
               <a:ext uri="{91240B29-F687-4F45-9708-019B960494DF}">
-                <a14:hiddenLine xmlns:a14="http://schemas.microsoft.com/office/drawing/2010/main" xmlns="" w="9525">
+                <a14:hiddenLine xmlns:a14="http://schemas.microsoft.com/office/drawing/2010/main" w="9525">
                   <a:solidFill>
                     <a:srgbClr val="000000"/>
                   </a:solidFill>
@@ -13606,14 +12582,14 @@
             </a:ln>
             <a:extLst>
               <a:ext uri="{909E8E84-426E-40DD-AFC4-6F175D3DCCD1}">
-                <a14:hiddenFill xmlns:a14="http://schemas.microsoft.com/office/drawing/2010/main" xmlns="">
+                <a14:hiddenFill xmlns:a14="http://schemas.microsoft.com/office/drawing/2010/main">
                   <a:solidFill>
                     <a:srgbClr val="FFFFFF"/>
                   </a:solidFill>
                 </a14:hiddenFill>
               </a:ext>
               <a:ext uri="{91240B29-F687-4F45-9708-019B960494DF}">
-                <a14:hiddenLine xmlns:a14="http://schemas.microsoft.com/office/drawing/2010/main" xmlns="" w="9525">
+                <a14:hiddenLine xmlns:a14="http://schemas.microsoft.com/office/drawing/2010/main" w="9525">
                   <a:solidFill>
                     <a:srgbClr val="000000"/>
                   </a:solidFill>
@@ -13858,7 +12834,7 @@
     </p:spTree>
     <p:extLst>
       <p:ext uri="{BB962C8B-B14F-4D97-AF65-F5344CB8AC3E}">
-        <p14:creationId xmlns:p14="http://schemas.microsoft.com/office/powerpoint/2010/main" xmlns="" val="681014556"/>
+        <p14:creationId xmlns:p14="http://schemas.microsoft.com/office/powerpoint/2010/main" val="681014556"/>
       </p:ext>
     </p:extLst>
   </p:cSld>
@@ -13878,7 +12854,7 @@
 </p:sld>
 </file>
 
-<file path=ppt/slides/slide27.xml><?xml version="1.0" encoding="utf-8"?>
+<file path=ppt/slides/slide28.xml><?xml version="1.0" encoding="utf-8"?>
 <p:sld xmlns:a="http://schemas.openxmlformats.org/drawingml/2006/main" xmlns:r="http://schemas.openxmlformats.org/officeDocument/2006/relationships" xmlns:p="http://schemas.openxmlformats.org/presentationml/2006/main">
   <p:cSld>
     <p:spTree>
@@ -14084,7 +13060,7 @@
           <a:blip r:embed="rId2" cstate="print">
             <a:extLst>
               <a:ext uri="{28A0092B-C50C-407E-A947-70E740481C1C}">
-                <a14:useLocalDpi xmlns:a14="http://schemas.microsoft.com/office/drawing/2010/main" xmlns="" val="0"/>
+                <a14:useLocalDpi xmlns:a14="http://schemas.microsoft.com/office/drawing/2010/main" val="0"/>
               </a:ext>
             </a:extLst>
           </a:blip>
@@ -14105,7 +13081,7 @@
     </p:spTree>
     <p:extLst>
       <p:ext uri="{BB962C8B-B14F-4D97-AF65-F5344CB8AC3E}">
-        <p14:creationId xmlns:p14="http://schemas.microsoft.com/office/powerpoint/2010/main" xmlns="" val="1625217003"/>
+        <p14:creationId xmlns:p14="http://schemas.microsoft.com/office/powerpoint/2010/main" val="1625217003"/>
       </p:ext>
     </p:extLst>
   </p:cSld>
@@ -14122,7 +13098,7 @@
 </p:sld>
 </file>
 
-<file path=ppt/slides/slide28.xml><?xml version="1.0" encoding="utf-8"?>
+<file path=ppt/slides/slide29.xml><?xml version="1.0" encoding="utf-8"?>
 <p:sld xmlns:a="http://schemas.openxmlformats.org/drawingml/2006/main" xmlns:r="http://schemas.openxmlformats.org/officeDocument/2006/relationships" xmlns:p="http://schemas.openxmlformats.org/presentationml/2006/main">
   <p:cSld>
     <p:spTree>
@@ -14315,7 +13291,7 @@
     </p:spTree>
     <p:extLst>
       <p:ext uri="{BB962C8B-B14F-4D97-AF65-F5344CB8AC3E}">
-        <p14:creationId xmlns:p14="http://schemas.microsoft.com/office/powerpoint/2010/main" xmlns="" val="3812644496"/>
+        <p14:creationId xmlns:p14="http://schemas.microsoft.com/office/powerpoint/2010/main" val="3812644496"/>
       </p:ext>
     </p:extLst>
   </p:cSld>
@@ -14329,250 +13305,6 @@
       </p:par>
     </p:tnLst>
   </p:timing>
-</p:sld>
-</file>
-
-<file path=ppt/slides/slide29.xml><?xml version="1.0" encoding="utf-8"?>
-<p:sld xmlns:a="http://schemas.openxmlformats.org/drawingml/2006/main" xmlns:r="http://schemas.openxmlformats.org/officeDocument/2006/relationships" xmlns:p="http://schemas.openxmlformats.org/presentationml/2006/main">
-  <p:cSld>
-    <p:spTree>
-      <p:nvGrpSpPr>
-        <p:cNvPr id="1" name=""/>
-        <p:cNvGrpSpPr/>
-        <p:nvPr/>
-      </p:nvGrpSpPr>
-      <p:grpSpPr>
-        <a:xfrm>
-          <a:off x="0" y="0"/>
-          <a:ext cx="0" cy="0"/>
-          <a:chOff x="0" y="0"/>
-          <a:chExt cx="0" cy="0"/>
-        </a:xfrm>
-      </p:grpSpPr>
-      <p:pic>
-        <p:nvPicPr>
-          <p:cNvPr id="5" name="Imagem 4"/>
-          <p:cNvPicPr>
-            <a:picLocks noChangeAspect="1"/>
-          </p:cNvPicPr>
-          <p:nvPr/>
-        </p:nvPicPr>
-        <p:blipFill>
-          <a:blip r:embed="rId2" cstate="print">
-            <a:extLst>
-              <a:ext uri="{28A0092B-C50C-407E-A947-70E740481C1C}">
-                <a14:useLocalDpi xmlns:a14="http://schemas.microsoft.com/office/drawing/2010/main" xmlns="" val="0"/>
-              </a:ext>
-            </a:extLst>
-          </a:blip>
-          <a:stretch>
-            <a:fillRect/>
-          </a:stretch>
-        </p:blipFill>
-        <p:spPr>
-          <a:xfrm>
-            <a:off x="258594" y="1484784"/>
-            <a:ext cx="8878385" cy="4305265"/>
-          </a:xfrm>
-          <a:prstGeom prst="rect">
-            <a:avLst/>
-          </a:prstGeom>
-        </p:spPr>
-      </p:pic>
-      <p:sp>
-        <p:nvSpPr>
-          <p:cNvPr id="6" name="Título 3"/>
-          <p:cNvSpPr txBox="1">
-            <a:spLocks/>
-          </p:cNvSpPr>
-          <p:nvPr/>
-        </p:nvSpPr>
-        <p:spPr>
-          <a:xfrm>
-            <a:off x="2123728" y="188640"/>
-            <a:ext cx="8797925" cy="922338"/>
-          </a:xfrm>
-          <a:prstGeom prst="rect">
-            <a:avLst/>
-          </a:prstGeom>
-        </p:spPr>
-        <p:txBody>
-          <a:bodyPr/>
-          <a:lstStyle>
-            <a:lvl1pPr algn="ctr" rtl="0" eaLnBrk="0" fontAlgn="base" hangingPunct="0">
-              <a:spcBef>
-                <a:spcPct val="0"/>
-              </a:spcBef>
-              <a:spcAft>
-                <a:spcPct val="0"/>
-              </a:spcAft>
-              <a:defRPr sz="4400" kern="1200">
-                <a:solidFill>
-                  <a:schemeClr val="tx1"/>
-                </a:solidFill>
-                <a:latin typeface="Verdana" pitchFamily="34" charset="0"/>
-                <a:ea typeface="Verdana" pitchFamily="34" charset="0"/>
-                <a:cs typeface="Verdana" pitchFamily="34" charset="0"/>
-              </a:defRPr>
-            </a:lvl1pPr>
-            <a:lvl2pPr algn="ctr" rtl="0" eaLnBrk="0" fontAlgn="base" hangingPunct="0">
-              <a:spcBef>
-                <a:spcPct val="0"/>
-              </a:spcBef>
-              <a:spcAft>
-                <a:spcPct val="0"/>
-              </a:spcAft>
-              <a:defRPr sz="4400">
-                <a:solidFill>
-                  <a:schemeClr val="tx1"/>
-                </a:solidFill>
-                <a:latin typeface="Verdana" pitchFamily="34" charset="0"/>
-                <a:ea typeface="Verdana" pitchFamily="34" charset="0"/>
-                <a:cs typeface="Verdana" pitchFamily="34" charset="0"/>
-              </a:defRPr>
-            </a:lvl2pPr>
-            <a:lvl3pPr algn="ctr" rtl="0" eaLnBrk="0" fontAlgn="base" hangingPunct="0">
-              <a:spcBef>
-                <a:spcPct val="0"/>
-              </a:spcBef>
-              <a:spcAft>
-                <a:spcPct val="0"/>
-              </a:spcAft>
-              <a:defRPr sz="4400">
-                <a:solidFill>
-                  <a:schemeClr val="tx1"/>
-                </a:solidFill>
-                <a:latin typeface="Verdana" pitchFamily="34" charset="0"/>
-                <a:ea typeface="Verdana" pitchFamily="34" charset="0"/>
-                <a:cs typeface="Verdana" pitchFamily="34" charset="0"/>
-              </a:defRPr>
-            </a:lvl3pPr>
-            <a:lvl4pPr algn="ctr" rtl="0" eaLnBrk="0" fontAlgn="base" hangingPunct="0">
-              <a:spcBef>
-                <a:spcPct val="0"/>
-              </a:spcBef>
-              <a:spcAft>
-                <a:spcPct val="0"/>
-              </a:spcAft>
-              <a:defRPr sz="4400">
-                <a:solidFill>
-                  <a:schemeClr val="tx1"/>
-                </a:solidFill>
-                <a:latin typeface="Verdana" pitchFamily="34" charset="0"/>
-                <a:ea typeface="Verdana" pitchFamily="34" charset="0"/>
-                <a:cs typeface="Verdana" pitchFamily="34" charset="0"/>
-              </a:defRPr>
-            </a:lvl4pPr>
-            <a:lvl5pPr algn="ctr" rtl="0" eaLnBrk="0" fontAlgn="base" hangingPunct="0">
-              <a:spcBef>
-                <a:spcPct val="0"/>
-              </a:spcBef>
-              <a:spcAft>
-                <a:spcPct val="0"/>
-              </a:spcAft>
-              <a:defRPr sz="4400">
-                <a:solidFill>
-                  <a:schemeClr val="tx1"/>
-                </a:solidFill>
-                <a:latin typeface="Verdana" pitchFamily="34" charset="0"/>
-                <a:ea typeface="Verdana" pitchFamily="34" charset="0"/>
-                <a:cs typeface="Verdana" pitchFamily="34" charset="0"/>
-              </a:defRPr>
-            </a:lvl5pPr>
-            <a:lvl6pPr marL="457200" algn="ctr" rtl="0" fontAlgn="base">
-              <a:spcBef>
-                <a:spcPct val="0"/>
-              </a:spcBef>
-              <a:spcAft>
-                <a:spcPct val="0"/>
-              </a:spcAft>
-              <a:defRPr sz="4400">
-                <a:solidFill>
-                  <a:schemeClr val="tx1"/>
-                </a:solidFill>
-                <a:latin typeface="Verdana" pitchFamily="34" charset="0"/>
-                <a:ea typeface="Verdana" pitchFamily="34" charset="0"/>
-                <a:cs typeface="Verdana" pitchFamily="34" charset="0"/>
-              </a:defRPr>
-            </a:lvl6pPr>
-            <a:lvl7pPr marL="914400" algn="ctr" rtl="0" fontAlgn="base">
-              <a:spcBef>
-                <a:spcPct val="0"/>
-              </a:spcBef>
-              <a:spcAft>
-                <a:spcPct val="0"/>
-              </a:spcAft>
-              <a:defRPr sz="4400">
-                <a:solidFill>
-                  <a:schemeClr val="tx1"/>
-                </a:solidFill>
-                <a:latin typeface="Verdana" pitchFamily="34" charset="0"/>
-                <a:ea typeface="Verdana" pitchFamily="34" charset="0"/>
-                <a:cs typeface="Verdana" pitchFamily="34" charset="0"/>
-              </a:defRPr>
-            </a:lvl7pPr>
-            <a:lvl8pPr marL="1371600" algn="ctr" rtl="0" fontAlgn="base">
-              <a:spcBef>
-                <a:spcPct val="0"/>
-              </a:spcBef>
-              <a:spcAft>
-                <a:spcPct val="0"/>
-              </a:spcAft>
-              <a:defRPr sz="4400">
-                <a:solidFill>
-                  <a:schemeClr val="tx1"/>
-                </a:solidFill>
-                <a:latin typeface="Verdana" pitchFamily="34" charset="0"/>
-                <a:ea typeface="Verdana" pitchFamily="34" charset="0"/>
-                <a:cs typeface="Verdana" pitchFamily="34" charset="0"/>
-              </a:defRPr>
-            </a:lvl8pPr>
-            <a:lvl9pPr marL="1828800" algn="ctr" rtl="0" fontAlgn="base">
-              <a:spcBef>
-                <a:spcPct val="0"/>
-              </a:spcBef>
-              <a:spcAft>
-                <a:spcPct val="0"/>
-              </a:spcAft>
-              <a:defRPr sz="4400">
-                <a:solidFill>
-                  <a:schemeClr val="tx1"/>
-                </a:solidFill>
-                <a:latin typeface="Verdana" pitchFamily="34" charset="0"/>
-                <a:ea typeface="Verdana" pitchFamily="34" charset="0"/>
-                <a:cs typeface="Verdana" pitchFamily="34" charset="0"/>
-              </a:defRPr>
-            </a:lvl9pPr>
-          </a:lstStyle>
-          <a:p>
-            <a:pPr eaLnBrk="1" hangingPunct="1">
-              <a:defRPr/>
-            </a:pPr>
-            <a:r>
-              <a:rPr lang="pt-BR" sz="3600" b="1" dirty="0">
-                <a:solidFill>
-                  <a:schemeClr val="accent1">
-                    <a:lumMod val="50000"/>
-                  </a:schemeClr>
-                </a:solidFill>
-                <a:latin typeface="Arial" pitchFamily="34" charset="0"/>
-                <a:cs typeface="Arial" pitchFamily="34" charset="0"/>
-              </a:rPr>
-              <a:t>MODULO FINANCEIRO</a:t>
-            </a:r>
-          </a:p>
-        </p:txBody>
-      </p:sp>
-    </p:spTree>
-    <p:extLst>
-      <p:ext uri="{BB962C8B-B14F-4D97-AF65-F5344CB8AC3E}">
-        <p14:creationId xmlns:p14="http://schemas.microsoft.com/office/powerpoint/2010/main" xmlns="" val="1256551592"/>
-      </p:ext>
-    </p:extLst>
-  </p:cSld>
-  <p:clrMapOvr>
-    <a:masterClrMapping/>
-  </p:clrMapOvr>
 </p:sld>
 </file>
 
@@ -14625,7 +13357,7 @@
           <p:nvPr>
             <p:extLst>
               <p:ext uri="{D42A27DB-BD31-4B8C-83A1-F6EECF244321}">
-                <p14:modId xmlns:p14="http://schemas.microsoft.com/office/powerpoint/2010/main" xmlns="" val="3446486575"/>
+                <p14:modId xmlns:p14="http://schemas.microsoft.com/office/powerpoint/2010/main" val="3446486575"/>
               </p:ext>
             </p:extLst>
           </p:nvPr>
@@ -14675,6 +13407,250 @@
           <a:chExt cx="0" cy="0"/>
         </a:xfrm>
       </p:grpSpPr>
+      <p:pic>
+        <p:nvPicPr>
+          <p:cNvPr id="5" name="Imagem 4"/>
+          <p:cNvPicPr>
+            <a:picLocks noChangeAspect="1"/>
+          </p:cNvPicPr>
+          <p:nvPr/>
+        </p:nvPicPr>
+        <p:blipFill>
+          <a:blip r:embed="rId2" cstate="print">
+            <a:extLst>
+              <a:ext uri="{28A0092B-C50C-407E-A947-70E740481C1C}">
+                <a14:useLocalDpi xmlns:a14="http://schemas.microsoft.com/office/drawing/2010/main" val="0"/>
+              </a:ext>
+            </a:extLst>
+          </a:blip>
+          <a:stretch>
+            <a:fillRect/>
+          </a:stretch>
+        </p:blipFill>
+        <p:spPr>
+          <a:xfrm>
+            <a:off x="258594" y="1484784"/>
+            <a:ext cx="8878385" cy="4305265"/>
+          </a:xfrm>
+          <a:prstGeom prst="rect">
+            <a:avLst/>
+          </a:prstGeom>
+        </p:spPr>
+      </p:pic>
+      <p:sp>
+        <p:nvSpPr>
+          <p:cNvPr id="6" name="Título 3"/>
+          <p:cNvSpPr txBox="1">
+            <a:spLocks/>
+          </p:cNvSpPr>
+          <p:nvPr/>
+        </p:nvSpPr>
+        <p:spPr>
+          <a:xfrm>
+            <a:off x="2123728" y="188640"/>
+            <a:ext cx="8797925" cy="922338"/>
+          </a:xfrm>
+          <a:prstGeom prst="rect">
+            <a:avLst/>
+          </a:prstGeom>
+        </p:spPr>
+        <p:txBody>
+          <a:bodyPr/>
+          <a:lstStyle>
+            <a:lvl1pPr algn="ctr" rtl="0" eaLnBrk="0" fontAlgn="base" hangingPunct="0">
+              <a:spcBef>
+                <a:spcPct val="0"/>
+              </a:spcBef>
+              <a:spcAft>
+                <a:spcPct val="0"/>
+              </a:spcAft>
+              <a:defRPr sz="4400" kern="1200">
+                <a:solidFill>
+                  <a:schemeClr val="tx1"/>
+                </a:solidFill>
+                <a:latin typeface="Verdana" pitchFamily="34" charset="0"/>
+                <a:ea typeface="Verdana" pitchFamily="34" charset="0"/>
+                <a:cs typeface="Verdana" pitchFamily="34" charset="0"/>
+              </a:defRPr>
+            </a:lvl1pPr>
+            <a:lvl2pPr algn="ctr" rtl="0" eaLnBrk="0" fontAlgn="base" hangingPunct="0">
+              <a:spcBef>
+                <a:spcPct val="0"/>
+              </a:spcBef>
+              <a:spcAft>
+                <a:spcPct val="0"/>
+              </a:spcAft>
+              <a:defRPr sz="4400">
+                <a:solidFill>
+                  <a:schemeClr val="tx1"/>
+                </a:solidFill>
+                <a:latin typeface="Verdana" pitchFamily="34" charset="0"/>
+                <a:ea typeface="Verdana" pitchFamily="34" charset="0"/>
+                <a:cs typeface="Verdana" pitchFamily="34" charset="0"/>
+              </a:defRPr>
+            </a:lvl2pPr>
+            <a:lvl3pPr algn="ctr" rtl="0" eaLnBrk="0" fontAlgn="base" hangingPunct="0">
+              <a:spcBef>
+                <a:spcPct val="0"/>
+              </a:spcBef>
+              <a:spcAft>
+                <a:spcPct val="0"/>
+              </a:spcAft>
+              <a:defRPr sz="4400">
+                <a:solidFill>
+                  <a:schemeClr val="tx1"/>
+                </a:solidFill>
+                <a:latin typeface="Verdana" pitchFamily="34" charset="0"/>
+                <a:ea typeface="Verdana" pitchFamily="34" charset="0"/>
+                <a:cs typeface="Verdana" pitchFamily="34" charset="0"/>
+              </a:defRPr>
+            </a:lvl3pPr>
+            <a:lvl4pPr algn="ctr" rtl="0" eaLnBrk="0" fontAlgn="base" hangingPunct="0">
+              <a:spcBef>
+                <a:spcPct val="0"/>
+              </a:spcBef>
+              <a:spcAft>
+                <a:spcPct val="0"/>
+              </a:spcAft>
+              <a:defRPr sz="4400">
+                <a:solidFill>
+                  <a:schemeClr val="tx1"/>
+                </a:solidFill>
+                <a:latin typeface="Verdana" pitchFamily="34" charset="0"/>
+                <a:ea typeface="Verdana" pitchFamily="34" charset="0"/>
+                <a:cs typeface="Verdana" pitchFamily="34" charset="0"/>
+              </a:defRPr>
+            </a:lvl4pPr>
+            <a:lvl5pPr algn="ctr" rtl="0" eaLnBrk="0" fontAlgn="base" hangingPunct="0">
+              <a:spcBef>
+                <a:spcPct val="0"/>
+              </a:spcBef>
+              <a:spcAft>
+                <a:spcPct val="0"/>
+              </a:spcAft>
+              <a:defRPr sz="4400">
+                <a:solidFill>
+                  <a:schemeClr val="tx1"/>
+                </a:solidFill>
+                <a:latin typeface="Verdana" pitchFamily="34" charset="0"/>
+                <a:ea typeface="Verdana" pitchFamily="34" charset="0"/>
+                <a:cs typeface="Verdana" pitchFamily="34" charset="0"/>
+              </a:defRPr>
+            </a:lvl5pPr>
+            <a:lvl6pPr marL="457200" algn="ctr" rtl="0" fontAlgn="base">
+              <a:spcBef>
+                <a:spcPct val="0"/>
+              </a:spcBef>
+              <a:spcAft>
+                <a:spcPct val="0"/>
+              </a:spcAft>
+              <a:defRPr sz="4400">
+                <a:solidFill>
+                  <a:schemeClr val="tx1"/>
+                </a:solidFill>
+                <a:latin typeface="Verdana" pitchFamily="34" charset="0"/>
+                <a:ea typeface="Verdana" pitchFamily="34" charset="0"/>
+                <a:cs typeface="Verdana" pitchFamily="34" charset="0"/>
+              </a:defRPr>
+            </a:lvl6pPr>
+            <a:lvl7pPr marL="914400" algn="ctr" rtl="0" fontAlgn="base">
+              <a:spcBef>
+                <a:spcPct val="0"/>
+              </a:spcBef>
+              <a:spcAft>
+                <a:spcPct val="0"/>
+              </a:spcAft>
+              <a:defRPr sz="4400">
+                <a:solidFill>
+                  <a:schemeClr val="tx1"/>
+                </a:solidFill>
+                <a:latin typeface="Verdana" pitchFamily="34" charset="0"/>
+                <a:ea typeface="Verdana" pitchFamily="34" charset="0"/>
+                <a:cs typeface="Verdana" pitchFamily="34" charset="0"/>
+              </a:defRPr>
+            </a:lvl7pPr>
+            <a:lvl8pPr marL="1371600" algn="ctr" rtl="0" fontAlgn="base">
+              <a:spcBef>
+                <a:spcPct val="0"/>
+              </a:spcBef>
+              <a:spcAft>
+                <a:spcPct val="0"/>
+              </a:spcAft>
+              <a:defRPr sz="4400">
+                <a:solidFill>
+                  <a:schemeClr val="tx1"/>
+                </a:solidFill>
+                <a:latin typeface="Verdana" pitchFamily="34" charset="0"/>
+                <a:ea typeface="Verdana" pitchFamily="34" charset="0"/>
+                <a:cs typeface="Verdana" pitchFamily="34" charset="0"/>
+              </a:defRPr>
+            </a:lvl8pPr>
+            <a:lvl9pPr marL="1828800" algn="ctr" rtl="0" fontAlgn="base">
+              <a:spcBef>
+                <a:spcPct val="0"/>
+              </a:spcBef>
+              <a:spcAft>
+                <a:spcPct val="0"/>
+              </a:spcAft>
+              <a:defRPr sz="4400">
+                <a:solidFill>
+                  <a:schemeClr val="tx1"/>
+                </a:solidFill>
+                <a:latin typeface="Verdana" pitchFamily="34" charset="0"/>
+                <a:ea typeface="Verdana" pitchFamily="34" charset="0"/>
+                <a:cs typeface="Verdana" pitchFamily="34" charset="0"/>
+              </a:defRPr>
+            </a:lvl9pPr>
+          </a:lstStyle>
+          <a:p>
+            <a:pPr eaLnBrk="1" hangingPunct="1">
+              <a:defRPr/>
+            </a:pPr>
+            <a:r>
+              <a:rPr lang="pt-BR" sz="3600" b="1" dirty="0">
+                <a:solidFill>
+                  <a:schemeClr val="accent1">
+                    <a:lumMod val="50000"/>
+                  </a:schemeClr>
+                </a:solidFill>
+                <a:latin typeface="Arial" pitchFamily="34" charset="0"/>
+                <a:cs typeface="Arial" pitchFamily="34" charset="0"/>
+              </a:rPr>
+              <a:t>MODULO FINANCEIRO</a:t>
+            </a:r>
+          </a:p>
+        </p:txBody>
+      </p:sp>
+    </p:spTree>
+    <p:extLst>
+      <p:ext uri="{BB962C8B-B14F-4D97-AF65-F5344CB8AC3E}">
+        <p14:creationId xmlns:p14="http://schemas.microsoft.com/office/powerpoint/2010/main" val="1256551592"/>
+      </p:ext>
+    </p:extLst>
+  </p:cSld>
+  <p:clrMapOvr>
+    <a:masterClrMapping/>
+  </p:clrMapOvr>
+</p:sld>
+</file>
+
+<file path=ppt/slides/slide31.xml><?xml version="1.0" encoding="utf-8"?>
+<p:sld xmlns:a="http://schemas.openxmlformats.org/drawingml/2006/main" xmlns:r="http://schemas.openxmlformats.org/officeDocument/2006/relationships" xmlns:p="http://schemas.openxmlformats.org/presentationml/2006/main">
+  <p:cSld>
+    <p:spTree>
+      <p:nvGrpSpPr>
+        <p:cNvPr id="1" name=""/>
+        <p:cNvGrpSpPr/>
+        <p:nvPr/>
+      </p:nvGrpSpPr>
+      <p:grpSpPr>
+        <a:xfrm>
+          <a:off x="0" y="0"/>
+          <a:ext cx="0" cy="0"/>
+          <a:chOff x="0" y="0"/>
+          <a:chExt cx="0" cy="0"/>
+        </a:xfrm>
+      </p:grpSpPr>
       <p:sp>
         <p:nvSpPr>
           <p:cNvPr id="7" name="Título 3"/>
@@ -14871,7 +13847,7 @@
           <a:blip r:embed="rId2" cstate="print">
             <a:extLst>
               <a:ext uri="{28A0092B-C50C-407E-A947-70E740481C1C}">
-                <a14:useLocalDpi xmlns:a14="http://schemas.microsoft.com/office/drawing/2010/main" xmlns="" val="0"/>
+                <a14:useLocalDpi xmlns:a14="http://schemas.microsoft.com/office/drawing/2010/main" val="0"/>
               </a:ext>
             </a:extLst>
           </a:blip>
@@ -14892,251 +13868,7 @@
     </p:spTree>
     <p:extLst>
       <p:ext uri="{BB962C8B-B14F-4D97-AF65-F5344CB8AC3E}">
-        <p14:creationId xmlns:p14="http://schemas.microsoft.com/office/powerpoint/2010/main" xmlns="" val="3402891464"/>
-      </p:ext>
-    </p:extLst>
-  </p:cSld>
-  <p:clrMapOvr>
-    <a:masterClrMapping/>
-  </p:clrMapOvr>
-</p:sld>
-</file>
-
-<file path=ppt/slides/slide31.xml><?xml version="1.0" encoding="utf-8"?>
-<p:sld xmlns:a="http://schemas.openxmlformats.org/drawingml/2006/main" xmlns:r="http://schemas.openxmlformats.org/officeDocument/2006/relationships" xmlns:p="http://schemas.openxmlformats.org/presentationml/2006/main">
-  <p:cSld>
-    <p:spTree>
-      <p:nvGrpSpPr>
-        <p:cNvPr id="1" name=""/>
-        <p:cNvGrpSpPr/>
-        <p:nvPr/>
-      </p:nvGrpSpPr>
-      <p:grpSpPr>
-        <a:xfrm>
-          <a:off x="0" y="0"/>
-          <a:ext cx="0" cy="0"/>
-          <a:chOff x="0" y="0"/>
-          <a:chExt cx="0" cy="0"/>
-        </a:xfrm>
-      </p:grpSpPr>
-      <p:sp>
-        <p:nvSpPr>
-          <p:cNvPr id="5" name="Título 3"/>
-          <p:cNvSpPr txBox="1">
-            <a:spLocks/>
-          </p:cNvSpPr>
-          <p:nvPr/>
-        </p:nvSpPr>
-        <p:spPr>
-          <a:xfrm>
-            <a:off x="2123728" y="188640"/>
-            <a:ext cx="8797925" cy="922338"/>
-          </a:xfrm>
-          <a:prstGeom prst="rect">
-            <a:avLst/>
-          </a:prstGeom>
-        </p:spPr>
-        <p:txBody>
-          <a:bodyPr/>
-          <a:lstStyle>
-            <a:lvl1pPr algn="ctr" rtl="0" eaLnBrk="0" fontAlgn="base" hangingPunct="0">
-              <a:spcBef>
-                <a:spcPct val="0"/>
-              </a:spcBef>
-              <a:spcAft>
-                <a:spcPct val="0"/>
-              </a:spcAft>
-              <a:defRPr sz="4400" kern="1200">
-                <a:solidFill>
-                  <a:schemeClr val="tx1"/>
-                </a:solidFill>
-                <a:latin typeface="Verdana" pitchFamily="34" charset="0"/>
-                <a:ea typeface="Verdana" pitchFamily="34" charset="0"/>
-                <a:cs typeface="Verdana" pitchFamily="34" charset="0"/>
-              </a:defRPr>
-            </a:lvl1pPr>
-            <a:lvl2pPr algn="ctr" rtl="0" eaLnBrk="0" fontAlgn="base" hangingPunct="0">
-              <a:spcBef>
-                <a:spcPct val="0"/>
-              </a:spcBef>
-              <a:spcAft>
-                <a:spcPct val="0"/>
-              </a:spcAft>
-              <a:defRPr sz="4400">
-                <a:solidFill>
-                  <a:schemeClr val="tx1"/>
-                </a:solidFill>
-                <a:latin typeface="Verdana" pitchFamily="34" charset="0"/>
-                <a:ea typeface="Verdana" pitchFamily="34" charset="0"/>
-                <a:cs typeface="Verdana" pitchFamily="34" charset="0"/>
-              </a:defRPr>
-            </a:lvl2pPr>
-            <a:lvl3pPr algn="ctr" rtl="0" eaLnBrk="0" fontAlgn="base" hangingPunct="0">
-              <a:spcBef>
-                <a:spcPct val="0"/>
-              </a:spcBef>
-              <a:spcAft>
-                <a:spcPct val="0"/>
-              </a:spcAft>
-              <a:defRPr sz="4400">
-                <a:solidFill>
-                  <a:schemeClr val="tx1"/>
-                </a:solidFill>
-                <a:latin typeface="Verdana" pitchFamily="34" charset="0"/>
-                <a:ea typeface="Verdana" pitchFamily="34" charset="0"/>
-                <a:cs typeface="Verdana" pitchFamily="34" charset="0"/>
-              </a:defRPr>
-            </a:lvl3pPr>
-            <a:lvl4pPr algn="ctr" rtl="0" eaLnBrk="0" fontAlgn="base" hangingPunct="0">
-              <a:spcBef>
-                <a:spcPct val="0"/>
-              </a:spcBef>
-              <a:spcAft>
-                <a:spcPct val="0"/>
-              </a:spcAft>
-              <a:defRPr sz="4400">
-                <a:solidFill>
-                  <a:schemeClr val="tx1"/>
-                </a:solidFill>
-                <a:latin typeface="Verdana" pitchFamily="34" charset="0"/>
-                <a:ea typeface="Verdana" pitchFamily="34" charset="0"/>
-                <a:cs typeface="Verdana" pitchFamily="34" charset="0"/>
-              </a:defRPr>
-            </a:lvl4pPr>
-            <a:lvl5pPr algn="ctr" rtl="0" eaLnBrk="0" fontAlgn="base" hangingPunct="0">
-              <a:spcBef>
-                <a:spcPct val="0"/>
-              </a:spcBef>
-              <a:spcAft>
-                <a:spcPct val="0"/>
-              </a:spcAft>
-              <a:defRPr sz="4400">
-                <a:solidFill>
-                  <a:schemeClr val="tx1"/>
-                </a:solidFill>
-                <a:latin typeface="Verdana" pitchFamily="34" charset="0"/>
-                <a:ea typeface="Verdana" pitchFamily="34" charset="0"/>
-                <a:cs typeface="Verdana" pitchFamily="34" charset="0"/>
-              </a:defRPr>
-            </a:lvl5pPr>
-            <a:lvl6pPr marL="457200" algn="ctr" rtl="0" fontAlgn="base">
-              <a:spcBef>
-                <a:spcPct val="0"/>
-              </a:spcBef>
-              <a:spcAft>
-                <a:spcPct val="0"/>
-              </a:spcAft>
-              <a:defRPr sz="4400">
-                <a:solidFill>
-                  <a:schemeClr val="tx1"/>
-                </a:solidFill>
-                <a:latin typeface="Verdana" pitchFamily="34" charset="0"/>
-                <a:ea typeface="Verdana" pitchFamily="34" charset="0"/>
-                <a:cs typeface="Verdana" pitchFamily="34" charset="0"/>
-              </a:defRPr>
-            </a:lvl6pPr>
-            <a:lvl7pPr marL="914400" algn="ctr" rtl="0" fontAlgn="base">
-              <a:spcBef>
-                <a:spcPct val="0"/>
-              </a:spcBef>
-              <a:spcAft>
-                <a:spcPct val="0"/>
-              </a:spcAft>
-              <a:defRPr sz="4400">
-                <a:solidFill>
-                  <a:schemeClr val="tx1"/>
-                </a:solidFill>
-                <a:latin typeface="Verdana" pitchFamily="34" charset="0"/>
-                <a:ea typeface="Verdana" pitchFamily="34" charset="0"/>
-                <a:cs typeface="Verdana" pitchFamily="34" charset="0"/>
-              </a:defRPr>
-            </a:lvl7pPr>
-            <a:lvl8pPr marL="1371600" algn="ctr" rtl="0" fontAlgn="base">
-              <a:spcBef>
-                <a:spcPct val="0"/>
-              </a:spcBef>
-              <a:spcAft>
-                <a:spcPct val="0"/>
-              </a:spcAft>
-              <a:defRPr sz="4400">
-                <a:solidFill>
-                  <a:schemeClr val="tx1"/>
-                </a:solidFill>
-                <a:latin typeface="Verdana" pitchFamily="34" charset="0"/>
-                <a:ea typeface="Verdana" pitchFamily="34" charset="0"/>
-                <a:cs typeface="Verdana" pitchFamily="34" charset="0"/>
-              </a:defRPr>
-            </a:lvl8pPr>
-            <a:lvl9pPr marL="1828800" algn="ctr" rtl="0" fontAlgn="base">
-              <a:spcBef>
-                <a:spcPct val="0"/>
-              </a:spcBef>
-              <a:spcAft>
-                <a:spcPct val="0"/>
-              </a:spcAft>
-              <a:defRPr sz="4400">
-                <a:solidFill>
-                  <a:schemeClr val="tx1"/>
-                </a:solidFill>
-                <a:latin typeface="Verdana" pitchFamily="34" charset="0"/>
-                <a:ea typeface="Verdana" pitchFamily="34" charset="0"/>
-                <a:cs typeface="Verdana" pitchFamily="34" charset="0"/>
-              </a:defRPr>
-            </a:lvl9pPr>
-          </a:lstStyle>
-          <a:p>
-            <a:pPr eaLnBrk="1" hangingPunct="1">
-              <a:defRPr/>
-            </a:pPr>
-            <a:r>
-              <a:rPr lang="pt-BR" sz="3600" b="1" dirty="0">
-                <a:solidFill>
-                  <a:schemeClr val="accent1">
-                    <a:lumMod val="50000"/>
-                  </a:schemeClr>
-                </a:solidFill>
-                <a:latin typeface="Arial" pitchFamily="34" charset="0"/>
-                <a:cs typeface="Arial" pitchFamily="34" charset="0"/>
-              </a:rPr>
-              <a:t>MODULO FINANCEIRO</a:t>
-            </a:r>
-          </a:p>
-        </p:txBody>
-      </p:sp>
-      <p:pic>
-        <p:nvPicPr>
-          <p:cNvPr id="6" name="Imagem 5"/>
-          <p:cNvPicPr>
-            <a:picLocks noChangeAspect="1"/>
-          </p:cNvPicPr>
-          <p:nvPr/>
-        </p:nvPicPr>
-        <p:blipFill>
-          <a:blip r:embed="rId2" cstate="print">
-            <a:extLst>
-              <a:ext uri="{28A0092B-C50C-407E-A947-70E740481C1C}">
-                <a14:useLocalDpi xmlns:a14="http://schemas.microsoft.com/office/drawing/2010/main" xmlns="" val="0"/>
-              </a:ext>
-            </a:extLst>
-          </a:blip>
-          <a:stretch>
-            <a:fillRect/>
-          </a:stretch>
-        </p:blipFill>
-        <p:spPr>
-          <a:xfrm>
-            <a:off x="0" y="1216958"/>
-            <a:ext cx="9144000" cy="4424083"/>
-          </a:xfrm>
-          <a:prstGeom prst="rect">
-            <a:avLst/>
-          </a:prstGeom>
-        </p:spPr>
-      </p:pic>
-    </p:spTree>
-    <p:extLst>
-      <p:ext uri="{BB962C8B-B14F-4D97-AF65-F5344CB8AC3E}">
-        <p14:creationId xmlns:p14="http://schemas.microsoft.com/office/powerpoint/2010/main" xmlns="" val="2843391693"/>
+        <p14:creationId xmlns:p14="http://schemas.microsoft.com/office/powerpoint/2010/main" val="3402891464"/>
       </p:ext>
     </p:extLst>
   </p:cSld>
@@ -15359,7 +14091,7 @@
           <a:blip r:embed="rId2" cstate="print">
             <a:extLst>
               <a:ext uri="{28A0092B-C50C-407E-A947-70E740481C1C}">
-                <a14:useLocalDpi xmlns:a14="http://schemas.microsoft.com/office/drawing/2010/main" xmlns="" val="0"/>
+                <a14:useLocalDpi xmlns:a14="http://schemas.microsoft.com/office/drawing/2010/main" val="0"/>
               </a:ext>
             </a:extLst>
           </a:blip>
@@ -15369,8 +14101,8 @@
         </p:blipFill>
         <p:spPr>
           <a:xfrm>
-            <a:off x="1187624" y="1268760"/>
-            <a:ext cx="6613996" cy="5436404"/>
+            <a:off x="0" y="1216958"/>
+            <a:ext cx="9144000" cy="4424083"/>
           </a:xfrm>
           <a:prstGeom prst="rect">
             <a:avLst/>
@@ -15380,7 +14112,7 @@
     </p:spTree>
     <p:extLst>
       <p:ext uri="{BB962C8B-B14F-4D97-AF65-F5344CB8AC3E}">
-        <p14:creationId xmlns:p14="http://schemas.microsoft.com/office/powerpoint/2010/main" xmlns="" val="3776007642"/>
+        <p14:creationId xmlns:p14="http://schemas.microsoft.com/office/powerpoint/2010/main" val="2843391693"/>
       </p:ext>
     </p:extLst>
   </p:cSld>
@@ -15603,7 +14335,251 @@
           <a:blip r:embed="rId2" cstate="print">
             <a:extLst>
               <a:ext uri="{28A0092B-C50C-407E-A947-70E740481C1C}">
-                <a14:useLocalDpi xmlns:a14="http://schemas.microsoft.com/office/drawing/2010/main" xmlns="" val="0"/>
+                <a14:useLocalDpi xmlns:a14="http://schemas.microsoft.com/office/drawing/2010/main" val="0"/>
+              </a:ext>
+            </a:extLst>
+          </a:blip>
+          <a:stretch>
+            <a:fillRect/>
+          </a:stretch>
+        </p:blipFill>
+        <p:spPr>
+          <a:xfrm>
+            <a:off x="1187624" y="1268760"/>
+            <a:ext cx="6613996" cy="5436404"/>
+          </a:xfrm>
+          <a:prstGeom prst="rect">
+            <a:avLst/>
+          </a:prstGeom>
+        </p:spPr>
+      </p:pic>
+    </p:spTree>
+    <p:extLst>
+      <p:ext uri="{BB962C8B-B14F-4D97-AF65-F5344CB8AC3E}">
+        <p14:creationId xmlns:p14="http://schemas.microsoft.com/office/powerpoint/2010/main" val="3776007642"/>
+      </p:ext>
+    </p:extLst>
+  </p:cSld>
+  <p:clrMapOvr>
+    <a:masterClrMapping/>
+  </p:clrMapOvr>
+</p:sld>
+</file>
+
+<file path=ppt/slides/slide34.xml><?xml version="1.0" encoding="utf-8"?>
+<p:sld xmlns:a="http://schemas.openxmlformats.org/drawingml/2006/main" xmlns:r="http://schemas.openxmlformats.org/officeDocument/2006/relationships" xmlns:p="http://schemas.openxmlformats.org/presentationml/2006/main">
+  <p:cSld>
+    <p:spTree>
+      <p:nvGrpSpPr>
+        <p:cNvPr id="1" name=""/>
+        <p:cNvGrpSpPr/>
+        <p:nvPr/>
+      </p:nvGrpSpPr>
+      <p:grpSpPr>
+        <a:xfrm>
+          <a:off x="0" y="0"/>
+          <a:ext cx="0" cy="0"/>
+          <a:chOff x="0" y="0"/>
+          <a:chExt cx="0" cy="0"/>
+        </a:xfrm>
+      </p:grpSpPr>
+      <p:sp>
+        <p:nvSpPr>
+          <p:cNvPr id="5" name="Título 3"/>
+          <p:cNvSpPr txBox="1">
+            <a:spLocks/>
+          </p:cNvSpPr>
+          <p:nvPr/>
+        </p:nvSpPr>
+        <p:spPr>
+          <a:xfrm>
+            <a:off x="2123728" y="188640"/>
+            <a:ext cx="8797925" cy="922338"/>
+          </a:xfrm>
+          <a:prstGeom prst="rect">
+            <a:avLst/>
+          </a:prstGeom>
+        </p:spPr>
+        <p:txBody>
+          <a:bodyPr/>
+          <a:lstStyle>
+            <a:lvl1pPr algn="ctr" rtl="0" eaLnBrk="0" fontAlgn="base" hangingPunct="0">
+              <a:spcBef>
+                <a:spcPct val="0"/>
+              </a:spcBef>
+              <a:spcAft>
+                <a:spcPct val="0"/>
+              </a:spcAft>
+              <a:defRPr sz="4400" kern="1200">
+                <a:solidFill>
+                  <a:schemeClr val="tx1"/>
+                </a:solidFill>
+                <a:latin typeface="Verdana" pitchFamily="34" charset="0"/>
+                <a:ea typeface="Verdana" pitchFamily="34" charset="0"/>
+                <a:cs typeface="Verdana" pitchFamily="34" charset="0"/>
+              </a:defRPr>
+            </a:lvl1pPr>
+            <a:lvl2pPr algn="ctr" rtl="0" eaLnBrk="0" fontAlgn="base" hangingPunct="0">
+              <a:spcBef>
+                <a:spcPct val="0"/>
+              </a:spcBef>
+              <a:spcAft>
+                <a:spcPct val="0"/>
+              </a:spcAft>
+              <a:defRPr sz="4400">
+                <a:solidFill>
+                  <a:schemeClr val="tx1"/>
+                </a:solidFill>
+                <a:latin typeface="Verdana" pitchFamily="34" charset="0"/>
+                <a:ea typeface="Verdana" pitchFamily="34" charset="0"/>
+                <a:cs typeface="Verdana" pitchFamily="34" charset="0"/>
+              </a:defRPr>
+            </a:lvl2pPr>
+            <a:lvl3pPr algn="ctr" rtl="0" eaLnBrk="0" fontAlgn="base" hangingPunct="0">
+              <a:spcBef>
+                <a:spcPct val="0"/>
+              </a:spcBef>
+              <a:spcAft>
+                <a:spcPct val="0"/>
+              </a:spcAft>
+              <a:defRPr sz="4400">
+                <a:solidFill>
+                  <a:schemeClr val="tx1"/>
+                </a:solidFill>
+                <a:latin typeface="Verdana" pitchFamily="34" charset="0"/>
+                <a:ea typeface="Verdana" pitchFamily="34" charset="0"/>
+                <a:cs typeface="Verdana" pitchFamily="34" charset="0"/>
+              </a:defRPr>
+            </a:lvl3pPr>
+            <a:lvl4pPr algn="ctr" rtl="0" eaLnBrk="0" fontAlgn="base" hangingPunct="0">
+              <a:spcBef>
+                <a:spcPct val="0"/>
+              </a:spcBef>
+              <a:spcAft>
+                <a:spcPct val="0"/>
+              </a:spcAft>
+              <a:defRPr sz="4400">
+                <a:solidFill>
+                  <a:schemeClr val="tx1"/>
+                </a:solidFill>
+                <a:latin typeface="Verdana" pitchFamily="34" charset="0"/>
+                <a:ea typeface="Verdana" pitchFamily="34" charset="0"/>
+                <a:cs typeface="Verdana" pitchFamily="34" charset="0"/>
+              </a:defRPr>
+            </a:lvl4pPr>
+            <a:lvl5pPr algn="ctr" rtl="0" eaLnBrk="0" fontAlgn="base" hangingPunct="0">
+              <a:spcBef>
+                <a:spcPct val="0"/>
+              </a:spcBef>
+              <a:spcAft>
+                <a:spcPct val="0"/>
+              </a:spcAft>
+              <a:defRPr sz="4400">
+                <a:solidFill>
+                  <a:schemeClr val="tx1"/>
+                </a:solidFill>
+                <a:latin typeface="Verdana" pitchFamily="34" charset="0"/>
+                <a:ea typeface="Verdana" pitchFamily="34" charset="0"/>
+                <a:cs typeface="Verdana" pitchFamily="34" charset="0"/>
+              </a:defRPr>
+            </a:lvl5pPr>
+            <a:lvl6pPr marL="457200" algn="ctr" rtl="0" fontAlgn="base">
+              <a:spcBef>
+                <a:spcPct val="0"/>
+              </a:spcBef>
+              <a:spcAft>
+                <a:spcPct val="0"/>
+              </a:spcAft>
+              <a:defRPr sz="4400">
+                <a:solidFill>
+                  <a:schemeClr val="tx1"/>
+                </a:solidFill>
+                <a:latin typeface="Verdana" pitchFamily="34" charset="0"/>
+                <a:ea typeface="Verdana" pitchFamily="34" charset="0"/>
+                <a:cs typeface="Verdana" pitchFamily="34" charset="0"/>
+              </a:defRPr>
+            </a:lvl6pPr>
+            <a:lvl7pPr marL="914400" algn="ctr" rtl="0" fontAlgn="base">
+              <a:spcBef>
+                <a:spcPct val="0"/>
+              </a:spcBef>
+              <a:spcAft>
+                <a:spcPct val="0"/>
+              </a:spcAft>
+              <a:defRPr sz="4400">
+                <a:solidFill>
+                  <a:schemeClr val="tx1"/>
+                </a:solidFill>
+                <a:latin typeface="Verdana" pitchFamily="34" charset="0"/>
+                <a:ea typeface="Verdana" pitchFamily="34" charset="0"/>
+                <a:cs typeface="Verdana" pitchFamily="34" charset="0"/>
+              </a:defRPr>
+            </a:lvl7pPr>
+            <a:lvl8pPr marL="1371600" algn="ctr" rtl="0" fontAlgn="base">
+              <a:spcBef>
+                <a:spcPct val="0"/>
+              </a:spcBef>
+              <a:spcAft>
+                <a:spcPct val="0"/>
+              </a:spcAft>
+              <a:defRPr sz="4400">
+                <a:solidFill>
+                  <a:schemeClr val="tx1"/>
+                </a:solidFill>
+                <a:latin typeface="Verdana" pitchFamily="34" charset="0"/>
+                <a:ea typeface="Verdana" pitchFamily="34" charset="0"/>
+                <a:cs typeface="Verdana" pitchFamily="34" charset="0"/>
+              </a:defRPr>
+            </a:lvl8pPr>
+            <a:lvl9pPr marL="1828800" algn="ctr" rtl="0" fontAlgn="base">
+              <a:spcBef>
+                <a:spcPct val="0"/>
+              </a:spcBef>
+              <a:spcAft>
+                <a:spcPct val="0"/>
+              </a:spcAft>
+              <a:defRPr sz="4400">
+                <a:solidFill>
+                  <a:schemeClr val="tx1"/>
+                </a:solidFill>
+                <a:latin typeface="Verdana" pitchFamily="34" charset="0"/>
+                <a:ea typeface="Verdana" pitchFamily="34" charset="0"/>
+                <a:cs typeface="Verdana" pitchFamily="34" charset="0"/>
+              </a:defRPr>
+            </a:lvl9pPr>
+          </a:lstStyle>
+          <a:p>
+            <a:pPr eaLnBrk="1" hangingPunct="1">
+              <a:defRPr/>
+            </a:pPr>
+            <a:r>
+              <a:rPr lang="pt-BR" sz="3600" b="1" dirty="0">
+                <a:solidFill>
+                  <a:schemeClr val="accent1">
+                    <a:lumMod val="50000"/>
+                  </a:schemeClr>
+                </a:solidFill>
+                <a:latin typeface="Arial" pitchFamily="34" charset="0"/>
+                <a:cs typeface="Arial" pitchFamily="34" charset="0"/>
+              </a:rPr>
+              <a:t>MODULO FINANCEIRO</a:t>
+            </a:r>
+          </a:p>
+        </p:txBody>
+      </p:sp>
+      <p:pic>
+        <p:nvPicPr>
+          <p:cNvPr id="6" name="Imagem 5"/>
+          <p:cNvPicPr>
+            <a:picLocks noChangeAspect="1"/>
+          </p:cNvPicPr>
+          <p:nvPr/>
+        </p:nvPicPr>
+        <p:blipFill>
+          <a:blip r:embed="rId2" cstate="print">
+            <a:extLst>
+              <a:ext uri="{28A0092B-C50C-407E-A947-70E740481C1C}">
+                <a14:useLocalDpi xmlns:a14="http://schemas.microsoft.com/office/drawing/2010/main" val="0"/>
               </a:ext>
             </a:extLst>
           </a:blip>
@@ -15624,7 +14600,7 @@
     </p:spTree>
     <p:extLst>
       <p:ext uri="{BB962C8B-B14F-4D97-AF65-F5344CB8AC3E}">
-        <p14:creationId xmlns:p14="http://schemas.microsoft.com/office/powerpoint/2010/main" xmlns="" val="295618873"/>
+        <p14:creationId xmlns:p14="http://schemas.microsoft.com/office/powerpoint/2010/main" val="295618873"/>
       </p:ext>
     </p:extLst>
   </p:cSld>
@@ -15634,7 +14610,7 @@
 </p:sld>
 </file>
 
-<file path=ppt/slides/slide34.xml><?xml version="1.0" encoding="utf-8"?>
+<file path=ppt/slides/slide35.xml><?xml version="1.0" encoding="utf-8"?>
 <p:sld xmlns:a="http://schemas.openxmlformats.org/drawingml/2006/main" xmlns:r="http://schemas.openxmlformats.org/officeDocument/2006/relationships" xmlns:p="http://schemas.openxmlformats.org/presentationml/2006/main">
   <p:cSld>
     <p:spTree>
@@ -15724,14 +14700,14 @@
             </a:ln>
             <a:extLst>
               <a:ext uri="{909E8E84-426E-40DD-AFC4-6F175D3DCCD1}">
-                <a14:hiddenFill xmlns:a14="http://schemas.microsoft.com/office/drawing/2010/main" xmlns="">
+                <a14:hiddenFill xmlns:a14="http://schemas.microsoft.com/office/drawing/2010/main">
                   <a:solidFill>
                     <a:srgbClr val="FFFFFF"/>
                   </a:solidFill>
                 </a14:hiddenFill>
               </a:ext>
               <a:ext uri="{91240B29-F687-4F45-9708-019B960494DF}">
-                <a14:hiddenLine xmlns:a14="http://schemas.microsoft.com/office/drawing/2010/main" xmlns="" w="9525">
+                <a14:hiddenLine xmlns:a14="http://schemas.microsoft.com/office/drawing/2010/main" w="9525">
                   <a:solidFill>
                     <a:srgbClr val="000000"/>
                   </a:solidFill>
@@ -15881,14 +14857,14 @@
             </a:ln>
             <a:extLst>
               <a:ext uri="{909E8E84-426E-40DD-AFC4-6F175D3DCCD1}">
-                <a14:hiddenFill xmlns:a14="http://schemas.microsoft.com/office/drawing/2010/main" xmlns="">
+                <a14:hiddenFill xmlns:a14="http://schemas.microsoft.com/office/drawing/2010/main">
                   <a:solidFill>
                     <a:srgbClr val="FFFFFF"/>
                   </a:solidFill>
                 </a14:hiddenFill>
               </a:ext>
               <a:ext uri="{91240B29-F687-4F45-9708-019B960494DF}">
-                <a14:hiddenLine xmlns:a14="http://schemas.microsoft.com/office/drawing/2010/main" xmlns="" w="9525">
+                <a14:hiddenLine xmlns:a14="http://schemas.microsoft.com/office/drawing/2010/main" w="9525">
                   <a:solidFill>
                     <a:srgbClr val="000000"/>
                   </a:solidFill>
@@ -16141,7 +15117,7 @@
 </p:sld>
 </file>
 
-<file path=ppt/slides/slide35.xml><?xml version="1.0" encoding="utf-8"?>
+<file path=ppt/slides/slide36.xml><?xml version="1.0" encoding="utf-8"?>
 <p:sld xmlns:a="http://schemas.openxmlformats.org/drawingml/2006/main" xmlns:r="http://schemas.openxmlformats.org/officeDocument/2006/relationships" xmlns:p="http://schemas.openxmlformats.org/presentationml/2006/main">
   <p:cSld>
     <p:spTree>
@@ -16188,7 +15164,7 @@
           <p:cNvPr id="3" name="Picture 2">
             <a:extLst>
               <a:ext uri="{FF2B5EF4-FFF2-40B4-BE49-F238E27FC236}">
-                <a16:creationId xmlns="" xmlns:a16="http://schemas.microsoft.com/office/drawing/2014/main" id="{1488CEA1-615B-4D4C-A130-F1FD32F916CA}"/>
+                <a16:creationId xmlns:a16="http://schemas.microsoft.com/office/drawing/2014/main" xmlns="" id="{1488CEA1-615B-4D4C-A130-F1FD32F916CA}"/>
               </a:ext>
             </a:extLst>
           </p:cNvPr>
@@ -16201,7 +15177,7 @@
           <a:blip r:embed="rId2" cstate="print">
             <a:extLst>
               <a:ext uri="{28A0092B-C50C-407E-A947-70E740481C1C}">
-                <a14:useLocalDpi xmlns:a14="http://schemas.microsoft.com/office/drawing/2010/main" xmlns="" val="0"/>
+                <a14:useLocalDpi xmlns:a14="http://schemas.microsoft.com/office/drawing/2010/main" val="0"/>
               </a:ext>
             </a:extLst>
           </a:blip>
@@ -16213,64 +15189,6 @@
           <a:xfrm>
             <a:off x="2267744" y="965937"/>
             <a:ext cx="4990476" cy="5892063"/>
-          </a:xfrm>
-          <a:prstGeom prst="rect">
-            <a:avLst/>
-          </a:prstGeom>
-        </p:spPr>
-      </p:pic>
-    </p:spTree>
-  </p:cSld>
-  <p:clrMapOvr>
-    <a:masterClrMapping/>
-  </p:clrMapOvr>
-  <p:transition spd="med">
-    <p:fade/>
-  </p:transition>
-</p:sld>
-</file>
-
-<file path=ppt/slides/slide36.xml><?xml version="1.0" encoding="utf-8"?>
-<p:sld xmlns:a="http://schemas.openxmlformats.org/drawingml/2006/main" xmlns:r="http://schemas.openxmlformats.org/officeDocument/2006/relationships" xmlns:p="http://schemas.openxmlformats.org/presentationml/2006/main">
-  <p:cSld>
-    <p:spTree>
-      <p:nvGrpSpPr>
-        <p:cNvPr id="1" name=""/>
-        <p:cNvGrpSpPr/>
-        <p:nvPr/>
-      </p:nvGrpSpPr>
-      <p:grpSpPr>
-        <a:xfrm>
-          <a:off x="0" y="0"/>
-          <a:ext cx="0" cy="0"/>
-          <a:chOff x="0" y="0"/>
-          <a:chExt cx="0" cy="0"/>
-        </a:xfrm>
-      </p:grpSpPr>
-      <p:pic>
-        <p:nvPicPr>
-          <p:cNvPr id="6" name="Picture 5">
-            <a:extLst>
-              <a:ext uri="{FF2B5EF4-FFF2-40B4-BE49-F238E27FC236}">
-                <a16:creationId xmlns="" xmlns:a16="http://schemas.microsoft.com/office/drawing/2014/main" id="{556C9E4B-D420-4556-B5CC-EE1AB4DCB07C}"/>
-              </a:ext>
-            </a:extLst>
-          </p:cNvPr>
-          <p:cNvPicPr>
-            <a:picLocks noChangeAspect="1"/>
-          </p:cNvPicPr>
-          <p:nvPr/>
-        </p:nvPicPr>
-        <p:blipFill>
-          <a:blip r:embed="rId2" cstate="print"/>
-          <a:stretch>
-            <a:fillRect/>
-          </a:stretch>
-        </p:blipFill>
-        <p:spPr>
-          <a:xfrm>
-            <a:off x="33843" y="0"/>
-            <a:ext cx="9142752" cy="6858000"/>
           </a:xfrm>
           <a:prstGeom prst="rect">
             <a:avLst/>
@@ -16305,37 +15223,12 @@
           <a:chExt cx="0" cy="0"/>
         </a:xfrm>
       </p:grpSpPr>
-      <p:sp>
-        <p:nvSpPr>
-          <p:cNvPr id="4" name="Título 3"/>
-          <p:cNvSpPr>
-            <a:spLocks noGrp="1"/>
-          </p:cNvSpPr>
-          <p:nvPr>
-            <p:ph type="title"/>
-          </p:nvPr>
-        </p:nvSpPr>
-        <p:spPr/>
-        <p:txBody>
-          <a:bodyPr/>
-          <a:lstStyle/>
-          <a:p>
-            <a:pPr eaLnBrk="1" hangingPunct="1">
-              <a:defRPr/>
-            </a:pPr>
-            <a:r>
-              <a:rPr lang="pt-BR" dirty="0"/>
-              <a:t>MODULO PACIENTE</a:t>
-            </a:r>
-          </a:p>
-        </p:txBody>
-      </p:sp>
       <p:pic>
         <p:nvPicPr>
-          <p:cNvPr id="2" name="Picture 1">
+          <p:cNvPr id="6" name="Picture 5">
             <a:extLst>
               <a:ext uri="{FF2B5EF4-FFF2-40B4-BE49-F238E27FC236}">
-                <a16:creationId xmlns="" xmlns:a16="http://schemas.microsoft.com/office/drawing/2014/main" id="{E8555355-7F63-4032-B368-3F48BA17FAD2}"/>
+                <a16:creationId xmlns:a16="http://schemas.microsoft.com/office/drawing/2014/main" xmlns="" id="{556C9E4B-D420-4556-B5CC-EE1AB4DCB07C}"/>
               </a:ext>
             </a:extLst>
           </p:cNvPr>
@@ -16352,8 +15245,8 @@
         </p:blipFill>
         <p:spPr>
           <a:xfrm>
-            <a:off x="35496" y="260648"/>
-            <a:ext cx="9114998" cy="6624736"/>
+            <a:off x="33843" y="0"/>
+            <a:ext cx="9142752" cy="6858000"/>
           </a:xfrm>
           <a:prstGeom prst="rect">
             <a:avLst/>
@@ -16361,11 +15254,6 @@
         </p:spPr>
       </p:pic>
     </p:spTree>
-    <p:extLst>
-      <p:ext uri="{BB962C8B-B14F-4D97-AF65-F5344CB8AC3E}">
-        <p14:creationId xmlns:p14="http://schemas.microsoft.com/office/powerpoint/2010/main" xmlns="" val="1781569390"/>
-      </p:ext>
-    </p:extLst>
   </p:cSld>
   <p:clrMapOvr>
     <a:masterClrMapping/>
@@ -16423,7 +15311,7 @@
           <p:cNvPr id="2" name="Picture 1">
             <a:extLst>
               <a:ext uri="{FF2B5EF4-FFF2-40B4-BE49-F238E27FC236}">
-                <a16:creationId xmlns="" xmlns:a16="http://schemas.microsoft.com/office/drawing/2014/main" id="{A49E3022-804D-4E50-B26D-1F309A10D1CD}"/>
+                <a16:creationId xmlns:a16="http://schemas.microsoft.com/office/drawing/2014/main" xmlns="" id="{E8555355-7F63-4032-B368-3F48BA17FAD2}"/>
               </a:ext>
             </a:extLst>
           </p:cNvPr>
@@ -16440,8 +15328,8 @@
         </p:blipFill>
         <p:spPr>
           <a:xfrm>
-            <a:off x="0" y="0"/>
-            <a:ext cx="9143999" cy="7539243"/>
+            <a:off x="35496" y="260648"/>
+            <a:ext cx="9114998" cy="6624736"/>
           </a:xfrm>
           <a:prstGeom prst="rect">
             <a:avLst/>
@@ -16451,7 +15339,7 @@
     </p:spTree>
     <p:extLst>
       <p:ext uri="{BB962C8B-B14F-4D97-AF65-F5344CB8AC3E}">
-        <p14:creationId xmlns:p14="http://schemas.microsoft.com/office/powerpoint/2010/main" xmlns="" val="2106631967"/>
+        <p14:creationId xmlns:p14="http://schemas.microsoft.com/office/powerpoint/2010/main" val="1781569390"/>
       </p:ext>
     </p:extLst>
   </p:cSld>
@@ -16511,7 +15399,7 @@
           <p:cNvPr id="2" name="Picture 1">
             <a:extLst>
               <a:ext uri="{FF2B5EF4-FFF2-40B4-BE49-F238E27FC236}">
-                <a16:creationId xmlns="" xmlns:a16="http://schemas.microsoft.com/office/drawing/2014/main" id="{5C82754D-5DB1-4B53-8D11-8DA966E7AA77}"/>
+                <a16:creationId xmlns:a16="http://schemas.microsoft.com/office/drawing/2014/main" xmlns="" id="{A49E3022-804D-4E50-B26D-1F309A10D1CD}"/>
               </a:ext>
             </a:extLst>
           </p:cNvPr>
@@ -16528,8 +15416,8 @@
         </p:blipFill>
         <p:spPr>
           <a:xfrm>
-            <a:off x="0" y="53781"/>
-            <a:ext cx="9144000" cy="6831603"/>
+            <a:off x="0" y="0"/>
+            <a:ext cx="9143999" cy="7539243"/>
           </a:xfrm>
           <a:prstGeom prst="rect">
             <a:avLst/>
@@ -16539,7 +15427,7 @@
     </p:spTree>
     <p:extLst>
       <p:ext uri="{BB962C8B-B14F-4D97-AF65-F5344CB8AC3E}">
-        <p14:creationId xmlns:p14="http://schemas.microsoft.com/office/powerpoint/2010/main" xmlns="" val="395963370"/>
+        <p14:creationId xmlns:p14="http://schemas.microsoft.com/office/powerpoint/2010/main" val="2106631967"/>
       </p:ext>
     </p:extLst>
   </p:cSld>
@@ -16599,7 +15487,7 @@
           <p:cNvPr id="2" name="Picture 1">
             <a:extLst>
               <a:ext uri="{FF2B5EF4-FFF2-40B4-BE49-F238E27FC236}">
-                <a16:creationId xmlns="" xmlns:a16="http://schemas.microsoft.com/office/drawing/2014/main" id="{2050D0F6-7E2D-42EC-902D-04A2F3026358}"/>
+                <a16:creationId xmlns:a16="http://schemas.microsoft.com/office/drawing/2014/main" xmlns="" id="{2050D0F6-7E2D-42EC-902D-04A2F3026358}"/>
               </a:ext>
             </a:extLst>
           </p:cNvPr>
@@ -16679,6 +15567,94 @@
             </a:pPr>
             <a:r>
               <a:rPr lang="pt-BR" dirty="0"/>
+              <a:t>MODULO PACIENTE</a:t>
+            </a:r>
+          </a:p>
+        </p:txBody>
+      </p:sp>
+      <p:pic>
+        <p:nvPicPr>
+          <p:cNvPr id="2" name="Picture 1">
+            <a:extLst>
+              <a:ext uri="{FF2B5EF4-FFF2-40B4-BE49-F238E27FC236}">
+                <a16:creationId xmlns:a16="http://schemas.microsoft.com/office/drawing/2014/main" xmlns="" id="{5C82754D-5DB1-4B53-8D11-8DA966E7AA77}"/>
+              </a:ext>
+            </a:extLst>
+          </p:cNvPr>
+          <p:cNvPicPr>
+            <a:picLocks noChangeAspect="1"/>
+          </p:cNvPicPr>
+          <p:nvPr/>
+        </p:nvPicPr>
+        <p:blipFill>
+          <a:blip r:embed="rId2" cstate="print"/>
+          <a:stretch>
+            <a:fillRect/>
+          </a:stretch>
+        </p:blipFill>
+        <p:spPr>
+          <a:xfrm>
+            <a:off x="0" y="53781"/>
+            <a:ext cx="9144000" cy="6831603"/>
+          </a:xfrm>
+          <a:prstGeom prst="rect">
+            <a:avLst/>
+          </a:prstGeom>
+        </p:spPr>
+      </p:pic>
+    </p:spTree>
+    <p:extLst>
+      <p:ext uri="{BB962C8B-B14F-4D97-AF65-F5344CB8AC3E}">
+        <p14:creationId xmlns:p14="http://schemas.microsoft.com/office/powerpoint/2010/main" val="395963370"/>
+      </p:ext>
+    </p:extLst>
+  </p:cSld>
+  <p:clrMapOvr>
+    <a:masterClrMapping/>
+  </p:clrMapOvr>
+  <p:transition spd="med">
+    <p:fade/>
+  </p:transition>
+</p:sld>
+</file>
+
+<file path=ppt/slides/slide41.xml><?xml version="1.0" encoding="utf-8"?>
+<p:sld xmlns:a="http://schemas.openxmlformats.org/drawingml/2006/main" xmlns:r="http://schemas.openxmlformats.org/officeDocument/2006/relationships" xmlns:p="http://schemas.openxmlformats.org/presentationml/2006/main">
+  <p:cSld>
+    <p:spTree>
+      <p:nvGrpSpPr>
+        <p:cNvPr id="1" name=""/>
+        <p:cNvGrpSpPr/>
+        <p:nvPr/>
+      </p:nvGrpSpPr>
+      <p:grpSpPr>
+        <a:xfrm>
+          <a:off x="0" y="0"/>
+          <a:ext cx="0" cy="0"/>
+          <a:chOff x="0" y="0"/>
+          <a:chExt cx="0" cy="0"/>
+        </a:xfrm>
+      </p:grpSpPr>
+      <p:sp>
+        <p:nvSpPr>
+          <p:cNvPr id="4" name="Título 3"/>
+          <p:cNvSpPr>
+            <a:spLocks noGrp="1"/>
+          </p:cNvSpPr>
+          <p:nvPr>
+            <p:ph type="title"/>
+          </p:nvPr>
+        </p:nvSpPr>
+        <p:spPr/>
+        <p:txBody>
+          <a:bodyPr/>
+          <a:lstStyle/>
+          <a:p>
+            <a:pPr eaLnBrk="1" hangingPunct="1">
+              <a:defRPr/>
+            </a:pPr>
+            <a:r>
+              <a:rPr lang="pt-BR" dirty="0"/>
               <a:t>Próximos passos</a:t>
             </a:r>
           </a:p>
@@ -16717,7 +15693,7 @@
 </p:sld>
 </file>
 
-<file path=ppt/slides/slide41.xml><?xml version="1.0" encoding="utf-8"?>
+<file path=ppt/slides/slide42.xml><?xml version="1.0" encoding="utf-8"?>
 <p:sld xmlns:a="http://schemas.openxmlformats.org/drawingml/2006/main" xmlns:r="http://schemas.openxmlformats.org/officeDocument/2006/relationships" xmlns:p="http://schemas.openxmlformats.org/presentationml/2006/main">
   <p:cSld>
     <p:spTree>
@@ -16846,7 +15822,7 @@
           <a:blip r:embed="rId3" cstate="print">
             <a:extLst>
               <a:ext uri="{28A0092B-C50C-407E-A947-70E740481C1C}">
-                <a14:useLocalDpi xmlns:a14="http://schemas.microsoft.com/office/drawing/2010/main" xmlns="" val="0"/>
+                <a14:useLocalDpi xmlns:a14="http://schemas.microsoft.com/office/drawing/2010/main" val="0"/>
               </a:ext>
             </a:extLst>
           </a:blip>
@@ -16869,14 +15845,14 @@
           </a:ln>
           <a:extLst>
             <a:ext uri="{909E8E84-426E-40DD-AFC4-6F175D3DCCD1}">
-              <a14:hiddenFill xmlns:a14="http://schemas.microsoft.com/office/drawing/2010/main" xmlns="">
+              <a14:hiddenFill xmlns:a14="http://schemas.microsoft.com/office/drawing/2010/main">
                 <a:solidFill>
                   <a:srgbClr val="FFFFFF"/>
                 </a:solidFill>
               </a14:hiddenFill>
             </a:ext>
             <a:ext uri="{91240B29-F687-4F45-9708-019B960494DF}">
-              <a14:hiddenLine xmlns:a14="http://schemas.microsoft.com/office/drawing/2010/main" xmlns="" w="9525">
+              <a14:hiddenLine xmlns:a14="http://schemas.microsoft.com/office/drawing/2010/main" w="9525">
                 <a:solidFill>
                   <a:srgbClr val="000000"/>
                 </a:solidFill>
@@ -16996,14 +15972,14 @@
             </a:ln>
             <a:extLst>
               <a:ext uri="{909E8E84-426E-40DD-AFC4-6F175D3DCCD1}">
-                <a14:hiddenFill xmlns:a14="http://schemas.microsoft.com/office/drawing/2010/main" xmlns="">
+                <a14:hiddenFill xmlns:a14="http://schemas.microsoft.com/office/drawing/2010/main">
                   <a:solidFill>
                     <a:srgbClr val="FFFFFF"/>
                   </a:solidFill>
                 </a14:hiddenFill>
               </a:ext>
               <a:ext uri="{91240B29-F687-4F45-9708-019B960494DF}">
-                <a14:hiddenLine xmlns:a14="http://schemas.microsoft.com/office/drawing/2010/main" xmlns="" w="9525">
+                <a14:hiddenLine xmlns:a14="http://schemas.microsoft.com/office/drawing/2010/main" w="9525">
                   <a:solidFill>
                     <a:srgbClr val="000000"/>
                   </a:solidFill>
@@ -17153,14 +16129,14 @@
             </a:ln>
             <a:extLst>
               <a:ext uri="{909E8E84-426E-40DD-AFC4-6F175D3DCCD1}">
-                <a14:hiddenFill xmlns:a14="http://schemas.microsoft.com/office/drawing/2010/main" xmlns="">
+                <a14:hiddenFill xmlns:a14="http://schemas.microsoft.com/office/drawing/2010/main">
                   <a:solidFill>
                     <a:srgbClr val="FFFFFF"/>
                   </a:solidFill>
                 </a14:hiddenFill>
               </a:ext>
               <a:ext uri="{91240B29-F687-4F45-9708-019B960494DF}">
-                <a14:hiddenLine xmlns:a14="http://schemas.microsoft.com/office/drawing/2010/main" xmlns="" w="9525">
+                <a14:hiddenLine xmlns:a14="http://schemas.microsoft.com/office/drawing/2010/main" w="9525">
                   <a:solidFill>
                     <a:srgbClr val="000000"/>
                   </a:solidFill>
@@ -17405,7 +16381,7 @@
     </p:spTree>
     <p:extLst>
       <p:ext uri="{BB962C8B-B14F-4D97-AF65-F5344CB8AC3E}">
-        <p14:creationId xmlns:p14="http://schemas.microsoft.com/office/powerpoint/2010/main" xmlns="" val="2005090747"/>
+        <p14:creationId xmlns:p14="http://schemas.microsoft.com/office/powerpoint/2010/main" val="2005090747"/>
       </p:ext>
     </p:extLst>
   </p:cSld>
@@ -17484,14 +16460,14 @@
           </a:xfrm>
           <a:extLst>
             <a:ext uri="{909E8E84-426E-40DD-AFC4-6F175D3DCCD1}">
-              <a14:hiddenFill xmlns:a14="http://schemas.microsoft.com/office/drawing/2010/main" xmlns="">
+              <a14:hiddenFill xmlns:a14="http://schemas.microsoft.com/office/drawing/2010/main">
                 <a:solidFill>
                   <a:srgbClr val="FFFFFF"/>
                 </a:solidFill>
               </a14:hiddenFill>
             </a:ext>
             <a:ext uri="{91240B29-F687-4F45-9708-019B960494DF}">
-              <a14:hiddenLine xmlns:a14="http://schemas.microsoft.com/office/drawing/2010/main" xmlns="" w="9525">
+              <a14:hiddenLine xmlns:a14="http://schemas.microsoft.com/office/drawing/2010/main" w="9525">
                 <a:solidFill>
                   <a:srgbClr val="000000"/>
                 </a:solidFill>
@@ -18529,7 +17505,7 @@
   <a:extraClrSchemeLst/>
   <a:extLst>
     <a:ext uri="{05A4C25C-085E-4340-85A3-A5531E510DB2}">
-      <thm15:themeFamily xmlns:thm15="http://schemas.microsoft.com/office/thememl/2012/main" xmlns="" name="Office Theme" id="{62F939B6-93AF-4DB8-9C6B-D6C7DFDC589F}" vid="{4A3C46E8-61CC-4603-A589-7422A47A8E4A}"/>
+      <thm15:themeFamily xmlns:thm15="http://schemas.microsoft.com/office/thememl/2012/main" name="Office Theme" id="{62F939B6-93AF-4DB8-9C6B-D6C7DFDC589F}" vid="{4A3C46E8-61CC-4603-A589-7422A47A8E4A}"/>
     </a:ext>
   </a:extLst>
 </a:theme>

</xml_diff>

<commit_message>
2 ultimos slides ppt
2 ultimos slides ppt
</commit_message>
<xml_diff>
--- a/TCC/4º Encontro/2017-Apresentacao Psystem.pptx
+++ b/TCC/4º Encontro/2017-Apresentacao Psystem.pptx
@@ -1468,25 +1468,25 @@
     </dgm:pt>
   </dgm:ptLst>
   <dgm:cxnLst>
-    <dgm:cxn modelId="{C37A4655-A207-4984-9B52-4A5B0B40DA66}" type="presOf" srcId="{7A547729-84FA-4F2E-9F51-299D1602A94A}" destId="{B0AF5AA7-A84D-44E5-8652-A38EA7D30B9E}" srcOrd="0" destOrd="0" presId="urn:microsoft.com/office/officeart/2005/8/layout/balance1"/>
-    <dgm:cxn modelId="{977D42DD-BD55-4742-B6EF-10256D9761A8}" srcId="{01C2E957-A014-476C-A341-CE64A51F67F8}" destId="{62EA347E-D601-47FF-B1CF-9867A7FA776C}" srcOrd="1" destOrd="0" parTransId="{5710D6BA-9967-4BA0-82E1-D5244D551488}" sibTransId="{E3E31370-53BB-4594-A9A2-5C24AAD5D5AA}"/>
-    <dgm:cxn modelId="{9AC67AED-D4A7-4AD6-A636-4955EAEBF978}" type="presOf" srcId="{E45E690F-4EFD-4F64-A9B2-E2D8DDCF92A1}" destId="{7A3B0BBE-1442-4F18-AD09-1C73170CB2D1}" srcOrd="0" destOrd="0" presId="urn:microsoft.com/office/officeart/2005/8/layout/balance1"/>
+    <dgm:cxn modelId="{3BD5555C-90C9-4D37-BE81-BE7F553BF5B2}" type="presOf" srcId="{E98FF627-025F-45B5-9764-62147DED8C7C}" destId="{9E256A28-F7A1-4BAD-93DB-6DF4001E9955}" srcOrd="0" destOrd="0" presId="urn:microsoft.com/office/officeart/2005/8/layout/balance1"/>
+    <dgm:cxn modelId="{62B0D900-23BA-444D-A32F-E4726CF6B662}" srcId="{01C2E957-A014-476C-A341-CE64A51F67F8}" destId="{D17BBD7F-0433-4758-9835-0BE7DCBE3F52}" srcOrd="0" destOrd="0" parTransId="{D1ECF76B-AB3A-4292-943B-3A8E25CA58E4}" sibTransId="{C17E682A-DE94-412F-A207-E9E6ADA81B45}"/>
+    <dgm:cxn modelId="{40EE02AB-B6E1-4C01-A73B-375BFA1A7608}" srcId="{62EA347E-D601-47FF-B1CF-9867A7FA776C}" destId="{04D032C3-0B04-48B9-84AC-51BFAE523B98}" srcOrd="0" destOrd="0" parTransId="{7B293B59-6B3D-4850-A3B2-9B364EA2534B}" sibTransId="{F6986CE9-37DA-4044-B78F-D22E277B8838}"/>
+    <dgm:cxn modelId="{4AE4E030-47C6-45CD-8449-AB1462A349AA}" srcId="{D17BBD7F-0433-4758-9835-0BE7DCBE3F52}" destId="{E45E690F-4EFD-4F64-A9B2-E2D8DDCF92A1}" srcOrd="2" destOrd="0" parTransId="{6A67CA5F-FCC6-4CD6-90F3-238A95694ABA}" sibTransId="{85714508-D9E7-4406-BD30-9EFC5A7E8D0B}"/>
+    <dgm:cxn modelId="{8B87BB36-F57C-4884-B73F-392A798B6D25}" type="presOf" srcId="{D17BBD7F-0433-4758-9835-0BE7DCBE3F52}" destId="{706EE930-A0DC-4F2B-8788-46BDBC65213F}" srcOrd="0" destOrd="0" presId="urn:microsoft.com/office/officeart/2005/8/layout/balance1"/>
+    <dgm:cxn modelId="{BB4E42D3-1A89-4286-988A-113B8BC71D04}" srcId="{62EA347E-D601-47FF-B1CF-9867A7FA776C}" destId="{7A547729-84FA-4F2E-9F51-299D1602A94A}" srcOrd="2" destOrd="0" parTransId="{F4CD00AC-6D1F-4FD2-B4CA-5A92585217C5}" sibTransId="{EF289B30-FE88-4227-8691-A66F0EAFD48E}"/>
+    <dgm:cxn modelId="{33690613-177B-47F6-AA43-F8220D102AC9}" type="presOf" srcId="{E1E7FBE0-1555-4E75-AEF8-8F9F5CB1BD06}" destId="{C4E208D0-CEAD-42DA-B76C-8E4C287EF898}" srcOrd="0" destOrd="0" presId="urn:microsoft.com/office/officeart/2005/8/layout/balance1"/>
     <dgm:cxn modelId="{36F8AB67-22F7-4118-AABF-41F1515974FF}" type="presOf" srcId="{01C2E957-A014-476C-A341-CE64A51F67F8}" destId="{4FDF82FE-438D-47DD-A4CF-DE88326DD86D}" srcOrd="0" destOrd="0" presId="urn:microsoft.com/office/officeart/2005/8/layout/balance1"/>
-    <dgm:cxn modelId="{62B0D900-23BA-444D-A32F-E4726CF6B662}" srcId="{01C2E957-A014-476C-A341-CE64A51F67F8}" destId="{D17BBD7F-0433-4758-9835-0BE7DCBE3F52}" srcOrd="0" destOrd="0" parTransId="{D1ECF76B-AB3A-4292-943B-3A8E25CA58E4}" sibTransId="{C17E682A-DE94-412F-A207-E9E6ADA81B45}"/>
-    <dgm:cxn modelId="{9BACBFC6-20B8-4877-B092-EA7E718DF3C7}" type="presOf" srcId="{91EBB8F1-E656-46C9-8F93-7CF03CE320E6}" destId="{56D281F3-1177-4BAA-8CCE-0F7E741222BB}" srcOrd="0" destOrd="0" presId="urn:microsoft.com/office/officeart/2005/8/layout/balance1"/>
-    <dgm:cxn modelId="{3BD5555C-90C9-4D37-BE81-BE7F553BF5B2}" type="presOf" srcId="{E98FF627-025F-45B5-9764-62147DED8C7C}" destId="{9E256A28-F7A1-4BAD-93DB-6DF4001E9955}" srcOrd="0" destOrd="0" presId="urn:microsoft.com/office/officeart/2005/8/layout/balance1"/>
-    <dgm:cxn modelId="{33690613-177B-47F6-AA43-F8220D102AC9}" type="presOf" srcId="{E1E7FBE0-1555-4E75-AEF8-8F9F5CB1BD06}" destId="{C4E208D0-CEAD-42DA-B76C-8E4C287EF898}" srcOrd="0" destOrd="0" presId="urn:microsoft.com/office/officeart/2005/8/layout/balance1"/>
-    <dgm:cxn modelId="{40EE02AB-B6E1-4C01-A73B-375BFA1A7608}" srcId="{62EA347E-D601-47FF-B1CF-9867A7FA776C}" destId="{04D032C3-0B04-48B9-84AC-51BFAE523B98}" srcOrd="0" destOrd="0" parTransId="{7B293B59-6B3D-4850-A3B2-9B364EA2534B}" sibTransId="{F6986CE9-37DA-4044-B78F-D22E277B8838}"/>
-    <dgm:cxn modelId="{3DAF51C2-DB1B-4B2D-BB78-E9E7E0A36CED}" srcId="{D17BBD7F-0433-4758-9835-0BE7DCBE3F52}" destId="{E98FF627-025F-45B5-9764-62147DED8C7C}" srcOrd="1" destOrd="0" parTransId="{F37FA55F-05E9-46AB-9222-B53E1017C6C1}" sibTransId="{F3692C57-1264-47E4-AA92-79678263419A}"/>
     <dgm:cxn modelId="{5868CDF5-B7E5-4009-BA9D-6E128378A61A}" srcId="{D17BBD7F-0433-4758-9835-0BE7DCBE3F52}" destId="{91EBB8F1-E656-46C9-8F93-7CF03CE320E6}" srcOrd="0" destOrd="0" parTransId="{D484685C-2ECF-4E06-8B38-7EBC185A497B}" sibTransId="{2F3886FE-A59F-4A9D-A67C-19339A676E80}"/>
     <dgm:cxn modelId="{E346B443-61CD-40A2-B017-A159FFE63AC5}" type="presOf" srcId="{242D927A-CFFF-43D6-A2EE-FC5146504387}" destId="{22537FDA-94C2-409E-988D-C72527DD3E04}" srcOrd="0" destOrd="0" presId="urn:microsoft.com/office/officeart/2005/8/layout/balance1"/>
-    <dgm:cxn modelId="{4AE4E030-47C6-45CD-8449-AB1462A349AA}" srcId="{D17BBD7F-0433-4758-9835-0BE7DCBE3F52}" destId="{E45E690F-4EFD-4F64-A9B2-E2D8DDCF92A1}" srcOrd="2" destOrd="0" parTransId="{6A67CA5F-FCC6-4CD6-90F3-238A95694ABA}" sibTransId="{85714508-D9E7-4406-BD30-9EFC5A7E8D0B}"/>
     <dgm:cxn modelId="{FF3B68B9-2B70-4F56-8CEC-6AD1CF5BDCC8}" type="presOf" srcId="{04D032C3-0B04-48B9-84AC-51BFAE523B98}" destId="{BA507E78-6C7F-4731-861E-876A6F04D7AD}" srcOrd="0" destOrd="0" presId="urn:microsoft.com/office/officeart/2005/8/layout/balance1"/>
+    <dgm:cxn modelId="{9AC67AED-D4A7-4AD6-A636-4955EAEBF978}" type="presOf" srcId="{E45E690F-4EFD-4F64-A9B2-E2D8DDCF92A1}" destId="{7A3B0BBE-1442-4F18-AD09-1C73170CB2D1}" srcOrd="0" destOrd="0" presId="urn:microsoft.com/office/officeart/2005/8/layout/balance1"/>
+    <dgm:cxn modelId="{977D42DD-BD55-4742-B6EF-10256D9761A8}" srcId="{01C2E957-A014-476C-A341-CE64A51F67F8}" destId="{62EA347E-D601-47FF-B1CF-9867A7FA776C}" srcOrd="1" destOrd="0" parTransId="{5710D6BA-9967-4BA0-82E1-D5244D551488}" sibTransId="{E3E31370-53BB-4594-A9A2-5C24AAD5D5AA}"/>
+    <dgm:cxn modelId="{A96A4491-DB80-49A8-8183-54A73733B1A9}" type="presOf" srcId="{62EA347E-D601-47FF-B1CF-9867A7FA776C}" destId="{90CCDBC8-AA69-4A73-AE71-1C68CF47B9C2}" srcOrd="0" destOrd="0" presId="urn:microsoft.com/office/officeart/2005/8/layout/balance1"/>
+    <dgm:cxn modelId="{3DAF51C2-DB1B-4B2D-BB78-E9E7E0A36CED}" srcId="{D17BBD7F-0433-4758-9835-0BE7DCBE3F52}" destId="{E98FF627-025F-45B5-9764-62147DED8C7C}" srcOrd="1" destOrd="0" parTransId="{F37FA55F-05E9-46AB-9222-B53E1017C6C1}" sibTransId="{F3692C57-1264-47E4-AA92-79678263419A}"/>
+    <dgm:cxn modelId="{C37A4655-A207-4984-9B52-4A5B0B40DA66}" type="presOf" srcId="{7A547729-84FA-4F2E-9F51-299D1602A94A}" destId="{B0AF5AA7-A84D-44E5-8652-A38EA7D30B9E}" srcOrd="0" destOrd="0" presId="urn:microsoft.com/office/officeart/2005/8/layout/balance1"/>
+    <dgm:cxn modelId="{9BACBFC6-20B8-4877-B092-EA7E718DF3C7}" type="presOf" srcId="{91EBB8F1-E656-46C9-8F93-7CF03CE320E6}" destId="{56D281F3-1177-4BAA-8CCE-0F7E741222BB}" srcOrd="0" destOrd="0" presId="urn:microsoft.com/office/officeart/2005/8/layout/balance1"/>
     <dgm:cxn modelId="{E28FC2F4-0FAE-4288-8584-8A3F4F0A9C82}" srcId="{62EA347E-D601-47FF-B1CF-9867A7FA776C}" destId="{E1E7FBE0-1555-4E75-AEF8-8F9F5CB1BD06}" srcOrd="1" destOrd="0" parTransId="{F5FDC7F0-6690-4C23-BCB6-51FF11CA0BFC}" sibTransId="{BB202BC2-847F-4DB6-BB88-395740740564}"/>
-    <dgm:cxn modelId="{A96A4491-DB80-49A8-8183-54A73733B1A9}" type="presOf" srcId="{62EA347E-D601-47FF-B1CF-9867A7FA776C}" destId="{90CCDBC8-AA69-4A73-AE71-1C68CF47B9C2}" srcOrd="0" destOrd="0" presId="urn:microsoft.com/office/officeart/2005/8/layout/balance1"/>
-    <dgm:cxn modelId="{8B87BB36-F57C-4884-B73F-392A798B6D25}" type="presOf" srcId="{D17BBD7F-0433-4758-9835-0BE7DCBE3F52}" destId="{706EE930-A0DC-4F2B-8788-46BDBC65213F}" srcOrd="0" destOrd="0" presId="urn:microsoft.com/office/officeart/2005/8/layout/balance1"/>
     <dgm:cxn modelId="{E9DCFD45-6403-4029-8535-8D044E4FF711}" srcId="{62EA347E-D601-47FF-B1CF-9867A7FA776C}" destId="{242D927A-CFFF-43D6-A2EE-FC5146504387}" srcOrd="3" destOrd="0" parTransId="{9558DF73-175F-401C-BF20-F7B22F61B971}" sibTransId="{F48C3525-3E06-4131-8435-81A4A98225B8}"/>
-    <dgm:cxn modelId="{BB4E42D3-1A89-4286-988A-113B8BC71D04}" srcId="{62EA347E-D601-47FF-B1CF-9867A7FA776C}" destId="{7A547729-84FA-4F2E-9F51-299D1602A94A}" srcOrd="2" destOrd="0" parTransId="{F4CD00AC-6D1F-4FD2-B4CA-5A92585217C5}" sibTransId="{EF289B30-FE88-4227-8691-A66F0EAFD48E}"/>
     <dgm:cxn modelId="{A1C60917-864A-43A6-BB48-C4F2F1CE3021}" type="presParOf" srcId="{4FDF82FE-438D-47DD-A4CF-DE88326DD86D}" destId="{0CC9817B-B829-4BD7-A617-413C8A38FCCC}" srcOrd="0" destOrd="0" presId="urn:microsoft.com/office/officeart/2005/8/layout/balance1"/>
     <dgm:cxn modelId="{C850BEAC-9A2E-467D-94A8-DE0A61E62C38}" type="presParOf" srcId="{4FDF82FE-438D-47DD-A4CF-DE88326DD86D}" destId="{C466C275-1372-425A-B1AD-3B54E48B73E0}" srcOrd="1" destOrd="0" presId="urn:microsoft.com/office/officeart/2005/8/layout/balance1"/>
     <dgm:cxn modelId="{EF6FED68-E6C4-4FFE-A2AA-D3C04E648DF7}" type="presParOf" srcId="{C466C275-1372-425A-B1AD-3B54E48B73E0}" destId="{706EE930-A0DC-4F2B-8788-46BDBC65213F}" srcOrd="0" destOrd="0" presId="urn:microsoft.com/office/officeart/2005/8/layout/balance1"/>
@@ -10104,7 +10104,7 @@
           <p:cNvPr id="2" name="Título 1">
             <a:extLst>
               <a:ext uri="{FF2B5EF4-FFF2-40B4-BE49-F238E27FC236}">
-                <a16:creationId xmlns:a16="http://schemas.microsoft.com/office/drawing/2014/main" xmlns="" id="{4420E5F6-C592-489E-8742-39113C67F28C}"/>
+                <a16:creationId xmlns="" xmlns:a16="http://schemas.microsoft.com/office/drawing/2014/main" id="{4420E5F6-C592-489E-8742-39113C67F28C}"/>
               </a:ext>
             </a:extLst>
           </p:cNvPr>
@@ -10132,7 +10132,7 @@
           <p:cNvPr id="3" name="Espaço Reservado para Conteúdo 2">
             <a:extLst>
               <a:ext uri="{FF2B5EF4-FFF2-40B4-BE49-F238E27FC236}">
-                <a16:creationId xmlns:a16="http://schemas.microsoft.com/office/drawing/2014/main" xmlns="" id="{FB12D05B-E47F-4BA3-B1A7-F1DCD4D8F90E}"/>
+                <a16:creationId xmlns="" xmlns:a16="http://schemas.microsoft.com/office/drawing/2014/main" id="{FB12D05B-E47F-4BA3-B1A7-F1DCD4D8F90E}"/>
               </a:ext>
             </a:extLst>
           </p:cNvPr>
@@ -10384,7 +10384,7 @@
           <p:cNvPr id="2" name="Título 1">
             <a:extLst>
               <a:ext uri="{FF2B5EF4-FFF2-40B4-BE49-F238E27FC236}">
-                <a16:creationId xmlns:a16="http://schemas.microsoft.com/office/drawing/2014/main" xmlns="" id="{BEBA4382-BFBE-49EA-B613-397871EFBC81}"/>
+                <a16:creationId xmlns="" xmlns:a16="http://schemas.microsoft.com/office/drawing/2014/main" id="{BEBA4382-BFBE-49EA-B613-397871EFBC81}"/>
               </a:ext>
             </a:extLst>
           </p:cNvPr>
@@ -10412,7 +10412,7 @@
           <p:cNvPr id="4" name="Picture 2">
             <a:extLst>
               <a:ext uri="{FF2B5EF4-FFF2-40B4-BE49-F238E27FC236}">
-                <a16:creationId xmlns:a16="http://schemas.microsoft.com/office/drawing/2014/main" xmlns="" id="{73C6ED76-2527-4DEA-B4E5-D39F619C62E1}"/>
+                <a16:creationId xmlns="" xmlns:a16="http://schemas.microsoft.com/office/drawing/2014/main" id="{73C6ED76-2527-4DEA-B4E5-D39F619C62E1}"/>
               </a:ext>
             </a:extLst>
           </p:cNvPr>
@@ -10511,7 +10511,7 @@
           <p:cNvPr id="2" name="Título 1">
             <a:extLst>
               <a:ext uri="{FF2B5EF4-FFF2-40B4-BE49-F238E27FC236}">
-                <a16:creationId xmlns:a16="http://schemas.microsoft.com/office/drawing/2014/main" xmlns="" id="{4242F5FA-70CB-4D15-8FA2-0A8B9B2D9EE8}"/>
+                <a16:creationId xmlns="" xmlns:a16="http://schemas.microsoft.com/office/drawing/2014/main" id="{4242F5FA-70CB-4D15-8FA2-0A8B9B2D9EE8}"/>
               </a:ext>
             </a:extLst>
           </p:cNvPr>
@@ -10539,7 +10539,7 @@
           <p:cNvPr id="5" name="Espaço Reservado para Conteúdo 4">
             <a:extLst>
               <a:ext uri="{FF2B5EF4-FFF2-40B4-BE49-F238E27FC236}">
-                <a16:creationId xmlns:a16="http://schemas.microsoft.com/office/drawing/2014/main" xmlns="" id="{0EB6ED7E-6CFB-4E85-B7ED-4873840A1BE0}"/>
+                <a16:creationId xmlns="" xmlns:a16="http://schemas.microsoft.com/office/drawing/2014/main" id="{0EB6ED7E-6CFB-4E85-B7ED-4873840A1BE0}"/>
               </a:ext>
             </a:extLst>
           </p:cNvPr>
@@ -10611,7 +10611,7 @@
           <p:cNvPr id="2" name="Título 1">
             <a:extLst>
               <a:ext uri="{FF2B5EF4-FFF2-40B4-BE49-F238E27FC236}">
-                <a16:creationId xmlns:a16="http://schemas.microsoft.com/office/drawing/2014/main" xmlns="" id="{1258A6B5-29A2-40E3-9451-ECF7822CE513}"/>
+                <a16:creationId xmlns="" xmlns:a16="http://schemas.microsoft.com/office/drawing/2014/main" id="{1258A6B5-29A2-40E3-9451-ECF7822CE513}"/>
               </a:ext>
             </a:extLst>
           </p:cNvPr>
@@ -10639,7 +10639,7 @@
           <p:cNvPr id="5" name="Espaço Reservado para Conteúdo 4">
             <a:extLst>
               <a:ext uri="{FF2B5EF4-FFF2-40B4-BE49-F238E27FC236}">
-                <a16:creationId xmlns:a16="http://schemas.microsoft.com/office/drawing/2014/main" xmlns="" id="{B614B2BC-1672-4B4C-B1D9-8F6906444D11}"/>
+                <a16:creationId xmlns="" xmlns:a16="http://schemas.microsoft.com/office/drawing/2014/main" id="{B614B2BC-1672-4B4C-B1D9-8F6906444D11}"/>
               </a:ext>
             </a:extLst>
           </p:cNvPr>
@@ -10711,7 +10711,7 @@
           <p:cNvPr id="2" name="Título 1">
             <a:extLst>
               <a:ext uri="{FF2B5EF4-FFF2-40B4-BE49-F238E27FC236}">
-                <a16:creationId xmlns:a16="http://schemas.microsoft.com/office/drawing/2014/main" xmlns="" id="{4DBEE726-2AAB-4969-973C-8C26FE82FEF2}"/>
+                <a16:creationId xmlns="" xmlns:a16="http://schemas.microsoft.com/office/drawing/2014/main" id="{4DBEE726-2AAB-4969-973C-8C26FE82FEF2}"/>
               </a:ext>
             </a:extLst>
           </p:cNvPr>
@@ -10739,7 +10739,7 @@
           <p:cNvPr id="5" name="Espaço Reservado para Conteúdo 4">
             <a:extLst>
               <a:ext uri="{FF2B5EF4-FFF2-40B4-BE49-F238E27FC236}">
-                <a16:creationId xmlns:a16="http://schemas.microsoft.com/office/drawing/2014/main" xmlns="" id="{D0E0BD5E-9A99-41F6-AEAA-D122187C4B06}"/>
+                <a16:creationId xmlns="" xmlns:a16="http://schemas.microsoft.com/office/drawing/2014/main" id="{D0E0BD5E-9A99-41F6-AEAA-D122187C4B06}"/>
               </a:ext>
             </a:extLst>
           </p:cNvPr>
@@ -10836,7 +10836,7 @@
           <p:cNvPr id="5" name="Picture 4">
             <a:extLst>
               <a:ext uri="{FF2B5EF4-FFF2-40B4-BE49-F238E27FC236}">
-                <a16:creationId xmlns:a16="http://schemas.microsoft.com/office/drawing/2014/main" xmlns="" id="{47BB9FD5-5FAB-47BE-936F-4BD6B4C3D29C}"/>
+                <a16:creationId xmlns="" xmlns:a16="http://schemas.microsoft.com/office/drawing/2014/main" id="{47BB9FD5-5FAB-47BE-936F-4BD6B4C3D29C}"/>
               </a:ext>
             </a:extLst>
           </p:cNvPr>
@@ -15164,7 +15164,7 @@
           <p:cNvPr id="3" name="Picture 2">
             <a:extLst>
               <a:ext uri="{FF2B5EF4-FFF2-40B4-BE49-F238E27FC236}">
-                <a16:creationId xmlns:a16="http://schemas.microsoft.com/office/drawing/2014/main" xmlns="" id="{1488CEA1-615B-4D4C-A130-F1FD32F916CA}"/>
+                <a16:creationId xmlns="" xmlns:a16="http://schemas.microsoft.com/office/drawing/2014/main" id="{1488CEA1-615B-4D4C-A130-F1FD32F916CA}"/>
               </a:ext>
             </a:extLst>
           </p:cNvPr>
@@ -15228,7 +15228,7 @@
           <p:cNvPr id="6" name="Picture 5">
             <a:extLst>
               <a:ext uri="{FF2B5EF4-FFF2-40B4-BE49-F238E27FC236}">
-                <a16:creationId xmlns:a16="http://schemas.microsoft.com/office/drawing/2014/main" xmlns="" id="{556C9E4B-D420-4556-B5CC-EE1AB4DCB07C}"/>
+                <a16:creationId xmlns="" xmlns:a16="http://schemas.microsoft.com/office/drawing/2014/main" id="{556C9E4B-D420-4556-B5CC-EE1AB4DCB07C}"/>
               </a:ext>
             </a:extLst>
           </p:cNvPr>
@@ -15311,7 +15311,7 @@
           <p:cNvPr id="2" name="Picture 1">
             <a:extLst>
               <a:ext uri="{FF2B5EF4-FFF2-40B4-BE49-F238E27FC236}">
-                <a16:creationId xmlns:a16="http://schemas.microsoft.com/office/drawing/2014/main" xmlns="" id="{E8555355-7F63-4032-B368-3F48BA17FAD2}"/>
+                <a16:creationId xmlns="" xmlns:a16="http://schemas.microsoft.com/office/drawing/2014/main" id="{E8555355-7F63-4032-B368-3F48BA17FAD2}"/>
               </a:ext>
             </a:extLst>
           </p:cNvPr>
@@ -15399,7 +15399,7 @@
           <p:cNvPr id="2" name="Picture 1">
             <a:extLst>
               <a:ext uri="{FF2B5EF4-FFF2-40B4-BE49-F238E27FC236}">
-                <a16:creationId xmlns:a16="http://schemas.microsoft.com/office/drawing/2014/main" xmlns="" id="{A49E3022-804D-4E50-B26D-1F309A10D1CD}"/>
+                <a16:creationId xmlns="" xmlns:a16="http://schemas.microsoft.com/office/drawing/2014/main" id="{A49E3022-804D-4E50-B26D-1F309A10D1CD}"/>
               </a:ext>
             </a:extLst>
           </p:cNvPr>
@@ -15487,7 +15487,7 @@
           <p:cNvPr id="2" name="Picture 1">
             <a:extLst>
               <a:ext uri="{FF2B5EF4-FFF2-40B4-BE49-F238E27FC236}">
-                <a16:creationId xmlns:a16="http://schemas.microsoft.com/office/drawing/2014/main" xmlns="" id="{2050D0F6-7E2D-42EC-902D-04A2F3026358}"/>
+                <a16:creationId xmlns="" xmlns:a16="http://schemas.microsoft.com/office/drawing/2014/main" id="{2050D0F6-7E2D-42EC-902D-04A2F3026358}"/>
               </a:ext>
             </a:extLst>
           </p:cNvPr>
@@ -15577,7 +15577,7 @@
           <p:cNvPr id="2" name="Picture 1">
             <a:extLst>
               <a:ext uri="{FF2B5EF4-FFF2-40B4-BE49-F238E27FC236}">
-                <a16:creationId xmlns:a16="http://schemas.microsoft.com/office/drawing/2014/main" xmlns="" id="{5C82754D-5DB1-4B53-8D11-8DA966E7AA77}"/>
+                <a16:creationId xmlns="" xmlns:a16="http://schemas.microsoft.com/office/drawing/2014/main" id="{5C82754D-5DB1-4B53-8D11-8DA966E7AA77}"/>
               </a:ext>
             </a:extLst>
           </p:cNvPr>
@@ -15677,8 +15677,43 @@
           <a:p>
             <a:r>
               <a:rPr lang="pt-BR" dirty="0"/>
-              <a:t>Implementar o sistema</a:t>
+              <a:t>Implementar o </a:t>
             </a:r>
+            <a:r>
+              <a:rPr lang="pt-BR" dirty="0" smtClean="0"/>
+              <a:t>sistema;</a:t>
+            </a:r>
+          </a:p>
+          <a:p>
+            <a:r>
+              <a:rPr lang="pt-BR" dirty="0"/>
+              <a:t>Testes da aplicação pronta;</a:t>
+            </a:r>
+          </a:p>
+          <a:p>
+            <a:r>
+              <a:rPr lang="pt-BR" dirty="0" smtClean="0"/>
+              <a:t>Implantação </a:t>
+            </a:r>
+            <a:r>
+              <a:rPr lang="pt-BR" dirty="0"/>
+              <a:t>da aplicação;</a:t>
+            </a:r>
+          </a:p>
+          <a:p>
+            <a:r>
+              <a:rPr lang="pt-BR" dirty="0" smtClean="0"/>
+              <a:t>Avaliação </a:t>
+            </a:r>
+            <a:r>
+              <a:rPr lang="pt-BR" dirty="0"/>
+              <a:t>pós implantação</a:t>
+            </a:r>
+            <a:r>
+              <a:rPr lang="pt-BR" dirty="0" smtClean="0"/>
+              <a:t>.</a:t>
+            </a:r>
+            <a:endParaRPr lang="pt-BR" dirty="0"/>
           </a:p>
         </p:txBody>
       </p:sp>
@@ -15752,7 +15787,29 @@
           <a:p>
             <a:r>
               <a:rPr lang="pt-BR" dirty="0"/>
-              <a:t>Descreva o que você faria diferente se fosse iniciar o sistema.</a:t>
+              <a:t>Manter-se alinhado ao escopo inicial do projeto de forma que os custos não sejam ultrapassados bem como não sejam desenvolvidas funcionalidades que não terão utilidade</a:t>
+            </a:r>
+            <a:r>
+              <a:rPr lang="pt-BR" dirty="0" smtClean="0"/>
+              <a:t>.</a:t>
+            </a:r>
+            <a:endParaRPr lang="pt-BR" dirty="0"/>
+          </a:p>
+          <a:p>
+            <a:r>
+              <a:rPr lang="pt-BR" dirty="0"/>
+              <a:t>Realizar as primeiras entregas com aquilo que é essencial e que traz valor ao negócio do cliente</a:t>
+            </a:r>
+            <a:r>
+              <a:rPr lang="pt-BR" dirty="0" smtClean="0"/>
+              <a:t>.</a:t>
+            </a:r>
+            <a:endParaRPr lang="pt-BR" dirty="0"/>
+          </a:p>
+          <a:p>
+            <a:r>
+              <a:rPr lang="pt-BR" dirty="0"/>
+              <a:t>Entender a ‘Definição de Pronto’, onde o produto de software só é considerado concluído após codificado e testado.</a:t>
             </a:r>
           </a:p>
         </p:txBody>

</xml_diff>